<commit_message>
Figurer og gammel begrebsliste fjernet
</commit_message>
<xml_diff>
--- a/Figurer.pptx
+++ b/Figurer.pptx
@@ -5,10 +5,10 @@
     <p:sldMasterId id="2147483648" r:id="rId1"/>
   </p:sldMasterIdLst>
   <p:notesMasterIdLst>
-    <p:notesMasterId r:id="rId10"/>
+    <p:notesMasterId r:id="rId11"/>
   </p:notesMasterIdLst>
   <p:handoutMasterIdLst>
-    <p:handoutMasterId r:id="rId11"/>
+    <p:handoutMasterId r:id="rId12"/>
   </p:handoutMasterIdLst>
   <p:sldIdLst>
     <p:sldId id="329" r:id="rId2"/>
@@ -17,8 +17,9 @@
     <p:sldId id="330" r:id="rId5"/>
     <p:sldId id="331" r:id="rId6"/>
     <p:sldId id="332" r:id="rId7"/>
-    <p:sldId id="327" r:id="rId8"/>
-    <p:sldId id="328" r:id="rId9"/>
+    <p:sldId id="333" r:id="rId8"/>
+    <p:sldId id="327" r:id="rId9"/>
+    <p:sldId id="328" r:id="rId10"/>
   </p:sldIdLst>
   <p:sldSz cx="12192000" cy="6858000"/>
   <p:notesSz cx="7099300" cy="10234613"/>
@@ -14743,6 +14744,575 @@
           <p:cNvPr id="2" name="Title 1">
             <a:extLst>
               <a:ext uri="{FF2B5EF4-FFF2-40B4-BE49-F238E27FC236}">
+                <a16:creationId xmlns:a16="http://schemas.microsoft.com/office/drawing/2014/main" id="{4187DA93-9A7E-4516-8F9C-BDF90149A578}"/>
+              </a:ext>
+            </a:extLst>
+          </p:cNvPr>
+          <p:cNvSpPr>
+            <a:spLocks noGrp="1"/>
+          </p:cNvSpPr>
+          <p:nvPr>
+            <p:ph type="title"/>
+          </p:nvPr>
+        </p:nvSpPr>
+        <p:spPr/>
+        <p:txBody>
+          <a:bodyPr/>
+          <a:lstStyle/>
+          <a:p>
+            <a:r>
+              <a:rPr lang="da-DK" dirty="0"/>
+              <a:t>Kommunikation mellem føderationer</a:t>
+            </a:r>
+          </a:p>
+        </p:txBody>
+      </p:sp>
+      <p:sp>
+        <p:nvSpPr>
+          <p:cNvPr id="4" name="Slide Number Placeholder 3">
+            <a:extLst>
+              <a:ext uri="{FF2B5EF4-FFF2-40B4-BE49-F238E27FC236}">
+                <a16:creationId xmlns:a16="http://schemas.microsoft.com/office/drawing/2014/main" id="{FFA5AB07-E28F-4137-A26A-63C1406ED05D}"/>
+              </a:ext>
+            </a:extLst>
+          </p:cNvPr>
+          <p:cNvSpPr>
+            <a:spLocks noGrp="1"/>
+          </p:cNvSpPr>
+          <p:nvPr>
+            <p:ph type="sldNum" sz="quarter" idx="12"/>
+          </p:nvPr>
+        </p:nvSpPr>
+        <p:spPr/>
+        <p:txBody>
+          <a:bodyPr/>
+          <a:lstStyle/>
+          <a:p>
+            <a:fld id="{80AE25ED-097C-4BDC-A7CE-FA97BD9CA3B5}" type="slidenum">
+              <a:rPr lang="da-DK" smtClean="0"/>
+              <a:pPr/>
+              <a:t>7</a:t>
+            </a:fld>
+            <a:endParaRPr lang="da-DK" dirty="0"/>
+          </a:p>
+        </p:txBody>
+      </p:sp>
+      <p:sp>
+        <p:nvSpPr>
+          <p:cNvPr id="5" name="Rectangle: Rounded Corners 4">
+            <a:extLst>
+              <a:ext uri="{FF2B5EF4-FFF2-40B4-BE49-F238E27FC236}">
+                <a16:creationId xmlns:a16="http://schemas.microsoft.com/office/drawing/2014/main" id="{ACC9E7C4-EEA7-4B8C-A5B3-4EFDE8A8AA0B}"/>
+              </a:ext>
+            </a:extLst>
+          </p:cNvPr>
+          <p:cNvSpPr/>
+          <p:nvPr/>
+        </p:nvSpPr>
+        <p:spPr>
+          <a:xfrm>
+            <a:off x="2063283" y="2348880"/>
+            <a:ext cx="2303956" cy="2736304"/>
+          </a:xfrm>
+          <a:prstGeom prst="roundRect">
+            <a:avLst>
+              <a:gd name="adj" fmla="val 9516"/>
+            </a:avLst>
+          </a:prstGeom>
+          <a:noFill/>
+          <a:ln w="12700">
+            <a:solidFill>
+              <a:srgbClr val="808080"/>
+            </a:solidFill>
+            <a:prstDash val="dash"/>
+          </a:ln>
+          <a:effectLst/>
+        </p:spPr>
+        <p:style>
+          <a:lnRef idx="1">
+            <a:schemeClr val="accent1"/>
+          </a:lnRef>
+          <a:fillRef idx="3">
+            <a:schemeClr val="accent1"/>
+          </a:fillRef>
+          <a:effectRef idx="2">
+            <a:schemeClr val="accent1"/>
+          </a:effectRef>
+          <a:fontRef idx="minor">
+            <a:schemeClr val="lt1"/>
+          </a:fontRef>
+        </p:style>
+        <p:txBody>
+          <a:bodyPr lIns="121917" tIns="60958" rIns="121917" bIns="60958" rtlCol="0" anchor="t" anchorCtr="0"/>
+          <a:lstStyle/>
+          <a:p>
+            <a:pPr algn="ctr"/>
+            <a:r>
+              <a:rPr lang="da-DK" sz="1600" dirty="0">
+                <a:solidFill>
+                  <a:srgbClr val="940027"/>
+                </a:solidFill>
+              </a:rPr>
+              <a:t>Føderation A</a:t>
+            </a:r>
+          </a:p>
+        </p:txBody>
+      </p:sp>
+      <p:sp>
+        <p:nvSpPr>
+          <p:cNvPr id="6" name="Rectangle: Rounded Corners 5">
+            <a:extLst>
+              <a:ext uri="{FF2B5EF4-FFF2-40B4-BE49-F238E27FC236}">
+                <a16:creationId xmlns:a16="http://schemas.microsoft.com/office/drawing/2014/main" id="{33097F5C-9B69-4F9F-A84A-2DAD5F01DE1D}"/>
+              </a:ext>
+            </a:extLst>
+          </p:cNvPr>
+          <p:cNvSpPr/>
+          <p:nvPr/>
+        </p:nvSpPr>
+        <p:spPr>
+          <a:xfrm>
+            <a:off x="6384332" y="2348880"/>
+            <a:ext cx="2303956" cy="2736304"/>
+          </a:xfrm>
+          <a:prstGeom prst="roundRect">
+            <a:avLst>
+              <a:gd name="adj" fmla="val 11304"/>
+            </a:avLst>
+          </a:prstGeom>
+          <a:noFill/>
+          <a:ln w="12700">
+            <a:solidFill>
+              <a:srgbClr val="808080"/>
+            </a:solidFill>
+            <a:prstDash val="dash"/>
+          </a:ln>
+          <a:effectLst/>
+        </p:spPr>
+        <p:style>
+          <a:lnRef idx="1">
+            <a:schemeClr val="accent1"/>
+          </a:lnRef>
+          <a:fillRef idx="3">
+            <a:schemeClr val="accent1"/>
+          </a:fillRef>
+          <a:effectRef idx="2">
+            <a:schemeClr val="accent1"/>
+          </a:effectRef>
+          <a:fontRef idx="minor">
+            <a:schemeClr val="lt1"/>
+          </a:fontRef>
+        </p:style>
+        <p:txBody>
+          <a:bodyPr lIns="121917" tIns="60958" rIns="121917" bIns="60958" rtlCol="0" anchor="t" anchorCtr="0"/>
+          <a:lstStyle/>
+          <a:p>
+            <a:pPr algn="ctr"/>
+            <a:r>
+              <a:rPr lang="da-DK" sz="1600" dirty="0">
+                <a:solidFill>
+                  <a:srgbClr val="940027"/>
+                </a:solidFill>
+              </a:rPr>
+              <a:t>Føderation B</a:t>
+            </a:r>
+          </a:p>
+        </p:txBody>
+      </p:sp>
+      <p:pic>
+        <p:nvPicPr>
+          <p:cNvPr id="7" name="Picture 2">
+            <a:extLst>
+              <a:ext uri="{FF2B5EF4-FFF2-40B4-BE49-F238E27FC236}">
+                <a16:creationId xmlns:a16="http://schemas.microsoft.com/office/drawing/2014/main" id="{0C29C31C-B32F-42B4-BF05-730D41FB078B}"/>
+              </a:ext>
+            </a:extLst>
+          </p:cNvPr>
+          <p:cNvPicPr>
+            <a:picLocks noChangeAspect="1" noChangeArrowheads="1"/>
+          </p:cNvPicPr>
+          <p:nvPr/>
+        </p:nvPicPr>
+        <p:blipFill>
+          <a:blip r:embed="rId2">
+            <a:duotone>
+              <a:schemeClr val="bg2">
+                <a:shade val="45000"/>
+                <a:satMod val="135000"/>
+              </a:schemeClr>
+              <a:prstClr val="white"/>
+            </a:duotone>
+            <a:extLst>
+              <a:ext uri="{28A0092B-C50C-407E-A947-70E740481C1C}">
+                <a14:useLocalDpi xmlns:a14="http://schemas.microsoft.com/office/drawing/2010/main" val="0"/>
+              </a:ext>
+            </a:extLst>
+          </a:blip>
+          <a:srcRect/>
+          <a:stretch>
+            <a:fillRect/>
+          </a:stretch>
+        </p:blipFill>
+        <p:spPr bwMode="auto">
+          <a:xfrm>
+            <a:off x="2707327" y="3035539"/>
+            <a:ext cx="1015868" cy="876503"/>
+          </a:xfrm>
+          <a:prstGeom prst="rect">
+            <a:avLst/>
+          </a:prstGeom>
+          <a:noFill/>
+          <a:ln>
+            <a:noFill/>
+          </a:ln>
+          <a:extLst>
+            <a:ext uri="{909E8E84-426E-40DD-AFC4-6F175D3DCCD1}">
+              <a14:hiddenFill xmlns:a14="http://schemas.microsoft.com/office/drawing/2010/main">
+                <a:solidFill>
+                  <a:schemeClr val="accent1"/>
+                </a:solidFill>
+              </a14:hiddenFill>
+            </a:ext>
+            <a:ext uri="{91240B29-F687-4F45-9708-019B960494DF}">
+              <a14:hiddenLine xmlns:a14="http://schemas.microsoft.com/office/drawing/2010/main" w="9525">
+                <a:solidFill>
+                  <a:schemeClr val="tx1"/>
+                </a:solidFill>
+                <a:miter lim="800000"/>
+                <a:headEnd/>
+                <a:tailEnd/>
+              </a14:hiddenLine>
+            </a:ext>
+          </a:extLst>
+        </p:spPr>
+      </p:pic>
+      <p:pic>
+        <p:nvPicPr>
+          <p:cNvPr id="8" name="Picture 3">
+            <a:extLst>
+              <a:ext uri="{FF2B5EF4-FFF2-40B4-BE49-F238E27FC236}">
+                <a16:creationId xmlns:a16="http://schemas.microsoft.com/office/drawing/2014/main" id="{669AC5B0-1CD3-40F8-9059-ABAFFB40D84A}"/>
+              </a:ext>
+            </a:extLst>
+          </p:cNvPr>
+          <p:cNvPicPr>
+            <a:picLocks noChangeAspect="1" noChangeArrowheads="1"/>
+          </p:cNvPicPr>
+          <p:nvPr/>
+        </p:nvPicPr>
+        <p:blipFill>
+          <a:blip r:embed="rId2">
+            <a:duotone>
+              <a:schemeClr val="bg2">
+                <a:shade val="45000"/>
+                <a:satMod val="135000"/>
+              </a:schemeClr>
+              <a:prstClr val="white"/>
+            </a:duotone>
+            <a:extLst>
+              <a:ext uri="{28A0092B-C50C-407E-A947-70E740481C1C}">
+                <a14:useLocalDpi xmlns:a14="http://schemas.microsoft.com/office/drawing/2010/main" val="0"/>
+              </a:ext>
+            </a:extLst>
+          </a:blip>
+          <a:srcRect/>
+          <a:stretch>
+            <a:fillRect/>
+          </a:stretch>
+        </p:blipFill>
+        <p:spPr bwMode="auto">
+          <a:xfrm>
+            <a:off x="6988264" y="3129489"/>
+            <a:ext cx="1015868" cy="876503"/>
+          </a:xfrm>
+          <a:prstGeom prst="rect">
+            <a:avLst/>
+          </a:prstGeom>
+          <a:noFill/>
+          <a:ln>
+            <a:noFill/>
+          </a:ln>
+          <a:extLst>
+            <a:ext uri="{909E8E84-426E-40DD-AFC4-6F175D3DCCD1}">
+              <a14:hiddenFill xmlns:a14="http://schemas.microsoft.com/office/drawing/2010/main">
+                <a:solidFill>
+                  <a:schemeClr val="accent1"/>
+                </a:solidFill>
+              </a14:hiddenFill>
+            </a:ext>
+            <a:ext uri="{91240B29-F687-4F45-9708-019B960494DF}">
+              <a14:hiddenLine xmlns:a14="http://schemas.microsoft.com/office/drawing/2010/main" w="9525">
+                <a:solidFill>
+                  <a:schemeClr val="tx1"/>
+                </a:solidFill>
+                <a:miter lim="800000"/>
+                <a:headEnd/>
+                <a:tailEnd/>
+              </a14:hiddenLine>
+            </a:ext>
+          </a:extLst>
+        </p:spPr>
+      </p:pic>
+      <p:sp>
+        <p:nvSpPr>
+          <p:cNvPr id="9" name="TextBox 8">
+            <a:extLst>
+              <a:ext uri="{FF2B5EF4-FFF2-40B4-BE49-F238E27FC236}">
+                <a16:creationId xmlns:a16="http://schemas.microsoft.com/office/drawing/2014/main" id="{1A23BF06-D9CE-46B5-8436-337AB1AF7D1D}"/>
+              </a:ext>
+            </a:extLst>
+          </p:cNvPr>
+          <p:cNvSpPr txBox="1"/>
+          <p:nvPr/>
+        </p:nvSpPr>
+        <p:spPr bwMode="auto">
+          <a:xfrm>
+            <a:off x="2332575" y="4005991"/>
+            <a:ext cx="1919963" cy="196657"/>
+          </a:xfrm>
+          <a:prstGeom prst="rect">
+            <a:avLst/>
+          </a:prstGeom>
+          <a:noFill/>
+          <a:ln w="9525">
+            <a:noFill/>
+            <a:miter lim="800000"/>
+            <a:headEnd/>
+            <a:tailEnd/>
+          </a:ln>
+          <a:effectLst/>
+        </p:spPr>
+        <p:txBody>
+          <a:bodyPr vert="horz" wrap="square" lIns="47999" tIns="0" rIns="0" bIns="0" numCol="1" rtlCol="0" anchor="t" anchorCtr="0" compatLnSpc="1">
+            <a:prstTxWarp prst="textNoShape">
+              <a:avLst/>
+            </a:prstTxWarp>
+            <a:spAutoFit/>
+          </a:bodyPr>
+          <a:lstStyle/>
+          <a:p>
+            <a:pPr marL="16933" indent="-33866" defTabSz="609585" eaLnBrk="0" hangingPunct="0">
+              <a:spcAft>
+                <a:spcPts val="2000"/>
+              </a:spcAft>
+            </a:pPr>
+            <a:r>
+              <a:rPr lang="da-DK" sz="1300" dirty="0">
+                <a:solidFill>
+                  <a:srgbClr val="808080"/>
+                </a:solidFill>
+                <a:latin typeface="Verdana"/>
+                <a:cs typeface="ＭＳ Ｐゴシック" pitchFamily="-111" charset="-128"/>
+              </a:rPr>
+              <a:t>Interne standarder</a:t>
+            </a:r>
+          </a:p>
+        </p:txBody>
+      </p:sp>
+      <p:sp>
+        <p:nvSpPr>
+          <p:cNvPr id="10" name="TextBox 9">
+            <a:extLst>
+              <a:ext uri="{FF2B5EF4-FFF2-40B4-BE49-F238E27FC236}">
+                <a16:creationId xmlns:a16="http://schemas.microsoft.com/office/drawing/2014/main" id="{CA83767E-97D0-4C9D-BD15-9C0C1007C9C3}"/>
+              </a:ext>
+            </a:extLst>
+          </p:cNvPr>
+          <p:cNvSpPr txBox="1"/>
+          <p:nvPr/>
+        </p:nvSpPr>
+        <p:spPr bwMode="auto">
+          <a:xfrm>
+            <a:off x="6768325" y="4005991"/>
+            <a:ext cx="1919963" cy="196657"/>
+          </a:xfrm>
+          <a:prstGeom prst="rect">
+            <a:avLst/>
+          </a:prstGeom>
+          <a:noFill/>
+          <a:ln w="9525">
+            <a:noFill/>
+            <a:miter lim="800000"/>
+            <a:headEnd/>
+            <a:tailEnd/>
+          </a:ln>
+          <a:effectLst/>
+        </p:spPr>
+        <p:txBody>
+          <a:bodyPr vert="horz" wrap="square" lIns="47999" tIns="0" rIns="0" bIns="0" numCol="1" rtlCol="0" anchor="t" anchorCtr="0" compatLnSpc="1">
+            <a:prstTxWarp prst="textNoShape">
+              <a:avLst/>
+            </a:prstTxWarp>
+            <a:spAutoFit/>
+          </a:bodyPr>
+          <a:lstStyle/>
+          <a:p>
+            <a:pPr marL="16933" indent="-33866" defTabSz="609585" eaLnBrk="0" hangingPunct="0">
+              <a:spcAft>
+                <a:spcPts val="2000"/>
+              </a:spcAft>
+            </a:pPr>
+            <a:r>
+              <a:rPr lang="da-DK" sz="1300" dirty="0">
+                <a:solidFill>
+                  <a:srgbClr val="808080"/>
+                </a:solidFill>
+                <a:latin typeface="Verdana"/>
+                <a:cs typeface="ＭＳ Ｐゴシック" pitchFamily="-111" charset="-128"/>
+              </a:rPr>
+              <a:t>Interne standarder</a:t>
+            </a:r>
+          </a:p>
+        </p:txBody>
+      </p:sp>
+      <p:sp>
+        <p:nvSpPr>
+          <p:cNvPr id="11" name="Left-Right Arrow 5">
+            <a:extLst>
+              <a:ext uri="{FF2B5EF4-FFF2-40B4-BE49-F238E27FC236}">
+                <a16:creationId xmlns:a16="http://schemas.microsoft.com/office/drawing/2014/main" id="{3655467A-3574-43AF-A50A-D8EF5520CA41}"/>
+              </a:ext>
+            </a:extLst>
+          </p:cNvPr>
+          <p:cNvSpPr/>
+          <p:nvPr/>
+        </p:nvSpPr>
+        <p:spPr>
+          <a:xfrm>
+            <a:off x="4800006" y="3237728"/>
+            <a:ext cx="1151978" cy="768263"/>
+          </a:xfrm>
+          <a:prstGeom prst="leftRightArrow">
+            <a:avLst/>
+          </a:prstGeom>
+          <a:noFill/>
+          <a:ln w="12700">
+            <a:solidFill>
+              <a:srgbClr val="808080"/>
+            </a:solidFill>
+          </a:ln>
+          <a:effectLst/>
+        </p:spPr>
+        <p:style>
+          <a:lnRef idx="1">
+            <a:schemeClr val="accent1"/>
+          </a:lnRef>
+          <a:fillRef idx="3">
+            <a:schemeClr val="accent1"/>
+          </a:fillRef>
+          <a:effectRef idx="2">
+            <a:schemeClr val="accent1"/>
+          </a:effectRef>
+          <a:fontRef idx="minor">
+            <a:schemeClr val="lt1"/>
+          </a:fontRef>
+        </p:style>
+        <p:txBody>
+          <a:bodyPr lIns="121917" tIns="60958" rIns="121917" bIns="60958" rtlCol="0" anchor="ctr"/>
+          <a:lstStyle/>
+          <a:p>
+            <a:pPr algn="ctr"/>
+            <a:endParaRPr lang="da-DK" dirty="0">
+              <a:ln w="38100">
+                <a:solidFill>
+                  <a:schemeClr val="tx1"/>
+                </a:solidFill>
+              </a:ln>
+            </a:endParaRPr>
+          </a:p>
+        </p:txBody>
+      </p:sp>
+      <p:sp>
+        <p:nvSpPr>
+          <p:cNvPr id="12" name="TextBox 11">
+            <a:extLst>
+              <a:ext uri="{FF2B5EF4-FFF2-40B4-BE49-F238E27FC236}">
+                <a16:creationId xmlns:a16="http://schemas.microsoft.com/office/drawing/2014/main" id="{52FE6539-C446-432F-8731-B05E6C3646FE}"/>
+              </a:ext>
+            </a:extLst>
+          </p:cNvPr>
+          <p:cNvSpPr txBox="1"/>
+          <p:nvPr/>
+        </p:nvSpPr>
+        <p:spPr bwMode="auto">
+          <a:xfrm>
+            <a:off x="4378194" y="4135047"/>
+            <a:ext cx="1919963" cy="628826"/>
+          </a:xfrm>
+          <a:prstGeom prst="rect">
+            <a:avLst/>
+          </a:prstGeom>
+          <a:noFill/>
+          <a:ln w="9525">
+            <a:noFill/>
+            <a:miter lim="800000"/>
+            <a:headEnd/>
+            <a:tailEnd/>
+          </a:ln>
+          <a:effectLst/>
+        </p:spPr>
+        <p:txBody>
+          <a:bodyPr vert="horz" wrap="square" lIns="47999" tIns="0" rIns="0" bIns="0" numCol="1" rtlCol="0" anchor="t" anchorCtr="0" compatLnSpc="1">
+            <a:prstTxWarp prst="textNoShape">
+              <a:avLst/>
+            </a:prstTxWarp>
+            <a:spAutoFit/>
+          </a:bodyPr>
+          <a:lstStyle/>
+          <a:p>
+            <a:pPr marL="16933" indent="-33866" algn="ctr" defTabSz="609585" eaLnBrk="0" hangingPunct="0">
+              <a:spcAft>
+                <a:spcPts val="2000"/>
+              </a:spcAft>
+            </a:pPr>
+            <a:r>
+              <a:rPr lang="da-DK" sz="1300" dirty="0">
+                <a:solidFill>
+                  <a:srgbClr val="808080"/>
+                </a:solidFill>
+                <a:latin typeface="Verdana"/>
+                <a:cs typeface="ＭＳ Ｐゴシック" pitchFamily="-111" charset="-128"/>
+              </a:rPr>
+              <a:t>Standarder for kommunikation mellem føderationer</a:t>
+            </a:r>
+          </a:p>
+        </p:txBody>
+      </p:sp>
+    </p:spTree>
+    <p:extLst>
+      <p:ext uri="{BB962C8B-B14F-4D97-AF65-F5344CB8AC3E}">
+        <p14:creationId xmlns:p14="http://schemas.microsoft.com/office/powerpoint/2010/main" val="4081548833"/>
+      </p:ext>
+    </p:extLst>
+  </p:cSld>
+  <p:clrMapOvr>
+    <a:masterClrMapping/>
+  </p:clrMapOvr>
+</p:sld>
+</file>
+
+<file path=ppt/slides/slide8.xml><?xml version="1.0" encoding="utf-8"?>
+<p:sld xmlns:a="http://schemas.openxmlformats.org/drawingml/2006/main" xmlns:r="http://schemas.openxmlformats.org/officeDocument/2006/relationships" xmlns:p="http://schemas.openxmlformats.org/presentationml/2006/main">
+  <p:cSld>
+    <p:spTree>
+      <p:nvGrpSpPr>
+        <p:cNvPr id="1" name=""/>
+        <p:cNvGrpSpPr/>
+        <p:nvPr/>
+      </p:nvGrpSpPr>
+      <p:grpSpPr>
+        <a:xfrm>
+          <a:off x="0" y="0"/>
+          <a:ext cx="0" cy="0"/>
+          <a:chOff x="0" y="0"/>
+          <a:chExt cx="0" cy="0"/>
+        </a:xfrm>
+      </p:grpSpPr>
+      <p:sp>
+        <p:nvSpPr>
+          <p:cNvPr id="2" name="Title 1">
+            <a:extLst>
+              <a:ext uri="{FF2B5EF4-FFF2-40B4-BE49-F238E27FC236}">
                 <a16:creationId xmlns:a16="http://schemas.microsoft.com/office/drawing/2014/main" id="{56B6C2B6-EE19-4F2B-9A37-321D57A3E755}"/>
               </a:ext>
             </a:extLst>
@@ -14790,7 +15360,7 @@
             <a:fld id="{80AE25ED-097C-4BDC-A7CE-FA97BD9CA3B5}" type="slidenum">
               <a:rPr lang="da-DK" smtClean="0"/>
               <a:pPr/>
-              <a:t>7</a:t>
+              <a:t>8</a:t>
             </a:fld>
             <a:endParaRPr lang="da-DK" dirty="0"/>
           </a:p>
@@ -15899,7 +16469,7 @@
 </p:sld>
 </file>
 
-<file path=ppt/slides/slide8.xml><?xml version="1.0" encoding="utf-8"?>
+<file path=ppt/slides/slide9.xml><?xml version="1.0" encoding="utf-8"?>
 <p:sld xmlns:a="http://schemas.openxmlformats.org/drawingml/2006/main" xmlns:r="http://schemas.openxmlformats.org/officeDocument/2006/relationships" xmlns:p="http://schemas.openxmlformats.org/presentationml/2006/main">
   <p:cSld>
     <p:spTree>
@@ -15968,7 +16538,7 @@
             <a:fld id="{80AE25ED-097C-4BDC-A7CE-FA97BD9CA3B5}" type="slidenum">
               <a:rPr lang="da-DK" smtClean="0"/>
               <a:pPr/>
-              <a:t>8</a:t>
+              <a:t>9</a:t>
             </a:fld>
             <a:endParaRPr lang="da-DK" dirty="0"/>
           </a:p>

</xml_diff>

<commit_message>
Rettelser fra internt review
</commit_message>
<xml_diff>
--- a/Figurer.pptx
+++ b/Figurer.pptx
@@ -1705,7 +1705,7 @@
           <a:p>
             <a:fld id="{D709F18B-C64D-467D-95E0-03999A31A181}" type="datetime1">
               <a:rPr lang="da-DK" smtClean="0"/>
-              <a:t>30-01-2020</a:t>
+              <a:t>18-02-2020</a:t>
             </a:fld>
             <a:endParaRPr lang="da-DK" dirty="0"/>
           </a:p>
@@ -1994,7 +1994,7 @@
           <a:p>
             <a:fld id="{D709F18B-C64D-467D-95E0-03999A31A181}" type="datetime1">
               <a:rPr lang="da-DK" smtClean="0"/>
-              <a:t>30-01-2020</a:t>
+              <a:t>18-02-2020</a:t>
             </a:fld>
             <a:endParaRPr lang="da-DK" dirty="0"/>
           </a:p>
@@ -2320,7 +2320,7 @@
           <a:p>
             <a:fld id="{D709F18B-C64D-467D-95E0-03999A31A181}" type="datetime1">
               <a:rPr lang="da-DK" smtClean="0"/>
-              <a:t>30-01-2020</a:t>
+              <a:t>18-02-2020</a:t>
             </a:fld>
             <a:endParaRPr lang="da-DK" dirty="0"/>
           </a:p>
@@ -3116,7 +3116,7 @@
           <a:p>
             <a:fld id="{D709F18B-C64D-467D-95E0-03999A31A181}" type="datetime1">
               <a:rPr lang="da-DK" smtClean="0"/>
-              <a:t>30-01-2020</a:t>
+              <a:t>18-02-2020</a:t>
             </a:fld>
             <a:endParaRPr lang="da-DK" dirty="0"/>
           </a:p>
@@ -3233,7 +3233,7 @@
           <a:p>
             <a:fld id="{D709F18B-C64D-467D-95E0-03999A31A181}" type="datetime1">
               <a:rPr lang="da-DK" smtClean="0"/>
-              <a:t>30-01-2020</a:t>
+              <a:t>18-02-2020</a:t>
             </a:fld>
             <a:endParaRPr lang="da-DK" dirty="0"/>
           </a:p>
@@ -3344,7 +3344,7 @@
             <a:fld id="{ED5F2DD1-FF2E-4A6A-A9E9-8BE1BCFC17F4}" type="datetime1">
               <a:rPr lang="da-DK" smtClean="0"/>
               <a:pPr/>
-              <a:t>30-01-2020</a:t>
+              <a:t>18-02-2020</a:t>
             </a:fld>
             <a:endParaRPr lang="da-DK" dirty="0"/>
           </a:p>
@@ -3446,7 +3446,6 @@
             <a:tailEnd type="none" w="med" len="med"/>
           </a:ln>
           <a:effectLst/>
-          <a:extLst/>
         </p:spPr>
         <p:txBody>
           <a:bodyPr vert="horz" wrap="square" lIns="0" tIns="0" rIns="0" bIns="0" numCol="1" rtlCol="0" anchor="t" anchorCtr="0" compatLnSpc="1">
@@ -3679,7 +3678,7 @@
           <a:p>
             <a:fld id="{D709F18B-C64D-467D-95E0-03999A31A181}" type="datetime1">
               <a:rPr lang="da-DK" smtClean="0"/>
-              <a:t>30-01-2020</a:t>
+              <a:t>18-02-2020</a:t>
             </a:fld>
             <a:endParaRPr lang="da-DK" dirty="0"/>
           </a:p>
@@ -3878,7 +3877,7 @@
           <a:p>
             <a:fld id="{D709F18B-C64D-467D-95E0-03999A31A181}" type="datetime1">
               <a:rPr lang="da-DK" smtClean="0"/>
-              <a:t>30-01-2020</a:t>
+              <a:t>18-02-2020</a:t>
             </a:fld>
             <a:endParaRPr lang="da-DK" dirty="0"/>
           </a:p>
@@ -4098,7 +4097,7 @@
           <a:p>
             <a:fld id="{D709F18B-C64D-467D-95E0-03999A31A181}" type="datetime1">
               <a:rPr lang="da-DK" smtClean="0"/>
-              <a:t>30-01-2020</a:t>
+              <a:t>18-02-2020</a:t>
             </a:fld>
             <a:endParaRPr lang="da-DK" dirty="0"/>
           </a:p>
@@ -4560,7 +4559,7 @@
           <a:p>
             <a:fld id="{D709F18B-C64D-467D-95E0-03999A31A181}" type="datetime1">
               <a:rPr lang="da-DK" smtClean="0"/>
-              <a:t>30-01-2020</a:t>
+              <a:t>18-02-2020</a:t>
             </a:fld>
             <a:endParaRPr lang="da-DK" dirty="0"/>
           </a:p>
@@ -5116,7 +5115,7 @@
           <a:p>
             <a:fld id="{D709F18B-C64D-467D-95E0-03999A31A181}" type="datetime1">
               <a:rPr lang="da-DK" smtClean="0"/>
-              <a:t>30-01-2020</a:t>
+              <a:t>18-02-2020</a:t>
             </a:fld>
             <a:endParaRPr lang="da-DK" dirty="0"/>
           </a:p>
@@ -5406,7 +5405,7 @@
           <a:p>
             <a:fld id="{D709F18B-C64D-467D-95E0-03999A31A181}" type="datetime1">
               <a:rPr lang="da-DK" smtClean="0"/>
-              <a:t>30-01-2020</a:t>
+              <a:t>18-02-2020</a:t>
             </a:fld>
             <a:endParaRPr lang="da-DK" dirty="0"/>
           </a:p>
@@ -5823,7 +5822,7 @@
           <a:p>
             <a:fld id="{D709F18B-C64D-467D-95E0-03999A31A181}" type="datetime1">
               <a:rPr lang="da-DK" smtClean="0"/>
-              <a:t>30-01-2020</a:t>
+              <a:t>18-02-2020</a:t>
             </a:fld>
             <a:endParaRPr lang="da-DK" dirty="0"/>
           </a:p>
@@ -6130,7 +6129,7 @@
           <a:p>
             <a:fld id="{D709F18B-C64D-467D-95E0-03999A31A181}" type="datetime1">
               <a:rPr lang="da-DK" smtClean="0"/>
-              <a:t>30-01-2020</a:t>
+              <a:t>18-02-2020</a:t>
             </a:fld>
             <a:endParaRPr lang="da-DK" dirty="0"/>
           </a:p>
@@ -6469,7 +6468,6 @@
             <a:noFill/>
           </a:ln>
           <a:effectLst/>
-          <a:extLst/>
         </p:spPr>
         <p:txBody>
           <a:bodyPr wrap="none" lIns="0" tIns="0" rIns="0" bIns="0" anchor="ctr"/>
@@ -6537,7 +6535,7 @@
           <a:p>
             <a:fld id="{D709F18B-C64D-467D-95E0-03999A31A181}" type="datetime1">
               <a:rPr lang="da-DK" smtClean="0"/>
-              <a:t>30-01-2020</a:t>
+              <a:t>18-02-2020</a:t>
             </a:fld>
             <a:endParaRPr lang="da-DK" dirty="0"/>
           </a:p>
@@ -7084,7 +7082,7 @@
           <a:p>
             <a:fld id="{D709F18B-C64D-467D-95E0-03999A31A181}" type="datetime1">
               <a:rPr lang="da-DK" smtClean="0"/>
-              <a:t>30-01-2020</a:t>
+              <a:t>18-02-2020</a:t>
             </a:fld>
             <a:endParaRPr lang="da-DK" dirty="0"/>
           </a:p>
@@ -7845,7 +7843,7 @@
       </a:lvl9pPr>
     </p:otherStyle>
   </p:txStyles>
-  <p:extLst mod="1">
+  <p:extLst>
     <p:ext uri="{27BBF7A9-308A-43DC-89C8-2F10F3537804}">
       <p15:sldGuideLst xmlns:p15="http://schemas.microsoft.com/office/powerpoint/2012/main">
         <p15:guide id="1" pos="442" userDrawn="1">
@@ -8007,7 +8005,6 @@
             <a:tailEnd type="none" w="med" len="med"/>
           </a:ln>
           <a:effectLst/>
-          <a:extLst/>
         </p:spPr>
         <p:txBody>
           <a:bodyPr vert="horz" wrap="none" lIns="90000" tIns="46800" rIns="90000" bIns="46800" numCol="1" rtlCol="0" anchor="ctr" anchorCtr="0" compatLnSpc="1">
@@ -8132,7 +8129,6 @@
             <a:tailEnd type="none" w="med" len="med"/>
           </a:ln>
           <a:effectLst/>
-          <a:extLst/>
         </p:spPr>
         <p:txBody>
           <a:bodyPr vert="horz" wrap="square" lIns="90000" tIns="46800" rIns="90000" bIns="46800" numCol="1" rtlCol="0" anchor="ctr" anchorCtr="0" compatLnSpc="1">
@@ -8207,7 +8203,6 @@
             <a:tailEnd type="none" w="med" len="med"/>
           </a:ln>
           <a:effectLst/>
-          <a:extLst/>
         </p:spPr>
         <p:txBody>
           <a:bodyPr vert="horz" wrap="none" lIns="90000" tIns="46800" rIns="90000" bIns="46800" numCol="1" rtlCol="0" anchor="ctr" anchorCtr="0" compatLnSpc="1">
@@ -8885,7 +8880,6 @@
               <a:tailEnd type="none" w="med" len="med"/>
             </a:ln>
             <a:effectLst/>
-            <a:extLst/>
           </p:spPr>
           <p:txBody>
             <a:bodyPr vert="horz" wrap="square" lIns="90000" tIns="46800" rIns="90000" bIns="46800" numCol="1" rtlCol="0" anchor="ctr" anchorCtr="0" compatLnSpc="1">
@@ -8955,7 +8949,6 @@
               <a:tailEnd type="none" w="med" len="med"/>
             </a:ln>
             <a:effectLst/>
-            <a:extLst/>
           </p:spPr>
           <p:txBody>
             <a:bodyPr vert="horz" wrap="square" lIns="90000" tIns="46800" rIns="90000" bIns="46800" numCol="1" rtlCol="0" anchor="ctr" anchorCtr="0" compatLnSpc="1">
@@ -9234,7 +9227,6 @@
               <a:tailEnd type="none" w="med" len="med"/>
             </a:ln>
             <a:effectLst/>
-            <a:extLst/>
           </p:spPr>
           <p:txBody>
             <a:bodyPr vert="horz" wrap="square" lIns="90000" tIns="46800" rIns="90000" bIns="46800" numCol="1" rtlCol="0" anchor="ctr" anchorCtr="0" compatLnSpc="1">
@@ -9304,7 +9296,6 @@
               <a:tailEnd type="none" w="med" len="med"/>
             </a:ln>
             <a:effectLst/>
-            <a:extLst/>
           </p:spPr>
           <p:txBody>
             <a:bodyPr vert="horz" wrap="square" lIns="90000" tIns="46800" rIns="90000" bIns="46800" numCol="1" rtlCol="0" anchor="ctr" anchorCtr="0" compatLnSpc="1">
@@ -9643,7 +9634,6 @@
             <a:tailEnd type="none" w="med" len="med"/>
           </a:ln>
           <a:effectLst/>
-          <a:extLst/>
         </p:spPr>
         <p:txBody>
           <a:bodyPr vert="horz" wrap="square" lIns="90000" tIns="46800" rIns="90000" bIns="46800" numCol="1" rtlCol="0" anchor="ctr" anchorCtr="0" compatLnSpc="1">
@@ -9716,7 +9706,6 @@
             <a:tailEnd type="none" w="med" len="med"/>
           </a:ln>
           <a:effectLst/>
-          <a:extLst/>
         </p:spPr>
         <p:txBody>
           <a:bodyPr vert="horz" wrap="square" lIns="90000" tIns="46800" rIns="90000" bIns="46800" numCol="1" rtlCol="0" anchor="ctr" anchorCtr="0" compatLnSpc="1">
@@ -9939,7 +9928,6 @@
             <a:tailEnd type="none" w="med" len="med"/>
           </a:ln>
           <a:effectLst/>
-          <a:extLst/>
         </p:spPr>
         <p:txBody>
           <a:bodyPr vert="horz" wrap="square" lIns="90000" tIns="46800" rIns="90000" bIns="46800" numCol="1" rtlCol="0" anchor="ctr" anchorCtr="0" compatLnSpc="1">
@@ -12310,7 +12298,7 @@
                   <a:schemeClr val="tx1"/>
                 </a:solidFill>
               </a:rPr>
-              <a:t>Registrerer attributter for  identitetskarakteristika,  roller i organisationen, sikkerhedsklassificering og andre attributsæt.</a:t>
+              <a:t>Registrerer attributter for  identitetskarakteristika, roller i organisationen, sikkerhedsklassificering og andre attributsæt.</a:t>
             </a:r>
           </a:p>
         </p:txBody>
@@ -15435,7 +15423,6 @@
             <a:tailEnd type="none" w="med" len="med"/>
           </a:ln>
           <a:effectLst/>
-          <a:extLst/>
         </p:spPr>
         <p:txBody>
           <a:bodyPr vert="horz" wrap="square" lIns="90000" tIns="46800" rIns="90000" bIns="46800" numCol="1" rtlCol="0" anchor="ctr" anchorCtr="0" compatLnSpc="1">
@@ -15831,7 +15818,6 @@
             <a:tailEnd type="none" w="med" len="med"/>
           </a:ln>
           <a:effectLst/>
-          <a:extLst/>
         </p:spPr>
         <p:txBody>
           <a:bodyPr vert="vert" wrap="square" lIns="72000" tIns="46800" rIns="72000" bIns="46800" numCol="1" rtlCol="0" anchor="ctr" anchorCtr="0" compatLnSpc="1">
@@ -15913,7 +15899,6 @@
             <a:tailEnd type="none" w="med" len="med"/>
           </a:ln>
           <a:effectLst/>
-          <a:extLst/>
         </p:spPr>
         <p:txBody>
           <a:bodyPr vert="horz" wrap="square" lIns="90000" tIns="46800" rIns="90000" bIns="46800" numCol="1" rtlCol="0" anchor="ctr" anchorCtr="0" compatLnSpc="1">
@@ -15991,7 +15976,6 @@
             <a:tailEnd type="none" w="med" len="med"/>
           </a:ln>
           <a:effectLst/>
-          <a:extLst/>
         </p:spPr>
         <p:txBody>
           <a:bodyPr vert="horz" wrap="square" lIns="90000" tIns="46800" rIns="90000" bIns="46800" numCol="1" rtlCol="0" anchor="ctr" anchorCtr="0" compatLnSpc="1">
@@ -16069,7 +16053,6 @@
             <a:tailEnd type="none" w="med" len="med"/>
           </a:ln>
           <a:effectLst/>
-          <a:extLst/>
         </p:spPr>
         <p:txBody>
           <a:bodyPr vert="horz" wrap="square" lIns="90000" tIns="46800" rIns="90000" bIns="46800" numCol="1" rtlCol="0" anchor="ctr" anchorCtr="0" compatLnSpc="1">
@@ -16147,7 +16130,6 @@
             <a:tailEnd type="none" w="med" len="med"/>
           </a:ln>
           <a:effectLst/>
-          <a:extLst/>
         </p:spPr>
         <p:txBody>
           <a:bodyPr vert="horz" wrap="square" lIns="90000" tIns="46800" rIns="90000" bIns="46800" numCol="1" rtlCol="0" anchor="ctr" anchorCtr="0" compatLnSpc="1">
@@ -16401,7 +16383,6 @@
             <a:tailEnd type="none" w="med" len="med"/>
           </a:ln>
           <a:effectLst/>
-          <a:extLst/>
         </p:spPr>
         <p:txBody>
           <a:bodyPr vert="horz" wrap="square" lIns="90000" tIns="46800" rIns="90000" bIns="46800" numCol="1" rtlCol="0" anchor="ctr" anchorCtr="0" compatLnSpc="1">
@@ -16566,7 +16547,6 @@
             <a:tailEnd type="none" w="med" len="med"/>
           </a:ln>
           <a:effectLst/>
-          <a:extLst/>
         </p:spPr>
         <p:txBody>
           <a:bodyPr vert="horz" wrap="none" lIns="90000" tIns="46800" rIns="90000" bIns="46800" numCol="1" rtlCol="0" anchor="ctr" anchorCtr="0" compatLnSpc="1">
@@ -16641,7 +16621,6 @@
             <a:tailEnd type="none" w="med" len="med"/>
           </a:ln>
           <a:effectLst/>
-          <a:extLst/>
         </p:spPr>
         <p:txBody>
           <a:bodyPr vert="horz" wrap="none" lIns="90000" tIns="46800" rIns="90000" bIns="46800" numCol="1" rtlCol="0" anchor="ctr" anchorCtr="0" compatLnSpc="1">
@@ -16802,7 +16781,6 @@
             <a:tailEnd type="none" w="med" len="med"/>
           </a:ln>
           <a:effectLst/>
-          <a:extLst/>
         </p:spPr>
         <p:txBody>
           <a:bodyPr vert="horz" wrap="none" lIns="90000" tIns="46800" rIns="90000" bIns="46800" numCol="1" rtlCol="0" anchor="ctr" anchorCtr="0" compatLnSpc="1">
@@ -17661,7 +17639,6 @@
           <a:tailEnd type="none" w="med" len="med"/>
         </a:ln>
         <a:effectLst/>
-        <a:extLst/>
       </a:spPr>
       <a:bodyPr vert="horz" wrap="square" lIns="90000" tIns="46800" rIns="90000" bIns="46800" numCol="1" rtlCol="0" anchor="ctr" anchorCtr="0" compatLnSpc="1">
         <a:prstTxWarp prst="textNoShape">

</xml_diff>

<commit_message>
Rettelse af tekster i figurer
</commit_message>
<xml_diff>
--- a/Figurer.pptx
+++ b/Figurer.pptx
@@ -1705,7 +1705,7 @@
           <a:p>
             <a:fld id="{D709F18B-C64D-467D-95E0-03999A31A181}" type="datetime1">
               <a:rPr lang="da-DK" smtClean="0"/>
-              <a:t>19-02-2020</a:t>
+              <a:t>20-02-2020</a:t>
             </a:fld>
             <a:endParaRPr lang="da-DK" dirty="0"/>
           </a:p>
@@ -1994,7 +1994,7 @@
           <a:p>
             <a:fld id="{D709F18B-C64D-467D-95E0-03999A31A181}" type="datetime1">
               <a:rPr lang="da-DK" smtClean="0"/>
-              <a:t>19-02-2020</a:t>
+              <a:t>20-02-2020</a:t>
             </a:fld>
             <a:endParaRPr lang="da-DK" dirty="0"/>
           </a:p>
@@ -2320,7 +2320,7 @@
           <a:p>
             <a:fld id="{D709F18B-C64D-467D-95E0-03999A31A181}" type="datetime1">
               <a:rPr lang="da-DK" smtClean="0"/>
-              <a:t>19-02-2020</a:t>
+              <a:t>20-02-2020</a:t>
             </a:fld>
             <a:endParaRPr lang="da-DK" dirty="0"/>
           </a:p>
@@ -3116,7 +3116,7 @@
           <a:p>
             <a:fld id="{D709F18B-C64D-467D-95E0-03999A31A181}" type="datetime1">
               <a:rPr lang="da-DK" smtClean="0"/>
-              <a:t>19-02-2020</a:t>
+              <a:t>20-02-2020</a:t>
             </a:fld>
             <a:endParaRPr lang="da-DK" dirty="0"/>
           </a:p>
@@ -3233,7 +3233,7 @@
           <a:p>
             <a:fld id="{D709F18B-C64D-467D-95E0-03999A31A181}" type="datetime1">
               <a:rPr lang="da-DK" smtClean="0"/>
-              <a:t>19-02-2020</a:t>
+              <a:t>20-02-2020</a:t>
             </a:fld>
             <a:endParaRPr lang="da-DK" dirty="0"/>
           </a:p>
@@ -3344,7 +3344,7 @@
             <a:fld id="{ED5F2DD1-FF2E-4A6A-A9E9-8BE1BCFC17F4}" type="datetime1">
               <a:rPr lang="da-DK" smtClean="0"/>
               <a:pPr/>
-              <a:t>19-02-2020</a:t>
+              <a:t>20-02-2020</a:t>
             </a:fld>
             <a:endParaRPr lang="da-DK" dirty="0"/>
           </a:p>
@@ -3678,7 +3678,7 @@
           <a:p>
             <a:fld id="{D709F18B-C64D-467D-95E0-03999A31A181}" type="datetime1">
               <a:rPr lang="da-DK" smtClean="0"/>
-              <a:t>19-02-2020</a:t>
+              <a:t>20-02-2020</a:t>
             </a:fld>
             <a:endParaRPr lang="da-DK" dirty="0"/>
           </a:p>
@@ -3877,7 +3877,7 @@
           <a:p>
             <a:fld id="{D709F18B-C64D-467D-95E0-03999A31A181}" type="datetime1">
               <a:rPr lang="da-DK" smtClean="0"/>
-              <a:t>19-02-2020</a:t>
+              <a:t>20-02-2020</a:t>
             </a:fld>
             <a:endParaRPr lang="da-DK" dirty="0"/>
           </a:p>
@@ -4097,7 +4097,7 @@
           <a:p>
             <a:fld id="{D709F18B-C64D-467D-95E0-03999A31A181}" type="datetime1">
               <a:rPr lang="da-DK" smtClean="0"/>
-              <a:t>19-02-2020</a:t>
+              <a:t>20-02-2020</a:t>
             </a:fld>
             <a:endParaRPr lang="da-DK" dirty="0"/>
           </a:p>
@@ -4559,7 +4559,7 @@
           <a:p>
             <a:fld id="{D709F18B-C64D-467D-95E0-03999A31A181}" type="datetime1">
               <a:rPr lang="da-DK" smtClean="0"/>
-              <a:t>19-02-2020</a:t>
+              <a:t>20-02-2020</a:t>
             </a:fld>
             <a:endParaRPr lang="da-DK" dirty="0"/>
           </a:p>
@@ -5115,7 +5115,7 @@
           <a:p>
             <a:fld id="{D709F18B-C64D-467D-95E0-03999A31A181}" type="datetime1">
               <a:rPr lang="da-DK" smtClean="0"/>
-              <a:t>19-02-2020</a:t>
+              <a:t>20-02-2020</a:t>
             </a:fld>
             <a:endParaRPr lang="da-DK" dirty="0"/>
           </a:p>
@@ -5405,7 +5405,7 @@
           <a:p>
             <a:fld id="{D709F18B-C64D-467D-95E0-03999A31A181}" type="datetime1">
               <a:rPr lang="da-DK" smtClean="0"/>
-              <a:t>19-02-2020</a:t>
+              <a:t>20-02-2020</a:t>
             </a:fld>
             <a:endParaRPr lang="da-DK" dirty="0"/>
           </a:p>
@@ -5822,7 +5822,7 @@
           <a:p>
             <a:fld id="{D709F18B-C64D-467D-95E0-03999A31A181}" type="datetime1">
               <a:rPr lang="da-DK" smtClean="0"/>
-              <a:t>19-02-2020</a:t>
+              <a:t>20-02-2020</a:t>
             </a:fld>
             <a:endParaRPr lang="da-DK" dirty="0"/>
           </a:p>
@@ -6129,7 +6129,7 @@
           <a:p>
             <a:fld id="{D709F18B-C64D-467D-95E0-03999A31A181}" type="datetime1">
               <a:rPr lang="da-DK" smtClean="0"/>
-              <a:t>19-02-2020</a:t>
+              <a:t>20-02-2020</a:t>
             </a:fld>
             <a:endParaRPr lang="da-DK" dirty="0"/>
           </a:p>
@@ -6535,7 +6535,7 @@
           <a:p>
             <a:fld id="{D709F18B-C64D-467D-95E0-03999A31A181}" type="datetime1">
               <a:rPr lang="da-DK" smtClean="0"/>
-              <a:t>19-02-2020</a:t>
+              <a:t>20-02-2020</a:t>
             </a:fld>
             <a:endParaRPr lang="da-DK" dirty="0"/>
           </a:p>
@@ -7082,7 +7082,7 @@
           <a:p>
             <a:fld id="{D709F18B-C64D-467D-95E0-03999A31A181}" type="datetime1">
               <a:rPr lang="da-DK" smtClean="0"/>
-              <a:t>19-02-2020</a:t>
+              <a:t>20-02-2020</a:t>
             </a:fld>
             <a:endParaRPr lang="da-DK" dirty="0"/>
           </a:p>
@@ -8358,7 +8358,7 @@
         <p:spPr>
           <a:xfrm>
             <a:off x="3956676" y="3350630"/>
-            <a:ext cx="373500" cy="184666"/>
+            <a:ext cx="322204" cy="184666"/>
           </a:xfrm>
           <a:prstGeom prst="rect">
             <a:avLst/>
@@ -8385,7 +8385,7 @@
                   <a:srgbClr val="808080"/>
                 </a:solidFill>
               </a:rPr>
-              <a:t>Login</a:t>
+              <a:t>login</a:t>
             </a:r>
           </a:p>
         </p:txBody>
@@ -8432,7 +8432,7 @@
                   <a:srgbClr val="808080"/>
                 </a:solidFill>
               </a:rPr>
-              <a:t>Brugeroplysninger</a:t>
+              <a:t>brugeroplysninger</a:t>
             </a:r>
           </a:p>
         </p:txBody>
@@ -8523,7 +8523,7 @@
             <a:r>
               <a:rPr lang="da-DK" sz="1200" b="1" dirty="0">
                 <a:solidFill>
-                  <a:srgbClr val="940027"/>
+                  <a:srgbClr val="1F497D"/>
                 </a:solidFill>
               </a:rPr>
               <a:t>tjenesteudbyder</a:t>
@@ -10011,7 +10011,7 @@
                   <a:srgbClr val="808080"/>
                 </a:solidFill>
               </a:rPr>
-              <a:t>Optræder som</a:t>
+              <a:t>optræder som</a:t>
             </a:r>
           </a:p>
         </p:txBody>
@@ -10058,7 +10058,7 @@
                   <a:srgbClr val="808080"/>
                 </a:solidFill>
               </a:rPr>
-              <a:t>Kontrollerer</a:t>
+              <a:t>kontrollerer</a:t>
             </a:r>
           </a:p>
           <a:p>
@@ -10141,7 +10141,7 @@
                   <a:srgbClr val="808080"/>
                 </a:solidFill>
               </a:rPr>
-              <a:t>Beviser</a:t>
+              <a:t>beviser</a:t>
             </a:r>
           </a:p>
         </p:txBody>
@@ -10234,12 +10234,544 @@
           </a:p>
         </p:txBody>
       </p:sp>
+      <p:sp>
+        <p:nvSpPr>
+          <p:cNvPr id="6" name="TextBox 5">
+            <a:extLst>
+              <a:ext uri="{FF2B5EF4-FFF2-40B4-BE49-F238E27FC236}">
+                <a16:creationId xmlns:a16="http://schemas.microsoft.com/office/drawing/2014/main" id="{F5271F0F-4A64-4576-85E0-78EB554602EC}"/>
+              </a:ext>
+            </a:extLst>
+          </p:cNvPr>
+          <p:cNvSpPr txBox="1"/>
+          <p:nvPr/>
+        </p:nvSpPr>
+        <p:spPr>
+          <a:xfrm>
+            <a:off x="2135560" y="2293131"/>
+            <a:ext cx="2112762" cy="923330"/>
+          </a:xfrm>
+          <a:prstGeom prst="rect">
+            <a:avLst/>
+          </a:prstGeom>
+          <a:noFill/>
+        </p:spPr>
+        <p:txBody>
+          <a:bodyPr wrap="square" lIns="0" tIns="0" rIns="0" bIns="0" rtlCol="0">
+            <a:spAutoFit/>
+          </a:bodyPr>
+          <a:lstStyle/>
+          <a:p>
+            <a:pPr>
+              <a:lnSpc>
+                <a:spcPct val="100000"/>
+              </a:lnSpc>
+              <a:spcBef>
+                <a:spcPts val="1100"/>
+              </a:spcBef>
+            </a:pPr>
+            <a:r>
+              <a:rPr lang="da-DK" sz="2000" dirty="0">
+                <a:solidFill>
+                  <a:srgbClr val="808080"/>
+                </a:solidFill>
+              </a:rPr>
+              <a:t>Brugere med rettigheder og pligter</a:t>
+            </a:r>
+          </a:p>
+        </p:txBody>
+      </p:sp>
+      <p:sp>
+        <p:nvSpPr>
+          <p:cNvPr id="7" name="TextBox 6">
+            <a:extLst>
+              <a:ext uri="{FF2B5EF4-FFF2-40B4-BE49-F238E27FC236}">
+                <a16:creationId xmlns:a16="http://schemas.microsoft.com/office/drawing/2014/main" id="{5360B1C3-EDF6-44A1-9353-DE46093891FC}"/>
+              </a:ext>
+            </a:extLst>
+          </p:cNvPr>
+          <p:cNvSpPr txBox="1"/>
+          <p:nvPr/>
+        </p:nvSpPr>
+        <p:spPr>
+          <a:xfrm>
+            <a:off x="2135560" y="4164287"/>
+            <a:ext cx="1627329" cy="923330"/>
+          </a:xfrm>
+          <a:prstGeom prst="rect">
+            <a:avLst/>
+          </a:prstGeom>
+          <a:noFill/>
+        </p:spPr>
+        <p:txBody>
+          <a:bodyPr wrap="square" lIns="0" tIns="0" rIns="0" bIns="0" rtlCol="0">
+            <a:spAutoFit/>
+          </a:bodyPr>
+          <a:lstStyle/>
+          <a:p>
+            <a:pPr>
+              <a:lnSpc>
+                <a:spcPct val="100000"/>
+              </a:lnSpc>
+              <a:spcBef>
+                <a:spcPts val="1100"/>
+              </a:spcBef>
+            </a:pPr>
+            <a:r>
+              <a:rPr lang="da-DK" sz="2000" dirty="0">
+                <a:solidFill>
+                  <a:srgbClr val="808080"/>
+                </a:solidFill>
+              </a:rPr>
+              <a:t>Brugere som kan ”arve” rettigheder</a:t>
+            </a:r>
+          </a:p>
+        </p:txBody>
+      </p:sp>
+      <p:sp>
+        <p:nvSpPr>
+          <p:cNvPr id="8" name="TextBox 7">
+            <a:extLst>
+              <a:ext uri="{FF2B5EF4-FFF2-40B4-BE49-F238E27FC236}">
+                <a16:creationId xmlns:a16="http://schemas.microsoft.com/office/drawing/2014/main" id="{621145F2-2775-40B8-AB8A-C25DDEB4BFDC}"/>
+              </a:ext>
+            </a:extLst>
+          </p:cNvPr>
+          <p:cNvSpPr txBox="1"/>
+          <p:nvPr/>
+        </p:nvSpPr>
+        <p:spPr>
+          <a:xfrm>
+            <a:off x="4894456" y="1581817"/>
+            <a:ext cx="870431" cy="307777"/>
+          </a:xfrm>
+          <a:prstGeom prst="rect">
+            <a:avLst/>
+          </a:prstGeom>
+          <a:noFill/>
+        </p:spPr>
+        <p:txBody>
+          <a:bodyPr wrap="none" lIns="0" tIns="0" rIns="0" bIns="0" rtlCol="0">
+            <a:spAutoFit/>
+          </a:bodyPr>
+          <a:lstStyle/>
+          <a:p>
+            <a:pPr algn="ctr">
+              <a:lnSpc>
+                <a:spcPct val="100000"/>
+              </a:lnSpc>
+              <a:spcBef>
+                <a:spcPts val="1100"/>
+              </a:spcBef>
+            </a:pPr>
+            <a:r>
+              <a:rPr lang="da-DK" sz="2000" dirty="0">
+                <a:solidFill>
+                  <a:srgbClr val="808080"/>
+                </a:solidFill>
+              </a:rPr>
+              <a:t>Fysiske</a:t>
+            </a:r>
+          </a:p>
+        </p:txBody>
+      </p:sp>
+      <p:sp>
+        <p:nvSpPr>
+          <p:cNvPr id="9" name="TextBox 8">
+            <a:extLst>
+              <a:ext uri="{FF2B5EF4-FFF2-40B4-BE49-F238E27FC236}">
+                <a16:creationId xmlns:a16="http://schemas.microsoft.com/office/drawing/2014/main" id="{D347B964-C4CF-4D06-84A1-1B46803C0739}"/>
+              </a:ext>
+            </a:extLst>
+          </p:cNvPr>
+          <p:cNvSpPr txBox="1"/>
+          <p:nvPr/>
+        </p:nvSpPr>
+        <p:spPr>
+          <a:xfrm>
+            <a:off x="6990081" y="1581817"/>
+            <a:ext cx="923523" cy="307777"/>
+          </a:xfrm>
+          <a:prstGeom prst="rect">
+            <a:avLst/>
+          </a:prstGeom>
+          <a:noFill/>
+        </p:spPr>
+        <p:txBody>
+          <a:bodyPr wrap="none" lIns="0" tIns="0" rIns="0" bIns="0" rtlCol="0">
+            <a:spAutoFit/>
+          </a:bodyPr>
+          <a:lstStyle/>
+          <a:p>
+            <a:pPr algn="ctr">
+              <a:lnSpc>
+                <a:spcPct val="100000"/>
+              </a:lnSpc>
+              <a:spcBef>
+                <a:spcPts val="1100"/>
+              </a:spcBef>
+            </a:pPr>
+            <a:r>
+              <a:rPr lang="da-DK" sz="2000" dirty="0">
+                <a:solidFill>
+                  <a:srgbClr val="808080"/>
+                </a:solidFill>
+              </a:rPr>
+              <a:t>Virtuelle</a:t>
+            </a:r>
+          </a:p>
+        </p:txBody>
+      </p:sp>
+      <p:sp>
+        <p:nvSpPr>
+          <p:cNvPr id="10" name="TextBox 9">
+            <a:extLst>
+              <a:ext uri="{FF2B5EF4-FFF2-40B4-BE49-F238E27FC236}">
+                <a16:creationId xmlns:a16="http://schemas.microsoft.com/office/drawing/2014/main" id="{AA257272-32DC-4491-A4DB-841D965933C3}"/>
+              </a:ext>
+            </a:extLst>
+          </p:cNvPr>
+          <p:cNvSpPr txBox="1"/>
+          <p:nvPr/>
+        </p:nvSpPr>
+        <p:spPr>
+          <a:xfrm>
+            <a:off x="4964187" y="3014966"/>
+            <a:ext cx="730969" cy="276999"/>
+          </a:xfrm>
+          <a:prstGeom prst="rect">
+            <a:avLst/>
+          </a:prstGeom>
+          <a:noFill/>
+        </p:spPr>
+        <p:txBody>
+          <a:bodyPr wrap="none" lIns="0" tIns="0" rIns="0" bIns="0" rtlCol="0">
+            <a:spAutoFit/>
+          </a:bodyPr>
+          <a:lstStyle/>
+          <a:p>
+            <a:pPr algn="ctr">
+              <a:lnSpc>
+                <a:spcPct val="100000"/>
+              </a:lnSpc>
+              <a:spcBef>
+                <a:spcPts val="1100"/>
+              </a:spcBef>
+            </a:pPr>
+            <a:r>
+              <a:rPr lang="da-DK" sz="1800" dirty="0">
+                <a:solidFill>
+                  <a:srgbClr val="1F497D"/>
+                </a:solidFill>
+              </a:rPr>
+              <a:t>person</a:t>
+            </a:r>
+          </a:p>
+        </p:txBody>
+      </p:sp>
+      <p:sp>
+        <p:nvSpPr>
+          <p:cNvPr id="12" name="TextBox 11">
+            <a:extLst>
+              <a:ext uri="{FF2B5EF4-FFF2-40B4-BE49-F238E27FC236}">
+                <a16:creationId xmlns:a16="http://schemas.microsoft.com/office/drawing/2014/main" id="{EE2A6C9F-B0B1-4A4D-8D4A-8145FA8B594D}"/>
+              </a:ext>
+            </a:extLst>
+          </p:cNvPr>
+          <p:cNvSpPr txBox="1"/>
+          <p:nvPr/>
+        </p:nvSpPr>
+        <p:spPr>
+          <a:xfrm>
+            <a:off x="6823465" y="3014966"/>
+            <a:ext cx="1256754" cy="276999"/>
+          </a:xfrm>
+          <a:prstGeom prst="rect">
+            <a:avLst/>
+          </a:prstGeom>
+          <a:noFill/>
+        </p:spPr>
+        <p:txBody>
+          <a:bodyPr wrap="none" lIns="0" tIns="0" rIns="0" bIns="0" rtlCol="0">
+            <a:spAutoFit/>
+          </a:bodyPr>
+          <a:lstStyle/>
+          <a:p>
+            <a:pPr algn="ctr">
+              <a:lnSpc>
+                <a:spcPct val="100000"/>
+              </a:lnSpc>
+              <a:spcBef>
+                <a:spcPts val="1100"/>
+              </a:spcBef>
+            </a:pPr>
+            <a:r>
+              <a:rPr lang="da-DK" sz="1800" dirty="0">
+                <a:solidFill>
+                  <a:srgbClr val="1F497D"/>
+                </a:solidFill>
+              </a:rPr>
+              <a:t>organisation</a:t>
+            </a:r>
+          </a:p>
+        </p:txBody>
+      </p:sp>
+      <p:sp>
+        <p:nvSpPr>
+          <p:cNvPr id="13" name="TextBox 12">
+            <a:extLst>
+              <a:ext uri="{FF2B5EF4-FFF2-40B4-BE49-F238E27FC236}">
+                <a16:creationId xmlns:a16="http://schemas.microsoft.com/office/drawing/2014/main" id="{04D351FE-34DA-4832-A6CB-AA1CAB3BA301}"/>
+              </a:ext>
+            </a:extLst>
+          </p:cNvPr>
+          <p:cNvSpPr txBox="1"/>
+          <p:nvPr/>
+        </p:nvSpPr>
+        <p:spPr>
+          <a:xfrm>
+            <a:off x="6887585" y="5168224"/>
+            <a:ext cx="1128514" cy="276999"/>
+          </a:xfrm>
+          <a:prstGeom prst="rect">
+            <a:avLst/>
+          </a:prstGeom>
+          <a:noFill/>
+        </p:spPr>
+        <p:txBody>
+          <a:bodyPr wrap="none" lIns="0" tIns="0" rIns="0" bIns="0" rtlCol="0">
+            <a:spAutoFit/>
+          </a:bodyPr>
+          <a:lstStyle/>
+          <a:p>
+            <a:pPr algn="ctr">
+              <a:lnSpc>
+                <a:spcPct val="100000"/>
+              </a:lnSpc>
+              <a:spcBef>
+                <a:spcPts val="1100"/>
+              </a:spcBef>
+            </a:pPr>
+            <a:r>
+              <a:rPr lang="da-DK" sz="1800" dirty="0">
+                <a:solidFill>
+                  <a:srgbClr val="1F497D"/>
+                </a:solidFill>
+              </a:rPr>
+              <a:t>applikation</a:t>
+            </a:r>
+          </a:p>
+        </p:txBody>
+      </p:sp>
+      <p:pic>
+        <p:nvPicPr>
+          <p:cNvPr id="16" name="Picture 15">
+            <a:extLst>
+              <a:ext uri="{FF2B5EF4-FFF2-40B4-BE49-F238E27FC236}">
+                <a16:creationId xmlns:a16="http://schemas.microsoft.com/office/drawing/2014/main" id="{08DD5280-D042-4801-9624-211D27FF7DA8}"/>
+              </a:ext>
+            </a:extLst>
+          </p:cNvPr>
+          <p:cNvPicPr>
+            <a:picLocks noChangeAspect="1"/>
+          </p:cNvPicPr>
+          <p:nvPr/>
+        </p:nvPicPr>
+        <p:blipFill>
+          <a:blip r:embed="rId2" cstate="print">
+            <a:grayscl/>
+            <a:extLst>
+              <a:ext uri="{28A0092B-C50C-407E-A947-70E740481C1C}">
+                <a14:useLocalDpi xmlns:a14="http://schemas.microsoft.com/office/drawing/2010/main" val="0"/>
+              </a:ext>
+            </a:extLst>
+          </a:blip>
+          <a:stretch>
+            <a:fillRect/>
+          </a:stretch>
+        </p:blipFill>
+        <p:spPr>
+          <a:xfrm>
+            <a:off x="6919544" y="2083167"/>
+            <a:ext cx="1064597" cy="885840"/>
+          </a:xfrm>
+          <a:prstGeom prst="rect">
+            <a:avLst/>
+          </a:prstGeom>
+        </p:spPr>
+      </p:pic>
+      <p:pic>
+        <p:nvPicPr>
+          <p:cNvPr id="15" name="Picture 14">
+            <a:extLst>
+              <a:ext uri="{FF2B5EF4-FFF2-40B4-BE49-F238E27FC236}">
+                <a16:creationId xmlns:a16="http://schemas.microsoft.com/office/drawing/2014/main" id="{B01077BB-B17D-4129-B262-ADDD97615841}"/>
+              </a:ext>
+            </a:extLst>
+          </p:cNvPr>
+          <p:cNvPicPr>
+            <a:picLocks noChangeAspect="1"/>
+          </p:cNvPicPr>
+          <p:nvPr/>
+        </p:nvPicPr>
+        <p:blipFill>
+          <a:blip r:embed="rId3" cstate="print">
+            <a:grayscl/>
+            <a:extLst>
+              <a:ext uri="{28A0092B-C50C-407E-A947-70E740481C1C}">
+                <a14:useLocalDpi xmlns:a14="http://schemas.microsoft.com/office/drawing/2010/main" val="0"/>
+              </a:ext>
+            </a:extLst>
+          </a:blip>
+          <a:stretch>
+            <a:fillRect/>
+          </a:stretch>
+        </p:blipFill>
+        <p:spPr>
+          <a:xfrm>
+            <a:off x="5162720" y="2193296"/>
+            <a:ext cx="333903" cy="665582"/>
+          </a:xfrm>
+          <a:prstGeom prst="rect">
+            <a:avLst/>
+          </a:prstGeom>
+        </p:spPr>
+      </p:pic>
+      <p:pic>
+        <p:nvPicPr>
+          <p:cNvPr id="22" name="Picture 21">
+            <a:extLst>
+              <a:ext uri="{FF2B5EF4-FFF2-40B4-BE49-F238E27FC236}">
+                <a16:creationId xmlns:a16="http://schemas.microsoft.com/office/drawing/2014/main" id="{6A722D30-071C-4986-846E-CEC9B95549BE}"/>
+              </a:ext>
+            </a:extLst>
+          </p:cNvPr>
+          <p:cNvPicPr>
+            <a:picLocks noChangeAspect="1"/>
+          </p:cNvPicPr>
+          <p:nvPr/>
+        </p:nvPicPr>
+        <p:blipFill>
+          <a:blip r:embed="rId4" cstate="print">
+            <a:grayscl/>
+            <a:extLst>
+              <a:ext uri="{28A0092B-C50C-407E-A947-70E740481C1C}">
+                <a14:useLocalDpi xmlns:a14="http://schemas.microsoft.com/office/drawing/2010/main" val="0"/>
+              </a:ext>
+            </a:extLst>
+          </a:blip>
+          <a:stretch>
+            <a:fillRect/>
+          </a:stretch>
+        </p:blipFill>
+        <p:spPr>
+          <a:xfrm>
+            <a:off x="6927274" y="3896126"/>
+            <a:ext cx="1049137" cy="1049137"/>
+          </a:xfrm>
+          <a:prstGeom prst="rect">
+            <a:avLst/>
+          </a:prstGeom>
+        </p:spPr>
+      </p:pic>
+      <p:cxnSp>
+        <p:nvCxnSpPr>
+          <p:cNvPr id="25" name="Straight Connector 24">
+            <a:extLst>
+              <a:ext uri="{FF2B5EF4-FFF2-40B4-BE49-F238E27FC236}">
+                <a16:creationId xmlns:a16="http://schemas.microsoft.com/office/drawing/2014/main" id="{5702E071-B1B9-45E4-AE6C-FF9E6DBB3678}"/>
+              </a:ext>
+            </a:extLst>
+          </p:cNvPr>
+          <p:cNvCxnSpPr/>
+          <p:nvPr/>
+        </p:nvCxnSpPr>
+        <p:spPr bwMode="auto">
+          <a:xfrm>
+            <a:off x="6384032" y="1735705"/>
+            <a:ext cx="0" cy="3646769"/>
+          </a:xfrm>
+          <a:prstGeom prst="line">
+            <a:avLst/>
+          </a:prstGeom>
+          <a:solidFill>
+            <a:schemeClr val="accent1"/>
+          </a:solidFill>
+          <a:ln w="6350" cap="flat" cmpd="sng" algn="ctr">
+            <a:solidFill>
+              <a:srgbClr val="808080"/>
+            </a:solidFill>
+            <a:prstDash val="lgDash"/>
+            <a:round/>
+            <a:headEnd type="none" w="med" len="med"/>
+            <a:tailEnd type="none" w="med" len="med"/>
+          </a:ln>
+          <a:effectLst/>
+          <a:extLst>
+            <a:ext uri="{AF507438-7753-43E0-B8FC-AC1667EBCBE1}">
+              <a14:hiddenEffects xmlns:a14="http://schemas.microsoft.com/office/drawing/2010/main">
+                <a:effectLst>
+                  <a:outerShdw dist="35921" dir="2700000" algn="ctr" rotWithShape="0">
+                    <a:schemeClr val="bg2"/>
+                  </a:outerShdw>
+                </a:effectLst>
+              </a14:hiddenEffects>
+            </a:ext>
+          </a:extLst>
+        </p:spPr>
+      </p:cxnSp>
+      <p:cxnSp>
+        <p:nvCxnSpPr>
+          <p:cNvPr id="26" name="Straight Connector 25">
+            <a:extLst>
+              <a:ext uri="{FF2B5EF4-FFF2-40B4-BE49-F238E27FC236}">
+                <a16:creationId xmlns:a16="http://schemas.microsoft.com/office/drawing/2014/main" id="{6CDB145A-BAEE-44BB-BD3D-D0C08C1044E5}"/>
+              </a:ext>
+            </a:extLst>
+          </p:cNvPr>
+          <p:cNvCxnSpPr/>
+          <p:nvPr/>
+        </p:nvCxnSpPr>
+        <p:spPr bwMode="auto">
+          <a:xfrm>
+            <a:off x="2783632" y="3645024"/>
+            <a:ext cx="5400600" cy="0"/>
+          </a:xfrm>
+          <a:prstGeom prst="line">
+            <a:avLst/>
+          </a:prstGeom>
+          <a:solidFill>
+            <a:schemeClr val="accent1"/>
+          </a:solidFill>
+          <a:ln w="6350" cap="flat" cmpd="sng" algn="ctr">
+            <a:solidFill>
+              <a:srgbClr val="808080"/>
+            </a:solidFill>
+            <a:prstDash val="lgDash"/>
+            <a:round/>
+            <a:headEnd type="none" w="med" len="med"/>
+            <a:tailEnd type="none" w="med" len="med"/>
+          </a:ln>
+          <a:effectLst/>
+          <a:extLst>
+            <a:ext uri="{AF507438-7753-43E0-B8FC-AC1667EBCBE1}">
+              <a14:hiddenEffects xmlns:a14="http://schemas.microsoft.com/office/drawing/2010/main">
+                <a:effectLst>
+                  <a:outerShdw dist="35921" dir="2700000" algn="ctr" rotWithShape="0">
+                    <a:schemeClr val="bg2"/>
+                  </a:outerShdw>
+                </a:effectLst>
+              </a14:hiddenEffects>
+            </a:ext>
+          </a:extLst>
+        </p:spPr>
+      </p:cxnSp>
       <p:grpSp>
         <p:nvGrpSpPr>
-          <p:cNvPr id="5" name="Group 4">
+          <p:cNvPr id="21" name="Group 20">
             <a:extLst>
               <a:ext uri="{FF2B5EF4-FFF2-40B4-BE49-F238E27FC236}">
-                <a16:creationId xmlns:a16="http://schemas.microsoft.com/office/drawing/2014/main" id="{CD0D2F75-2C37-4E3A-B272-BCC62C8057CD}"/>
+                <a16:creationId xmlns:a16="http://schemas.microsoft.com/office/drawing/2014/main" id="{6269CC9D-B84D-4065-B47C-48F2DD3924F6}"/>
               </a:ext>
             </a:extLst>
           </p:cNvPr>
@@ -10248,18 +10780,18 @@
         </p:nvGrpSpPr>
         <p:grpSpPr>
           <a:xfrm>
-            <a:off x="2135560" y="1556792"/>
-            <a:ext cx="6336704" cy="3907562"/>
-            <a:chOff x="695400" y="1556792"/>
-            <a:chExt cx="6336704" cy="3907562"/>
+            <a:off x="4670859" y="4094791"/>
+            <a:ext cx="1317624" cy="1350433"/>
+            <a:chOff x="2907159" y="4094791"/>
+            <a:chExt cx="1317624" cy="1350433"/>
           </a:xfrm>
         </p:grpSpPr>
         <p:sp>
           <p:nvSpPr>
-            <p:cNvPr id="6" name="TextBox 5">
+            <p:cNvPr id="11" name="TextBox 10">
               <a:extLst>
                 <a:ext uri="{FF2B5EF4-FFF2-40B4-BE49-F238E27FC236}">
-                  <a16:creationId xmlns:a16="http://schemas.microsoft.com/office/drawing/2014/main" id="{F5271F0F-4A64-4576-85E0-78EB554602EC}"/>
+                  <a16:creationId xmlns:a16="http://schemas.microsoft.com/office/drawing/2014/main" id="{5ACC6851-E740-413D-8816-BF59FC23D386}"/>
                 </a:ext>
               </a:extLst>
             </p:cNvPr>
@@ -10268,102 +10800,8 @@
           </p:nvSpPr>
           <p:spPr>
             <a:xfrm>
-              <a:off x="695400" y="2293131"/>
-              <a:ext cx="2112762" cy="923330"/>
-            </a:xfrm>
-            <a:prstGeom prst="rect">
-              <a:avLst/>
-            </a:prstGeom>
-            <a:noFill/>
-          </p:spPr>
-          <p:txBody>
-            <a:bodyPr wrap="square" lIns="0" tIns="0" rIns="0" bIns="0" rtlCol="0">
-              <a:spAutoFit/>
-            </a:bodyPr>
-            <a:lstStyle/>
-            <a:p>
-              <a:pPr>
-                <a:lnSpc>
-                  <a:spcPct val="100000"/>
-                </a:lnSpc>
-                <a:spcBef>
-                  <a:spcPts val="1100"/>
-                </a:spcBef>
-              </a:pPr>
-              <a:r>
-                <a:rPr lang="da-DK" sz="2000" dirty="0">
-                  <a:solidFill>
-                    <a:srgbClr val="808080"/>
-                  </a:solidFill>
-                </a:rPr>
-                <a:t>Brugere med rettigheder og pligter</a:t>
-              </a:r>
-            </a:p>
-          </p:txBody>
-        </p:sp>
-        <p:sp>
-          <p:nvSpPr>
-            <p:cNvPr id="7" name="TextBox 6">
-              <a:extLst>
-                <a:ext uri="{FF2B5EF4-FFF2-40B4-BE49-F238E27FC236}">
-                  <a16:creationId xmlns:a16="http://schemas.microsoft.com/office/drawing/2014/main" id="{5360B1C3-EDF6-44A1-9353-DE46093891FC}"/>
-                </a:ext>
-              </a:extLst>
-            </p:cNvPr>
-            <p:cNvSpPr txBox="1"/>
-            <p:nvPr/>
-          </p:nvSpPr>
-          <p:spPr>
-            <a:xfrm>
-              <a:off x="695400" y="4164287"/>
-              <a:ext cx="1627329" cy="923330"/>
-            </a:xfrm>
-            <a:prstGeom prst="rect">
-              <a:avLst/>
-            </a:prstGeom>
-            <a:noFill/>
-          </p:spPr>
-          <p:txBody>
-            <a:bodyPr wrap="square" lIns="0" tIns="0" rIns="0" bIns="0" rtlCol="0">
-              <a:spAutoFit/>
-            </a:bodyPr>
-            <a:lstStyle/>
-            <a:p>
-              <a:pPr>
-                <a:lnSpc>
-                  <a:spcPct val="100000"/>
-                </a:lnSpc>
-                <a:spcBef>
-                  <a:spcPts val="1100"/>
-                </a:spcBef>
-              </a:pPr>
-              <a:r>
-                <a:rPr lang="da-DK" sz="2000" dirty="0">
-                  <a:solidFill>
-                    <a:srgbClr val="808080"/>
-                  </a:solidFill>
-                </a:rPr>
-                <a:t>Brugere som kan ”arve” rettigheder</a:t>
-              </a:r>
-            </a:p>
-          </p:txBody>
-        </p:sp>
-        <p:sp>
-          <p:nvSpPr>
-            <p:cNvPr id="8" name="TextBox 7">
-              <a:extLst>
-                <a:ext uri="{FF2B5EF4-FFF2-40B4-BE49-F238E27FC236}">
-                  <a16:creationId xmlns:a16="http://schemas.microsoft.com/office/drawing/2014/main" id="{621145F2-2775-40B8-AB8A-C25DDEB4BFDC}"/>
-                </a:ext>
-              </a:extLst>
-            </p:cNvPr>
-            <p:cNvSpPr txBox="1"/>
-            <p:nvPr/>
-          </p:nvSpPr>
-          <p:spPr>
-            <a:xfrm>
-              <a:off x="3143672" y="1556792"/>
-              <a:ext cx="870431" cy="307777"/>
+              <a:off x="3127847" y="5168225"/>
+              <a:ext cx="807913" cy="276999"/>
             </a:xfrm>
             <a:prstGeom prst="rect">
               <a:avLst/>
@@ -10376,101 +10814,7 @@
             </a:bodyPr>
             <a:lstStyle/>
             <a:p>
-              <a:pPr>
-                <a:lnSpc>
-                  <a:spcPct val="100000"/>
-                </a:lnSpc>
-                <a:spcBef>
-                  <a:spcPts val="1100"/>
-                </a:spcBef>
-              </a:pPr>
-              <a:r>
-                <a:rPr lang="da-DK" sz="2000" dirty="0">
-                  <a:solidFill>
-                    <a:srgbClr val="808080"/>
-                  </a:solidFill>
-                </a:rPr>
-                <a:t>Fysiske</a:t>
-              </a:r>
-            </a:p>
-          </p:txBody>
-        </p:sp>
-        <p:sp>
-          <p:nvSpPr>
-            <p:cNvPr id="9" name="TextBox 8">
-              <a:extLst>
-                <a:ext uri="{FF2B5EF4-FFF2-40B4-BE49-F238E27FC236}">
-                  <a16:creationId xmlns:a16="http://schemas.microsoft.com/office/drawing/2014/main" id="{D347B964-C4CF-4D06-84A1-1B46803C0739}"/>
-                </a:ext>
-              </a:extLst>
-            </p:cNvPr>
-            <p:cNvSpPr txBox="1"/>
-            <p:nvPr/>
-          </p:nvSpPr>
-          <p:spPr>
-            <a:xfrm>
-              <a:off x="5519936" y="1581817"/>
-              <a:ext cx="923523" cy="307777"/>
-            </a:xfrm>
-            <a:prstGeom prst="rect">
-              <a:avLst/>
-            </a:prstGeom>
-            <a:noFill/>
-          </p:spPr>
-          <p:txBody>
-            <a:bodyPr wrap="none" lIns="0" tIns="0" rIns="0" bIns="0" rtlCol="0">
-              <a:spAutoFit/>
-            </a:bodyPr>
-            <a:lstStyle/>
-            <a:p>
-              <a:pPr>
-                <a:lnSpc>
-                  <a:spcPct val="100000"/>
-                </a:lnSpc>
-                <a:spcBef>
-                  <a:spcPts val="1100"/>
-                </a:spcBef>
-              </a:pPr>
-              <a:r>
-                <a:rPr lang="da-DK" sz="2000" dirty="0">
-                  <a:solidFill>
-                    <a:srgbClr val="808080"/>
-                  </a:solidFill>
-                </a:rPr>
-                <a:t>Virtuelle</a:t>
-              </a:r>
-            </a:p>
-          </p:txBody>
-        </p:sp>
-        <p:sp>
-          <p:nvSpPr>
-            <p:cNvPr id="10" name="TextBox 9">
-              <a:extLst>
-                <a:ext uri="{FF2B5EF4-FFF2-40B4-BE49-F238E27FC236}">
-                  <a16:creationId xmlns:a16="http://schemas.microsoft.com/office/drawing/2014/main" id="{AA257272-32DC-4491-A4DB-841D965933C3}"/>
-                </a:ext>
-              </a:extLst>
-            </p:cNvPr>
-            <p:cNvSpPr txBox="1"/>
-            <p:nvPr/>
-          </p:nvSpPr>
-          <p:spPr>
-            <a:xfrm>
-              <a:off x="3204791" y="3014966"/>
-              <a:ext cx="730969" cy="276999"/>
-            </a:xfrm>
-            <a:prstGeom prst="rect">
-              <a:avLst/>
-            </a:prstGeom>
-            <a:noFill/>
-          </p:spPr>
-          <p:txBody>
-            <a:bodyPr wrap="none" lIns="0" tIns="0" rIns="0" bIns="0" rtlCol="0">
-              <a:spAutoFit/>
-            </a:bodyPr>
-            <a:lstStyle/>
-            <a:p>
-              <a:pPr>
+              <a:pPr algn="ctr">
                 <a:lnSpc>
                   <a:spcPct val="100000"/>
                 </a:lnSpc>
@@ -10484,111 +10828,17 @@
                     <a:srgbClr val="1F497D"/>
                   </a:solidFill>
                 </a:rPr>
-                <a:t>Person</a:t>
-              </a:r>
-            </a:p>
-          </p:txBody>
-        </p:sp>
-        <p:sp>
-          <p:nvSpPr>
-            <p:cNvPr id="12" name="TextBox 11">
-              <a:extLst>
-                <a:ext uri="{FF2B5EF4-FFF2-40B4-BE49-F238E27FC236}">
-                  <a16:creationId xmlns:a16="http://schemas.microsoft.com/office/drawing/2014/main" id="{EE2A6C9F-B0B1-4A4D-8D4A-8145FA8B594D}"/>
-                </a:ext>
-              </a:extLst>
-            </p:cNvPr>
-            <p:cNvSpPr txBox="1"/>
-            <p:nvPr/>
-          </p:nvSpPr>
-          <p:spPr>
-            <a:xfrm>
-              <a:off x="5351300" y="3014966"/>
-              <a:ext cx="1308050" cy="276999"/>
-            </a:xfrm>
-            <a:prstGeom prst="rect">
-              <a:avLst/>
-            </a:prstGeom>
-            <a:noFill/>
-          </p:spPr>
-          <p:txBody>
-            <a:bodyPr wrap="none" lIns="0" tIns="0" rIns="0" bIns="0" rtlCol="0">
-              <a:spAutoFit/>
-            </a:bodyPr>
-            <a:lstStyle/>
-            <a:p>
-              <a:pPr>
-                <a:lnSpc>
-                  <a:spcPct val="100000"/>
-                </a:lnSpc>
-                <a:spcBef>
-                  <a:spcPts val="1100"/>
-                </a:spcBef>
-              </a:pPr>
-              <a:r>
-                <a:rPr lang="da-DK" sz="1800" dirty="0">
-                  <a:solidFill>
-                    <a:srgbClr val="1F497D"/>
-                  </a:solidFill>
-                </a:rPr>
-                <a:t>Organisation</a:t>
-              </a:r>
-            </a:p>
-          </p:txBody>
-        </p:sp>
-        <p:sp>
-          <p:nvSpPr>
-            <p:cNvPr id="13" name="TextBox 12">
-              <a:extLst>
-                <a:ext uri="{FF2B5EF4-FFF2-40B4-BE49-F238E27FC236}">
-                  <a16:creationId xmlns:a16="http://schemas.microsoft.com/office/drawing/2014/main" id="{04D351FE-34DA-4832-A6CB-AA1CAB3BA301}"/>
-                </a:ext>
-              </a:extLst>
-            </p:cNvPr>
-            <p:cNvSpPr txBox="1"/>
-            <p:nvPr/>
-          </p:nvSpPr>
-          <p:spPr>
-            <a:xfrm>
-              <a:off x="5543550" y="5139405"/>
-              <a:ext cx="1128514" cy="276999"/>
-            </a:xfrm>
-            <a:prstGeom prst="rect">
-              <a:avLst/>
-            </a:prstGeom>
-            <a:noFill/>
-          </p:spPr>
-          <p:txBody>
-            <a:bodyPr wrap="none" lIns="0" tIns="0" rIns="0" bIns="0" rtlCol="0">
-              <a:spAutoFit/>
-            </a:bodyPr>
-            <a:lstStyle/>
-            <a:p>
-              <a:pPr>
-                <a:lnSpc>
-                  <a:spcPct val="100000"/>
-                </a:lnSpc>
-                <a:spcBef>
-                  <a:spcPts val="1100"/>
-                </a:spcBef>
-              </a:pPr>
-              <a:r>
-                <a:rPr lang="da-DK" sz="1800" dirty="0">
-                  <a:solidFill>
-                    <a:srgbClr val="1F497D"/>
-                  </a:solidFill>
-                </a:rPr>
-                <a:t>Applikation</a:t>
+                <a:t>apparat</a:t>
               </a:r>
             </a:p>
           </p:txBody>
         </p:sp>
         <p:pic>
           <p:nvPicPr>
-            <p:cNvPr id="16" name="Picture 15">
+            <p:cNvPr id="20" name="Picture 19">
               <a:extLst>
                 <a:ext uri="{FF2B5EF4-FFF2-40B4-BE49-F238E27FC236}">
-                  <a16:creationId xmlns:a16="http://schemas.microsoft.com/office/drawing/2014/main" id="{08DD5280-D042-4801-9624-211D27FF7DA8}"/>
+                  <a16:creationId xmlns:a16="http://schemas.microsoft.com/office/drawing/2014/main" id="{4DB32713-C91F-4329-9E67-930E8FA4578E}"/>
                 </a:ext>
               </a:extLst>
             </p:cNvPr>
@@ -10598,7 +10848,7 @@
             <p:nvPr/>
           </p:nvPicPr>
           <p:blipFill>
-            <a:blip r:embed="rId2" cstate="print">
+            <a:blip r:embed="rId5" cstate="print">
               <a:grayscl/>
               <a:extLst>
                 <a:ext uri="{28A0092B-C50C-407E-A947-70E740481C1C}">
@@ -10612,8 +10862,8 @@
           </p:blipFill>
           <p:spPr>
             <a:xfrm>
-              <a:off x="5420295" y="2083167"/>
-              <a:ext cx="1064597" cy="885840"/>
+              <a:off x="2907159" y="4099714"/>
+              <a:ext cx="546662" cy="546662"/>
             </a:xfrm>
             <a:prstGeom prst="rect">
               <a:avLst/>
@@ -10622,10 +10872,10 @@
         </p:pic>
         <p:pic>
           <p:nvPicPr>
-            <p:cNvPr id="15" name="Picture 14">
+            <p:cNvPr id="14" name="Picture 13">
               <a:extLst>
                 <a:ext uri="{FF2B5EF4-FFF2-40B4-BE49-F238E27FC236}">
-                  <a16:creationId xmlns:a16="http://schemas.microsoft.com/office/drawing/2014/main" id="{B01077BB-B17D-4129-B262-ADDD97615841}"/>
+                  <a16:creationId xmlns:a16="http://schemas.microsoft.com/office/drawing/2014/main" id="{509FD91A-A330-44D3-81A2-40544F5622EC}"/>
                 </a:ext>
               </a:extLst>
             </p:cNvPr>
@@ -10635,7 +10885,7 @@
             <p:nvPr/>
           </p:nvPicPr>
           <p:blipFill>
-            <a:blip r:embed="rId3" cstate="print">
+            <a:blip r:embed="rId6" cstate="print">
               <a:grayscl/>
               <a:extLst>
                 <a:ext uri="{28A0092B-C50C-407E-A947-70E740481C1C}">
@@ -10649,8 +10899,8 @@
           </p:blipFill>
           <p:spPr>
             <a:xfrm>
-              <a:off x="3385833" y="2245009"/>
-              <a:ext cx="333903" cy="665582"/>
+              <a:off x="3683740" y="4094791"/>
+              <a:ext cx="541043" cy="541043"/>
             </a:xfrm>
             <a:prstGeom prst="rect">
               <a:avLst/>
@@ -10659,10 +10909,10 @@
         </p:pic>
         <p:pic>
           <p:nvPicPr>
-            <p:cNvPr id="22" name="Picture 21">
+            <p:cNvPr id="19" name="Picture 18">
               <a:extLst>
                 <a:ext uri="{FF2B5EF4-FFF2-40B4-BE49-F238E27FC236}">
-                  <a16:creationId xmlns:a16="http://schemas.microsoft.com/office/drawing/2014/main" id="{6A722D30-071C-4986-846E-CEC9B95549BE}"/>
+                  <a16:creationId xmlns:a16="http://schemas.microsoft.com/office/drawing/2014/main" id="{9926F330-AC94-4CF7-9D16-0BF71929CDB7}"/>
                 </a:ext>
               </a:extLst>
             </p:cNvPr>
@@ -10672,7 +10922,7 @@
             <p:nvPr/>
           </p:nvPicPr>
           <p:blipFill>
-            <a:blip r:embed="rId4" cstate="print">
+            <a:blip r:embed="rId7" cstate="print">
               <a:grayscl/>
               <a:extLst>
                 <a:ext uri="{28A0092B-C50C-407E-A947-70E740481C1C}">
@@ -10686,285 +10936,14 @@
           </p:blipFill>
           <p:spPr>
             <a:xfrm>
-              <a:off x="5544876" y="3998349"/>
-              <a:ext cx="1049137" cy="1049137"/>
+              <a:off x="3464326" y="4560664"/>
+              <a:ext cx="250218" cy="380503"/>
             </a:xfrm>
             <a:prstGeom prst="rect">
               <a:avLst/>
             </a:prstGeom>
           </p:spPr>
         </p:pic>
-        <p:cxnSp>
-          <p:nvCxnSpPr>
-            <p:cNvPr id="25" name="Straight Connector 24">
-              <a:extLst>
-                <a:ext uri="{FF2B5EF4-FFF2-40B4-BE49-F238E27FC236}">
-                  <a16:creationId xmlns:a16="http://schemas.microsoft.com/office/drawing/2014/main" id="{5702E071-B1B9-45E4-AE6C-FF9E6DBB3678}"/>
-                </a:ext>
-              </a:extLst>
-            </p:cNvPr>
-            <p:cNvCxnSpPr/>
-            <p:nvPr/>
-          </p:nvCxnSpPr>
-          <p:spPr bwMode="auto">
-            <a:xfrm>
-              <a:off x="4871864" y="1710680"/>
-              <a:ext cx="0" cy="3753674"/>
-            </a:xfrm>
-            <a:prstGeom prst="line">
-              <a:avLst/>
-            </a:prstGeom>
-            <a:solidFill>
-              <a:schemeClr val="accent1"/>
-            </a:solidFill>
-            <a:ln w="6350" cap="flat" cmpd="sng" algn="ctr">
-              <a:solidFill>
-                <a:srgbClr val="808080"/>
-              </a:solidFill>
-              <a:prstDash val="lgDash"/>
-              <a:round/>
-              <a:headEnd type="none" w="med" len="med"/>
-              <a:tailEnd type="none" w="med" len="med"/>
-            </a:ln>
-            <a:effectLst/>
-            <a:extLst>
-              <a:ext uri="{AF507438-7753-43E0-B8FC-AC1667EBCBE1}">
-                <a14:hiddenEffects xmlns:a14="http://schemas.microsoft.com/office/drawing/2010/main">
-                  <a:effectLst>
-                    <a:outerShdw dist="35921" dir="2700000" algn="ctr" rotWithShape="0">
-                      <a:schemeClr val="bg2"/>
-                    </a:outerShdw>
-                  </a:effectLst>
-                </a14:hiddenEffects>
-              </a:ext>
-            </a:extLst>
-          </p:spPr>
-        </p:cxnSp>
-        <p:cxnSp>
-          <p:nvCxnSpPr>
-            <p:cNvPr id="26" name="Straight Connector 25">
-              <a:extLst>
-                <a:ext uri="{FF2B5EF4-FFF2-40B4-BE49-F238E27FC236}">
-                  <a16:creationId xmlns:a16="http://schemas.microsoft.com/office/drawing/2014/main" id="{6CDB145A-BAEE-44BB-BD3D-D0C08C1044E5}"/>
-                </a:ext>
-              </a:extLst>
-            </p:cNvPr>
-            <p:cNvCxnSpPr/>
-            <p:nvPr/>
-          </p:nvCxnSpPr>
-          <p:spPr bwMode="auto">
-            <a:xfrm>
-              <a:off x="1343472" y="3645024"/>
-              <a:ext cx="5688632" cy="0"/>
-            </a:xfrm>
-            <a:prstGeom prst="line">
-              <a:avLst/>
-            </a:prstGeom>
-            <a:solidFill>
-              <a:schemeClr val="accent1"/>
-            </a:solidFill>
-            <a:ln w="6350" cap="flat" cmpd="sng" algn="ctr">
-              <a:solidFill>
-                <a:srgbClr val="808080"/>
-              </a:solidFill>
-              <a:prstDash val="lgDash"/>
-              <a:round/>
-              <a:headEnd type="none" w="med" len="med"/>
-              <a:tailEnd type="none" w="med" len="med"/>
-            </a:ln>
-            <a:effectLst/>
-            <a:extLst>
-              <a:ext uri="{AF507438-7753-43E0-B8FC-AC1667EBCBE1}">
-                <a14:hiddenEffects xmlns:a14="http://schemas.microsoft.com/office/drawing/2010/main">
-                  <a:effectLst>
-                    <a:outerShdw dist="35921" dir="2700000" algn="ctr" rotWithShape="0">
-                      <a:schemeClr val="bg2"/>
-                    </a:outerShdw>
-                  </a:effectLst>
-                </a14:hiddenEffects>
-              </a:ext>
-            </a:extLst>
-          </p:spPr>
-        </p:cxnSp>
-        <p:grpSp>
-          <p:nvGrpSpPr>
-            <p:cNvPr id="21" name="Group 20">
-              <a:extLst>
-                <a:ext uri="{FF2B5EF4-FFF2-40B4-BE49-F238E27FC236}">
-                  <a16:creationId xmlns:a16="http://schemas.microsoft.com/office/drawing/2014/main" id="{6269CC9D-B84D-4065-B47C-48F2DD3924F6}"/>
-                </a:ext>
-              </a:extLst>
-            </p:cNvPr>
-            <p:cNvGrpSpPr/>
-            <p:nvPr/>
-          </p:nvGrpSpPr>
-          <p:grpSpPr>
-            <a:xfrm>
-              <a:off x="2907159" y="4094791"/>
-              <a:ext cx="1317624" cy="1350433"/>
-              <a:chOff x="2907159" y="4094791"/>
-              <a:chExt cx="1317624" cy="1350433"/>
-            </a:xfrm>
-          </p:grpSpPr>
-          <p:sp>
-            <p:nvSpPr>
-              <p:cNvPr id="11" name="TextBox 10">
-                <a:extLst>
-                  <a:ext uri="{FF2B5EF4-FFF2-40B4-BE49-F238E27FC236}">
-                    <a16:creationId xmlns:a16="http://schemas.microsoft.com/office/drawing/2014/main" id="{5ACC6851-E740-413D-8816-BF59FC23D386}"/>
-                  </a:ext>
-                </a:extLst>
-              </p:cNvPr>
-              <p:cNvSpPr txBox="1"/>
-              <p:nvPr/>
-            </p:nvSpPr>
-            <p:spPr>
-              <a:xfrm>
-                <a:off x="3127847" y="5168225"/>
-                <a:ext cx="807913" cy="276999"/>
-              </a:xfrm>
-              <a:prstGeom prst="rect">
-                <a:avLst/>
-              </a:prstGeom>
-              <a:noFill/>
-            </p:spPr>
-            <p:txBody>
-              <a:bodyPr wrap="none" lIns="0" tIns="0" rIns="0" bIns="0" rtlCol="0">
-                <a:spAutoFit/>
-              </a:bodyPr>
-              <a:lstStyle/>
-              <a:p>
-                <a:pPr>
-                  <a:lnSpc>
-                    <a:spcPct val="100000"/>
-                  </a:lnSpc>
-                  <a:spcBef>
-                    <a:spcPts val="1100"/>
-                  </a:spcBef>
-                </a:pPr>
-                <a:r>
-                  <a:rPr lang="da-DK" sz="1800" dirty="0">
-                    <a:solidFill>
-                      <a:srgbClr val="1F497D"/>
-                    </a:solidFill>
-                  </a:rPr>
-                  <a:t>Apparat</a:t>
-                </a:r>
-              </a:p>
-            </p:txBody>
-          </p:sp>
-          <p:pic>
-            <p:nvPicPr>
-              <p:cNvPr id="20" name="Picture 19">
-                <a:extLst>
-                  <a:ext uri="{FF2B5EF4-FFF2-40B4-BE49-F238E27FC236}">
-                    <a16:creationId xmlns:a16="http://schemas.microsoft.com/office/drawing/2014/main" id="{4DB32713-C91F-4329-9E67-930E8FA4578E}"/>
-                  </a:ext>
-                </a:extLst>
-              </p:cNvPr>
-              <p:cNvPicPr>
-                <a:picLocks noChangeAspect="1"/>
-              </p:cNvPicPr>
-              <p:nvPr/>
-            </p:nvPicPr>
-            <p:blipFill>
-              <a:blip r:embed="rId5" cstate="print">
-                <a:grayscl/>
-                <a:extLst>
-                  <a:ext uri="{28A0092B-C50C-407E-A947-70E740481C1C}">
-                    <a14:useLocalDpi xmlns:a14="http://schemas.microsoft.com/office/drawing/2010/main" val="0"/>
-                  </a:ext>
-                </a:extLst>
-              </a:blip>
-              <a:stretch>
-                <a:fillRect/>
-              </a:stretch>
-            </p:blipFill>
-            <p:spPr>
-              <a:xfrm>
-                <a:off x="2907159" y="4099714"/>
-                <a:ext cx="546662" cy="546662"/>
-              </a:xfrm>
-              <a:prstGeom prst="rect">
-                <a:avLst/>
-              </a:prstGeom>
-            </p:spPr>
-          </p:pic>
-          <p:pic>
-            <p:nvPicPr>
-              <p:cNvPr id="14" name="Picture 13">
-                <a:extLst>
-                  <a:ext uri="{FF2B5EF4-FFF2-40B4-BE49-F238E27FC236}">
-                    <a16:creationId xmlns:a16="http://schemas.microsoft.com/office/drawing/2014/main" id="{509FD91A-A330-44D3-81A2-40544F5622EC}"/>
-                  </a:ext>
-                </a:extLst>
-              </p:cNvPr>
-              <p:cNvPicPr>
-                <a:picLocks noChangeAspect="1"/>
-              </p:cNvPicPr>
-              <p:nvPr/>
-            </p:nvPicPr>
-            <p:blipFill>
-              <a:blip r:embed="rId6" cstate="print">
-                <a:grayscl/>
-                <a:extLst>
-                  <a:ext uri="{28A0092B-C50C-407E-A947-70E740481C1C}">
-                    <a14:useLocalDpi xmlns:a14="http://schemas.microsoft.com/office/drawing/2010/main" val="0"/>
-                  </a:ext>
-                </a:extLst>
-              </a:blip>
-              <a:stretch>
-                <a:fillRect/>
-              </a:stretch>
-            </p:blipFill>
-            <p:spPr>
-              <a:xfrm>
-                <a:off x="3683740" y="4094791"/>
-                <a:ext cx="541043" cy="541043"/>
-              </a:xfrm>
-              <a:prstGeom prst="rect">
-                <a:avLst/>
-              </a:prstGeom>
-            </p:spPr>
-          </p:pic>
-          <p:pic>
-            <p:nvPicPr>
-              <p:cNvPr id="19" name="Picture 18">
-                <a:extLst>
-                  <a:ext uri="{FF2B5EF4-FFF2-40B4-BE49-F238E27FC236}">
-                    <a16:creationId xmlns:a16="http://schemas.microsoft.com/office/drawing/2014/main" id="{9926F330-AC94-4CF7-9D16-0BF71929CDB7}"/>
-                  </a:ext>
-                </a:extLst>
-              </p:cNvPr>
-              <p:cNvPicPr>
-                <a:picLocks noChangeAspect="1"/>
-              </p:cNvPicPr>
-              <p:nvPr/>
-            </p:nvPicPr>
-            <p:blipFill>
-              <a:blip r:embed="rId7" cstate="print">
-                <a:grayscl/>
-                <a:extLst>
-                  <a:ext uri="{28A0092B-C50C-407E-A947-70E740481C1C}">
-                    <a14:useLocalDpi xmlns:a14="http://schemas.microsoft.com/office/drawing/2010/main" val="0"/>
-                  </a:ext>
-                </a:extLst>
-              </a:blip>
-              <a:stretch>
-                <a:fillRect/>
-              </a:stretch>
-            </p:blipFill>
-            <p:spPr>
-              <a:xfrm>
-                <a:off x="3464326" y="4560664"/>
-                <a:ext cx="250218" cy="380503"/>
-              </a:xfrm>
-              <a:prstGeom prst="rect">
-                <a:avLst/>
-              </a:prstGeom>
-            </p:spPr>
-          </p:pic>
-        </p:grpSp>
       </p:grpSp>
     </p:spTree>
     <p:extLst>
@@ -11375,7 +11354,7 @@
                 <a:latin typeface="Verdana"/>
                 <a:cs typeface="ＭＳ Ｐゴシック" pitchFamily="-111" charset="-128"/>
               </a:rPr>
-              <a:t>Tildeles</a:t>
+              <a:t>tildeles</a:t>
             </a:r>
           </a:p>
         </p:txBody>
@@ -11533,7 +11512,7 @@
                 <a:latin typeface="Verdana"/>
                 <a:cs typeface="ＭＳ Ｐゴシック" pitchFamily="-111" charset="-128"/>
               </a:rPr>
-              <a:t>Anvender</a:t>
+              <a:t>anvender</a:t>
             </a:r>
           </a:p>
         </p:txBody>
@@ -11929,7 +11908,7 @@
                 <a:latin typeface="Verdana"/>
                 <a:cs typeface="ＭＳ Ｐゴシック" pitchFamily="-111" charset="-128"/>
               </a:rPr>
-              <a:t>Definerer</a:t>
+              <a:t>definerer</a:t>
             </a:r>
           </a:p>
         </p:txBody>
@@ -11985,7 +11964,7 @@
                 <a:latin typeface="Verdana"/>
                 <a:cs typeface="ＭＳ Ｐゴシック" pitchFamily="-111" charset="-128"/>
               </a:rPr>
-              <a:t>Matches med</a:t>
+              <a:t>matches med</a:t>
             </a:r>
           </a:p>
         </p:txBody>
@@ -12041,7 +12020,7 @@
                 <a:latin typeface="Verdana"/>
                 <a:cs typeface="ＭＳ Ｐゴシック" pitchFamily="-111" charset="-128"/>
               </a:rPr>
-              <a:t>Associeres med </a:t>
+              <a:t>associeres med </a:t>
             </a:r>
           </a:p>
         </p:txBody>
@@ -12280,10 +12259,10 @@
             <a:r>
               <a:rPr lang="da-DK" sz="1600" b="1" dirty="0">
                 <a:solidFill>
-                  <a:srgbClr val="1F497D"/>
+                  <a:srgbClr val="940027"/>
                 </a:solidFill>
               </a:rPr>
-              <a:t>organisation</a:t>
+              <a:t>brugerorganisation</a:t>
             </a:r>
           </a:p>
           <a:p>
@@ -12580,7 +12559,7 @@
                 <a:ea typeface="ＭＳ Ｐゴシック" pitchFamily="-111" charset="-128"/>
                 <a:cs typeface="ＭＳ Ｐゴシック" pitchFamily="-111" charset="-128"/>
               </a:rPr>
-              <a:t>Registrering</a:t>
+              <a:t>registrering</a:t>
             </a:r>
           </a:p>
         </p:txBody>
@@ -12686,7 +12665,7 @@
                 <a:ea typeface="ＭＳ Ｐゴシック" pitchFamily="-111" charset="-128"/>
                 <a:cs typeface="ＭＳ Ｐゴシック" pitchFamily="-111" charset="-128"/>
               </a:rPr>
-              <a:t>Udstedelse af identifikations</a:t>
+              <a:t>udstedelse af identifikations</a:t>
             </a:r>
             <a:r>
               <a:rPr lang="da-DK" sz="1200" b="1" dirty="0">
@@ -12819,7 +12798,7 @@
                 <a:ea typeface="ＭＳ Ｐゴシック" pitchFamily="-111" charset="-128"/>
                 <a:cs typeface="ＭＳ Ｐゴシック" pitchFamily="-111" charset="-128"/>
               </a:rPr>
-              <a:t>Attribut-tjeneste</a:t>
+              <a:t>attribut-tjeneste</a:t>
             </a:r>
           </a:p>
         </p:txBody>
@@ -12925,7 +12904,7 @@
                 <a:ea typeface="ＭＳ Ｐゴシック" pitchFamily="-111" charset="-128"/>
                 <a:cs typeface="ＭＳ Ｐゴシック" pitchFamily="-111" charset="-128"/>
               </a:rPr>
-              <a:t>Autentifikation</a:t>
+              <a:t>autentifikation</a:t>
             </a:r>
           </a:p>
         </p:txBody>
@@ -12981,8 +12960,8 @@
         </p:nvSpPr>
         <p:spPr bwMode="auto">
           <a:xfrm>
-            <a:off x="3568452" y="5011595"/>
-            <a:ext cx="1296144" cy="184666"/>
+            <a:off x="3491176" y="4990352"/>
+            <a:ext cx="1089577" cy="380938"/>
           </a:xfrm>
           <a:prstGeom prst="rect">
             <a:avLst/>
@@ -13031,7 +13010,7 @@
                 <a:ea typeface="ＭＳ Ｐゴシック" pitchFamily="-111" charset="-128"/>
                 <a:cs typeface="ＭＳ Ｐゴシック" pitchFamily="-111" charset="-128"/>
               </a:rPr>
-              <a:t>Broker</a:t>
+              <a:t>identitets-broker</a:t>
             </a:r>
           </a:p>
         </p:txBody>
@@ -13137,7 +13116,7 @@
                 <a:ea typeface="ＭＳ Ｐゴシック" pitchFamily="-111" charset="-128"/>
                 <a:cs typeface="ＭＳ Ｐゴシック" pitchFamily="-111" charset="-128"/>
               </a:rPr>
-              <a:t>Adgangs-kontrol</a:t>
+              <a:t>adgangs-kontrol</a:t>
             </a:r>
             <a:endParaRPr kumimoji="0" lang="da-DK" sz="1200" b="1" i="0" u="none" strike="noStrike" kern="1200" cap="none" spc="0" normalizeH="0" baseline="0" noProof="0" dirty="0">
               <a:ln>
@@ -13257,7 +13236,7 @@
                 <a:ea typeface="ＭＳ Ｐゴシック" pitchFamily="-111" charset="-128"/>
                 <a:cs typeface="ＭＳ Ｐゴシック" pitchFamily="-111" charset="-128"/>
               </a:rPr>
-              <a:t>Tjeneste</a:t>
+              <a:t>tjeneste</a:t>
             </a:r>
           </a:p>
         </p:txBody>
@@ -13531,7 +13510,7 @@
         </p:nvSpPr>
         <p:spPr bwMode="auto">
           <a:xfrm rot="16200000">
-            <a:off x="-26267" y="4134527"/>
+            <a:off x="-26267" y="4494567"/>
             <a:ext cx="1497867" cy="259430"/>
           </a:xfrm>
           <a:prstGeom prst="rect">
@@ -13885,7 +13864,7 @@
                 <a:ea typeface="ＭＳ Ｐゴシック" pitchFamily="-111" charset="-128"/>
                 <a:cs typeface="ＭＳ Ｐゴシック" pitchFamily="-111" charset="-128"/>
               </a:rPr>
-              <a:t>Identifikations-</a:t>
+              <a:t>identifikations-</a:t>
             </a:r>
           </a:p>
           <a:p>
@@ -14028,7 +14007,7 @@
         </p:nvSpPr>
         <p:spPr bwMode="auto">
           <a:xfrm>
-            <a:off x="3387893" y="5404574"/>
+            <a:off x="3286894" y="5473332"/>
             <a:ext cx="1296144" cy="184666"/>
           </a:xfrm>
           <a:prstGeom prst="rect">
@@ -14052,7 +14031,7 @@
           </a:bodyPr>
           <a:lstStyle/>
           <a:p>
-            <a:pPr marL="12700" marR="0" indent="-25400" algn="l" defTabSz="457200" rtl="0" eaLnBrk="0" fontAlgn="base" latinLnBrk="0" hangingPunct="0">
+            <a:pPr marL="12700" marR="0" indent="-25400" algn="ctr" defTabSz="457200" rtl="0" eaLnBrk="0" fontAlgn="base" latinLnBrk="0" hangingPunct="0">
               <a:spcBef>
                 <a:spcPct val="0"/>
               </a:spcBef>
@@ -14078,7 +14057,7 @@
                 <a:ea typeface="ＭＳ Ｐゴシック" pitchFamily="-111" charset="-128"/>
                 <a:cs typeface="ＭＳ Ｐゴシック" pitchFamily="-111" charset="-128"/>
               </a:rPr>
-              <a:t>Adgangsbillet</a:t>
+              <a:t>adgangsbillet</a:t>
             </a:r>
           </a:p>
         </p:txBody>
@@ -14093,15 +14072,16 @@
             </a:extLst>
           </p:cNvPr>
           <p:cNvCxnSpPr>
-            <a:stCxn id="33" idx="0"/>
+            <a:cxnSpLocks/>
+            <a:stCxn id="33" idx="3"/>
             <a:endCxn id="32" idx="2"/>
           </p:cNvCxnSpPr>
           <p:nvPr/>
         </p:nvCxnSpPr>
         <p:spPr>
           <a:xfrm flipV="1">
-            <a:off x="4035965" y="4756204"/>
-            <a:ext cx="944600" cy="648370"/>
+            <a:off x="4583038" y="4756204"/>
+            <a:ext cx="397527" cy="809461"/>
           </a:xfrm>
           <a:prstGeom prst="straightConnector1">
             <a:avLst/>
@@ -14140,6 +14120,7 @@
           </p:cNvPr>
           <p:cNvCxnSpPr>
             <a:cxnSpLocks/>
+            <a:stCxn id="33" idx="1"/>
             <a:endCxn id="31" idx="2"/>
           </p:cNvCxnSpPr>
           <p:nvPr/>
@@ -14147,7 +14128,7 @@
         <p:spPr>
           <a:xfrm flipH="1" flipV="1">
             <a:off x="2854846" y="4731890"/>
-            <a:ext cx="993617" cy="672684"/>
+            <a:ext cx="432048" cy="833775"/>
           </a:xfrm>
           <a:prstGeom prst="straightConnector1">
             <a:avLst/>
@@ -14467,7 +14448,7 @@
                 <a:ea typeface="ＭＳ Ｐゴシック" pitchFamily="-111" charset="-128"/>
                 <a:cs typeface="ＭＳ Ｐゴシック" pitchFamily="-111" charset="-128"/>
               </a:rPr>
-              <a:t>Identifikations-middel</a:t>
+              <a:t>identifikations-middel</a:t>
             </a:r>
           </a:p>
         </p:txBody>
@@ -14579,7 +14560,7 @@
         <p:spPr bwMode="auto">
           <a:xfrm>
             <a:off x="10526316" y="3031571"/>
-            <a:ext cx="1455560" cy="380938"/>
+            <a:ext cx="969490" cy="380938"/>
           </a:xfrm>
           <a:prstGeom prst="rect">
             <a:avLst/>
@@ -14621,7 +14602,7 @@
                 <a:latin typeface="Verdana"/>
                 <a:cs typeface="ＭＳ Ｐゴシック" pitchFamily="-111" charset="-128"/>
               </a:rPr>
-              <a:t>Elektronisk identitet</a:t>
+              <a:t>digital identitet</a:t>
             </a:r>
             <a:endParaRPr kumimoji="0" lang="da-DK" sz="1200" b="1" i="0" u="none" strike="noStrike" kern="1200" cap="none" spc="0" normalizeH="0" baseline="0" noProof="0" dirty="0">
               <a:ln>

</xml_diff>

<commit_message>
Figurer og minus fed
</commit_message>
<xml_diff>
--- a/Figurer.pptx
+++ b/Figurer.pptx
@@ -5,21 +5,22 @@
     <p:sldMasterId id="2147483648" r:id="rId1"/>
   </p:sldMasterIdLst>
   <p:notesMasterIdLst>
-    <p:notesMasterId r:id="rId11"/>
+    <p:notesMasterId r:id="rId12"/>
   </p:notesMasterIdLst>
   <p:handoutMasterIdLst>
-    <p:handoutMasterId r:id="rId12"/>
+    <p:handoutMasterId r:id="rId13"/>
   </p:handoutMasterIdLst>
   <p:sldIdLst>
     <p:sldId id="329" r:id="rId2"/>
     <p:sldId id="311" r:id="rId3"/>
     <p:sldId id="324" r:id="rId4"/>
     <p:sldId id="330" r:id="rId5"/>
-    <p:sldId id="331" r:id="rId6"/>
-    <p:sldId id="332" r:id="rId7"/>
-    <p:sldId id="333" r:id="rId8"/>
-    <p:sldId id="327" r:id="rId9"/>
-    <p:sldId id="328" r:id="rId10"/>
+    <p:sldId id="334" r:id="rId6"/>
+    <p:sldId id="331" r:id="rId7"/>
+    <p:sldId id="332" r:id="rId8"/>
+    <p:sldId id="333" r:id="rId9"/>
+    <p:sldId id="327" r:id="rId10"/>
+    <p:sldId id="328" r:id="rId11"/>
   </p:sldIdLst>
   <p:sldSz cx="12192000" cy="6858000"/>
   <p:notesSz cx="7099300" cy="10234613"/>
@@ -9534,6 +9535,970 @@
 </p:sld>
 </file>
 
+<file path=ppt/slides/slide10.xml><?xml version="1.0" encoding="utf-8"?>
+<p:sld xmlns:a="http://schemas.openxmlformats.org/drawingml/2006/main" xmlns:r="http://schemas.openxmlformats.org/officeDocument/2006/relationships" xmlns:p="http://schemas.openxmlformats.org/presentationml/2006/main">
+  <p:cSld>
+    <p:spTree>
+      <p:nvGrpSpPr>
+        <p:cNvPr id="1" name=""/>
+        <p:cNvGrpSpPr/>
+        <p:nvPr/>
+      </p:nvGrpSpPr>
+      <p:grpSpPr>
+        <a:xfrm>
+          <a:off x="0" y="0"/>
+          <a:ext cx="0" cy="0"/>
+          <a:chOff x="0" y="0"/>
+          <a:chExt cx="0" cy="0"/>
+        </a:xfrm>
+      </p:grpSpPr>
+      <p:sp>
+        <p:nvSpPr>
+          <p:cNvPr id="2" name="Title 1">
+            <a:extLst>
+              <a:ext uri="{FF2B5EF4-FFF2-40B4-BE49-F238E27FC236}">
+                <a16:creationId xmlns:a16="http://schemas.microsoft.com/office/drawing/2014/main" id="{E8C2DD57-F068-4A07-BE77-DB8D684B0151}"/>
+              </a:ext>
+            </a:extLst>
+          </p:cNvPr>
+          <p:cNvSpPr>
+            <a:spLocks noGrp="1"/>
+          </p:cNvSpPr>
+          <p:nvPr>
+            <p:ph type="title"/>
+          </p:nvPr>
+        </p:nvSpPr>
+        <p:spPr/>
+        <p:txBody>
+          <a:bodyPr/>
+          <a:lstStyle/>
+          <a:p>
+            <a:r>
+              <a:rPr lang="da-DK" dirty="0"/>
+              <a:t>Brug af tjenester – lagdeling – Identitetsbaseret kald</a:t>
+            </a:r>
+          </a:p>
+        </p:txBody>
+      </p:sp>
+      <p:sp>
+        <p:nvSpPr>
+          <p:cNvPr id="4" name="Slide Number Placeholder 3">
+            <a:extLst>
+              <a:ext uri="{FF2B5EF4-FFF2-40B4-BE49-F238E27FC236}">
+                <a16:creationId xmlns:a16="http://schemas.microsoft.com/office/drawing/2014/main" id="{D5E0A99A-F871-400F-963A-E4D4A890B575}"/>
+              </a:ext>
+            </a:extLst>
+          </p:cNvPr>
+          <p:cNvSpPr>
+            <a:spLocks noGrp="1"/>
+          </p:cNvSpPr>
+          <p:nvPr>
+            <p:ph type="sldNum" sz="quarter" idx="12"/>
+          </p:nvPr>
+        </p:nvSpPr>
+        <p:spPr/>
+        <p:txBody>
+          <a:bodyPr/>
+          <a:lstStyle/>
+          <a:p>
+            <a:fld id="{80AE25ED-097C-4BDC-A7CE-FA97BD9CA3B5}" type="slidenum">
+              <a:rPr lang="da-DK" smtClean="0"/>
+              <a:pPr/>
+              <a:t>10</a:t>
+            </a:fld>
+            <a:endParaRPr lang="da-DK" dirty="0"/>
+          </a:p>
+        </p:txBody>
+      </p:sp>
+      <p:sp>
+        <p:nvSpPr>
+          <p:cNvPr id="5" name="Rectangle 4">
+            <a:extLst>
+              <a:ext uri="{FF2B5EF4-FFF2-40B4-BE49-F238E27FC236}">
+                <a16:creationId xmlns:a16="http://schemas.microsoft.com/office/drawing/2014/main" id="{80F23CFE-4731-4BD8-9F2C-4A24DF23AC26}"/>
+              </a:ext>
+            </a:extLst>
+          </p:cNvPr>
+          <p:cNvSpPr/>
+          <p:nvPr/>
+        </p:nvSpPr>
+        <p:spPr bwMode="auto">
+          <a:xfrm>
+            <a:off x="2927654" y="1916832"/>
+            <a:ext cx="2088226" cy="432047"/>
+          </a:xfrm>
+          <a:prstGeom prst="rect">
+            <a:avLst/>
+          </a:prstGeom>
+          <a:solidFill>
+            <a:schemeClr val="bg1"/>
+          </a:solidFill>
+          <a:ln w="6350" cap="flat" cmpd="sng" algn="ctr">
+            <a:solidFill>
+              <a:schemeClr val="accent2"/>
+            </a:solidFill>
+            <a:prstDash val="solid"/>
+            <a:round/>
+            <a:headEnd type="none" w="med" len="med"/>
+            <a:tailEnd type="none" w="med" len="med"/>
+          </a:ln>
+          <a:effectLst/>
+        </p:spPr>
+        <p:txBody>
+          <a:bodyPr vert="horz" wrap="none" lIns="90000" tIns="46800" rIns="90000" bIns="46800" numCol="1" rtlCol="0" anchor="ctr" anchorCtr="0" compatLnSpc="1">
+            <a:prstTxWarp prst="textNoShape">
+              <a:avLst/>
+            </a:prstTxWarp>
+          </a:bodyPr>
+          <a:lstStyle/>
+          <a:p>
+            <a:pPr marL="0" marR="0" indent="0" algn="ctr" defTabSz="914400" rtl="0" eaLnBrk="1" fontAlgn="base" latinLnBrk="0" hangingPunct="1">
+              <a:lnSpc>
+                <a:spcPct val="100000"/>
+              </a:lnSpc>
+              <a:spcBef>
+                <a:spcPts val="1100"/>
+              </a:spcBef>
+              <a:spcAft>
+                <a:spcPct val="0"/>
+              </a:spcAft>
+              <a:buClrTx/>
+              <a:buSzTx/>
+              <a:buFontTx/>
+              <a:buNone/>
+              <a:tabLst/>
+            </a:pPr>
+            <a:r>
+              <a:rPr kumimoji="0" lang="da-DK" sz="2000" b="0" i="0" u="none" strike="noStrike" cap="none" normalizeH="0" baseline="0" dirty="0">
+                <a:ln>
+                  <a:noFill/>
+                </a:ln>
+                <a:solidFill>
+                  <a:schemeClr val="accent2"/>
+                </a:solidFill>
+                <a:effectLst/>
+                <a:latin typeface="Arial" charset="0"/>
+              </a:rPr>
+              <a:t>Bruger A</a:t>
+            </a:r>
+          </a:p>
+        </p:txBody>
+      </p:sp>
+      <p:sp>
+        <p:nvSpPr>
+          <p:cNvPr id="6" name="Rectangle 5">
+            <a:extLst>
+              <a:ext uri="{FF2B5EF4-FFF2-40B4-BE49-F238E27FC236}">
+                <a16:creationId xmlns:a16="http://schemas.microsoft.com/office/drawing/2014/main" id="{C0F2F510-D8B5-4DE6-89D3-0536FB18E341}"/>
+              </a:ext>
+            </a:extLst>
+          </p:cNvPr>
+          <p:cNvSpPr/>
+          <p:nvPr/>
+        </p:nvSpPr>
+        <p:spPr bwMode="auto">
+          <a:xfrm>
+            <a:off x="2927654" y="2767288"/>
+            <a:ext cx="2088226" cy="805728"/>
+          </a:xfrm>
+          <a:prstGeom prst="rect">
+            <a:avLst/>
+          </a:prstGeom>
+          <a:solidFill>
+            <a:schemeClr val="bg1"/>
+          </a:solidFill>
+          <a:ln w="6350" cap="flat" cmpd="sng" algn="ctr">
+            <a:solidFill>
+              <a:schemeClr val="accent2"/>
+            </a:solidFill>
+            <a:prstDash val="solid"/>
+            <a:round/>
+            <a:headEnd type="none" w="med" len="med"/>
+            <a:tailEnd type="none" w="med" len="med"/>
+          </a:ln>
+          <a:effectLst/>
+        </p:spPr>
+        <p:txBody>
+          <a:bodyPr vert="horz" wrap="none" lIns="90000" tIns="46800" rIns="90000" bIns="46800" numCol="1" rtlCol="0" anchor="ctr" anchorCtr="0" compatLnSpc="1">
+            <a:prstTxWarp prst="textNoShape">
+              <a:avLst/>
+            </a:prstTxWarp>
+          </a:bodyPr>
+          <a:lstStyle/>
+          <a:p>
+            <a:pPr marL="0" marR="0" indent="0" algn="ctr" defTabSz="914400" rtl="0" eaLnBrk="1" fontAlgn="base" latinLnBrk="0" hangingPunct="1">
+              <a:lnSpc>
+                <a:spcPct val="100000"/>
+              </a:lnSpc>
+              <a:spcBef>
+                <a:spcPts val="1100"/>
+              </a:spcBef>
+              <a:spcAft>
+                <a:spcPct val="0"/>
+              </a:spcAft>
+              <a:buClrTx/>
+              <a:buSzTx/>
+              <a:buFontTx/>
+              <a:buNone/>
+              <a:tabLst/>
+            </a:pPr>
+            <a:r>
+              <a:rPr kumimoji="0" lang="da-DK" sz="2000" b="0" i="0" u="none" strike="noStrike" cap="none" normalizeH="0" baseline="0" dirty="0">
+                <a:ln>
+                  <a:noFill/>
+                </a:ln>
+                <a:solidFill>
+                  <a:schemeClr val="accent2"/>
+                </a:solidFill>
+                <a:effectLst/>
+                <a:latin typeface="Arial" charset="0"/>
+              </a:rPr>
+              <a:t>Tjeneste B</a:t>
+            </a:r>
+          </a:p>
+          <a:p>
+            <a:pPr marL="0" marR="0" indent="0" algn="ctr" defTabSz="914400" rtl="0" eaLnBrk="1" fontAlgn="base" latinLnBrk="0" hangingPunct="1">
+              <a:lnSpc>
+                <a:spcPct val="100000"/>
+              </a:lnSpc>
+              <a:spcBef>
+                <a:spcPts val="1100"/>
+              </a:spcBef>
+              <a:spcAft>
+                <a:spcPct val="0"/>
+              </a:spcAft>
+              <a:buClrTx/>
+              <a:buSzTx/>
+              <a:buFontTx/>
+              <a:buNone/>
+              <a:tabLst/>
+            </a:pPr>
+            <a:r>
+              <a:rPr lang="da-DK" sz="2000" dirty="0">
+                <a:solidFill>
+                  <a:schemeClr val="accent2"/>
+                </a:solidFill>
+              </a:rPr>
+              <a:t>Tjeneste B bruger</a:t>
+            </a:r>
+            <a:endParaRPr kumimoji="0" lang="da-DK" sz="2000" b="0" i="0" u="none" strike="noStrike" cap="none" normalizeH="0" baseline="0" dirty="0">
+              <a:ln>
+                <a:noFill/>
+              </a:ln>
+              <a:solidFill>
+                <a:schemeClr val="accent2"/>
+              </a:solidFill>
+              <a:effectLst/>
+              <a:latin typeface="Arial" charset="0"/>
+            </a:endParaRPr>
+          </a:p>
+        </p:txBody>
+      </p:sp>
+      <p:cxnSp>
+        <p:nvCxnSpPr>
+          <p:cNvPr id="12" name="Straight Connector 11">
+            <a:extLst>
+              <a:ext uri="{FF2B5EF4-FFF2-40B4-BE49-F238E27FC236}">
+                <a16:creationId xmlns:a16="http://schemas.microsoft.com/office/drawing/2014/main" id="{9ED7741A-D18B-4371-A916-154DBC5D6BB4}"/>
+              </a:ext>
+            </a:extLst>
+          </p:cNvPr>
+          <p:cNvCxnSpPr>
+            <a:cxnSpLocks/>
+            <a:stCxn id="6" idx="1"/>
+            <a:endCxn id="6" idx="3"/>
+          </p:cNvCxnSpPr>
+          <p:nvPr/>
+        </p:nvCxnSpPr>
+        <p:spPr bwMode="auto">
+          <a:xfrm>
+            <a:off x="2927654" y="3170152"/>
+            <a:ext cx="2088226" cy="0"/>
+          </a:xfrm>
+          <a:prstGeom prst="line">
+            <a:avLst/>
+          </a:prstGeom>
+          <a:solidFill>
+            <a:schemeClr val="accent1"/>
+          </a:solidFill>
+          <a:ln w="6350" cap="flat" cmpd="sng" algn="ctr">
+            <a:solidFill>
+              <a:schemeClr val="accent2"/>
+            </a:solidFill>
+            <a:prstDash val="dash"/>
+            <a:round/>
+            <a:headEnd type="none" w="med" len="med"/>
+            <a:tailEnd type="none" w="med" len="med"/>
+          </a:ln>
+          <a:effectLst/>
+          <a:extLst>
+            <a:ext uri="{AF507438-7753-43E0-B8FC-AC1667EBCBE1}">
+              <a14:hiddenEffects xmlns:a14="http://schemas.microsoft.com/office/drawing/2010/main">
+                <a:effectLst>
+                  <a:outerShdw dist="35921" dir="2700000" algn="ctr" rotWithShape="0">
+                    <a:schemeClr val="bg2"/>
+                  </a:outerShdw>
+                </a:effectLst>
+              </a14:hiddenEffects>
+            </a:ext>
+          </a:extLst>
+        </p:spPr>
+      </p:cxnSp>
+      <p:sp>
+        <p:nvSpPr>
+          <p:cNvPr id="13" name="Rectangle 12">
+            <a:extLst>
+              <a:ext uri="{FF2B5EF4-FFF2-40B4-BE49-F238E27FC236}">
+                <a16:creationId xmlns:a16="http://schemas.microsoft.com/office/drawing/2014/main" id="{E39C6551-9D34-415D-BE85-D8B8B3BBA666}"/>
+              </a:ext>
+            </a:extLst>
+          </p:cNvPr>
+          <p:cNvSpPr/>
+          <p:nvPr/>
+        </p:nvSpPr>
+        <p:spPr bwMode="auto">
+          <a:xfrm>
+            <a:off x="2927654" y="4005064"/>
+            <a:ext cx="2088226" cy="805728"/>
+          </a:xfrm>
+          <a:prstGeom prst="rect">
+            <a:avLst/>
+          </a:prstGeom>
+          <a:solidFill>
+            <a:schemeClr val="bg1"/>
+          </a:solidFill>
+          <a:ln w="6350" cap="flat" cmpd="sng" algn="ctr">
+            <a:solidFill>
+              <a:schemeClr val="accent2"/>
+            </a:solidFill>
+            <a:prstDash val="solid"/>
+            <a:round/>
+            <a:headEnd type="none" w="med" len="med"/>
+            <a:tailEnd type="none" w="med" len="med"/>
+          </a:ln>
+          <a:effectLst/>
+        </p:spPr>
+        <p:txBody>
+          <a:bodyPr vert="horz" wrap="none" lIns="90000" tIns="46800" rIns="90000" bIns="46800" numCol="1" rtlCol="0" anchor="ctr" anchorCtr="0" compatLnSpc="1">
+            <a:prstTxWarp prst="textNoShape">
+              <a:avLst/>
+            </a:prstTxWarp>
+          </a:bodyPr>
+          <a:lstStyle/>
+          <a:p>
+            <a:pPr marL="0" marR="0" indent="0" algn="ctr" defTabSz="914400" rtl="0" eaLnBrk="1" fontAlgn="base" latinLnBrk="0" hangingPunct="1">
+              <a:lnSpc>
+                <a:spcPct val="100000"/>
+              </a:lnSpc>
+              <a:spcBef>
+                <a:spcPts val="1100"/>
+              </a:spcBef>
+              <a:spcAft>
+                <a:spcPct val="0"/>
+              </a:spcAft>
+              <a:buClrTx/>
+              <a:buSzTx/>
+              <a:buFontTx/>
+              <a:buNone/>
+              <a:tabLst/>
+            </a:pPr>
+            <a:r>
+              <a:rPr kumimoji="0" lang="da-DK" sz="2000" b="0" i="0" u="none" strike="noStrike" cap="none" normalizeH="0" baseline="0" dirty="0">
+                <a:ln>
+                  <a:noFill/>
+                </a:ln>
+                <a:solidFill>
+                  <a:schemeClr val="accent2"/>
+                </a:solidFill>
+                <a:effectLst/>
+                <a:latin typeface="Arial" charset="0"/>
+              </a:rPr>
+              <a:t>Tjeneste C</a:t>
+            </a:r>
+          </a:p>
+          <a:p>
+            <a:pPr marL="0" marR="0" indent="0" algn="ctr" defTabSz="914400" rtl="0" eaLnBrk="1" fontAlgn="base" latinLnBrk="0" hangingPunct="1">
+              <a:lnSpc>
+                <a:spcPct val="100000"/>
+              </a:lnSpc>
+              <a:spcBef>
+                <a:spcPts val="1100"/>
+              </a:spcBef>
+              <a:spcAft>
+                <a:spcPct val="0"/>
+              </a:spcAft>
+              <a:buClrTx/>
+              <a:buSzTx/>
+              <a:buFontTx/>
+              <a:buNone/>
+              <a:tabLst/>
+            </a:pPr>
+            <a:r>
+              <a:rPr lang="da-DK" sz="2000" dirty="0">
+                <a:solidFill>
+                  <a:schemeClr val="accent2">
+                    <a:lumMod val="20000"/>
+                    <a:lumOff val="80000"/>
+                  </a:schemeClr>
+                </a:solidFill>
+              </a:rPr>
+              <a:t>Tjeneste C bruger </a:t>
+            </a:r>
+            <a:endParaRPr kumimoji="0" lang="da-DK" sz="2000" b="0" i="0" u="none" strike="noStrike" cap="none" normalizeH="0" baseline="0" dirty="0">
+              <a:ln>
+                <a:noFill/>
+              </a:ln>
+              <a:solidFill>
+                <a:schemeClr val="accent2">
+                  <a:lumMod val="20000"/>
+                  <a:lumOff val="80000"/>
+                </a:schemeClr>
+              </a:solidFill>
+              <a:effectLst/>
+            </a:endParaRPr>
+          </a:p>
+        </p:txBody>
+      </p:sp>
+      <p:cxnSp>
+        <p:nvCxnSpPr>
+          <p:cNvPr id="14" name="Straight Connector 13">
+            <a:extLst>
+              <a:ext uri="{FF2B5EF4-FFF2-40B4-BE49-F238E27FC236}">
+                <a16:creationId xmlns:a16="http://schemas.microsoft.com/office/drawing/2014/main" id="{D6644FC3-5A0D-4A2D-BB30-A6FC39356F3F}"/>
+              </a:ext>
+            </a:extLst>
+          </p:cNvPr>
+          <p:cNvCxnSpPr>
+            <a:cxnSpLocks/>
+            <a:stCxn id="13" idx="1"/>
+            <a:endCxn id="13" idx="3"/>
+          </p:cNvCxnSpPr>
+          <p:nvPr/>
+        </p:nvCxnSpPr>
+        <p:spPr bwMode="auto">
+          <a:xfrm>
+            <a:off x="2927654" y="4407928"/>
+            <a:ext cx="2088226" cy="0"/>
+          </a:xfrm>
+          <a:prstGeom prst="line">
+            <a:avLst/>
+          </a:prstGeom>
+          <a:solidFill>
+            <a:schemeClr val="accent1"/>
+          </a:solidFill>
+          <a:ln w="6350" cap="flat" cmpd="sng" algn="ctr">
+            <a:solidFill>
+              <a:schemeClr val="accent2"/>
+            </a:solidFill>
+            <a:prstDash val="dash"/>
+            <a:round/>
+            <a:headEnd type="none" w="med" len="med"/>
+            <a:tailEnd type="none" w="med" len="med"/>
+          </a:ln>
+          <a:effectLst/>
+          <a:extLst>
+            <a:ext uri="{AF507438-7753-43E0-B8FC-AC1667EBCBE1}">
+              <a14:hiddenEffects xmlns:a14="http://schemas.microsoft.com/office/drawing/2010/main">
+                <a:effectLst>
+                  <a:outerShdw dist="35921" dir="2700000" algn="ctr" rotWithShape="0">
+                    <a:schemeClr val="bg2"/>
+                  </a:outerShdw>
+                </a:effectLst>
+              </a14:hiddenEffects>
+            </a:ext>
+          </a:extLst>
+        </p:spPr>
+      </p:cxnSp>
+      <p:cxnSp>
+        <p:nvCxnSpPr>
+          <p:cNvPr id="16" name="Straight Arrow Connector 15">
+            <a:extLst>
+              <a:ext uri="{FF2B5EF4-FFF2-40B4-BE49-F238E27FC236}">
+                <a16:creationId xmlns:a16="http://schemas.microsoft.com/office/drawing/2014/main" id="{53FB724D-ACE7-4FBE-A125-2A0B72DC5C0A}"/>
+              </a:ext>
+            </a:extLst>
+          </p:cNvPr>
+          <p:cNvCxnSpPr>
+            <a:cxnSpLocks/>
+            <a:stCxn id="5" idx="2"/>
+            <a:endCxn id="6" idx="0"/>
+          </p:cNvCxnSpPr>
+          <p:nvPr/>
+        </p:nvCxnSpPr>
+        <p:spPr bwMode="auto">
+          <a:xfrm>
+            <a:off x="3971767" y="2348879"/>
+            <a:ext cx="0" cy="418409"/>
+          </a:xfrm>
+          <a:prstGeom prst="straightConnector1">
+            <a:avLst/>
+          </a:prstGeom>
+          <a:solidFill>
+            <a:schemeClr val="accent1"/>
+          </a:solidFill>
+          <a:ln w="25400" cap="flat" cmpd="sng" algn="ctr">
+            <a:solidFill>
+              <a:schemeClr val="accent2"/>
+            </a:solidFill>
+            <a:prstDash val="solid"/>
+            <a:round/>
+            <a:headEnd type="none" w="med" len="med"/>
+            <a:tailEnd type="triangle" w="lg" len="med"/>
+          </a:ln>
+          <a:effectLst/>
+          <a:extLst>
+            <a:ext uri="{AF507438-7753-43E0-B8FC-AC1667EBCBE1}">
+              <a14:hiddenEffects xmlns:a14="http://schemas.microsoft.com/office/drawing/2010/main">
+                <a:effectLst>
+                  <a:outerShdw dist="35921" dir="2700000" algn="ctr" rotWithShape="0">
+                    <a:schemeClr val="bg2"/>
+                  </a:outerShdw>
+                </a:effectLst>
+              </a14:hiddenEffects>
+            </a:ext>
+          </a:extLst>
+        </p:spPr>
+      </p:cxnSp>
+      <p:cxnSp>
+        <p:nvCxnSpPr>
+          <p:cNvPr id="19" name="Straight Arrow Connector 18">
+            <a:extLst>
+              <a:ext uri="{FF2B5EF4-FFF2-40B4-BE49-F238E27FC236}">
+                <a16:creationId xmlns:a16="http://schemas.microsoft.com/office/drawing/2014/main" id="{60D33D2F-ECCA-4BBD-9D9F-59A6873FA12E}"/>
+              </a:ext>
+            </a:extLst>
+          </p:cNvPr>
+          <p:cNvCxnSpPr>
+            <a:cxnSpLocks/>
+            <a:stCxn id="6" idx="2"/>
+            <a:endCxn id="13" idx="0"/>
+          </p:cNvCxnSpPr>
+          <p:nvPr/>
+        </p:nvCxnSpPr>
+        <p:spPr bwMode="auto">
+          <a:xfrm>
+            <a:off x="3971767" y="3573016"/>
+            <a:ext cx="0" cy="432048"/>
+          </a:xfrm>
+          <a:prstGeom prst="straightConnector1">
+            <a:avLst/>
+          </a:prstGeom>
+          <a:solidFill>
+            <a:schemeClr val="accent1"/>
+          </a:solidFill>
+          <a:ln w="25400" cap="flat" cmpd="sng" algn="ctr">
+            <a:solidFill>
+              <a:schemeClr val="accent2"/>
+            </a:solidFill>
+            <a:prstDash val="solid"/>
+            <a:round/>
+            <a:headEnd type="none" w="med" len="med"/>
+            <a:tailEnd type="triangle" w="lg" len="med"/>
+          </a:ln>
+          <a:effectLst/>
+          <a:extLst>
+            <a:ext uri="{AF507438-7753-43E0-B8FC-AC1667EBCBE1}">
+              <a14:hiddenEffects xmlns:a14="http://schemas.microsoft.com/office/drawing/2010/main">
+                <a:effectLst>
+                  <a:outerShdw dist="35921" dir="2700000" algn="ctr" rotWithShape="0">
+                    <a:schemeClr val="bg2"/>
+                  </a:outerShdw>
+                </a:effectLst>
+              </a14:hiddenEffects>
+            </a:ext>
+          </a:extLst>
+        </p:spPr>
+      </p:cxnSp>
+      <p:cxnSp>
+        <p:nvCxnSpPr>
+          <p:cNvPr id="22" name="Straight Arrow Connector 21">
+            <a:extLst>
+              <a:ext uri="{FF2B5EF4-FFF2-40B4-BE49-F238E27FC236}">
+                <a16:creationId xmlns:a16="http://schemas.microsoft.com/office/drawing/2014/main" id="{F68B9EE7-1B53-4F23-A853-ED05AF334C44}"/>
+              </a:ext>
+            </a:extLst>
+          </p:cNvPr>
+          <p:cNvCxnSpPr>
+            <a:cxnSpLocks/>
+            <a:stCxn id="13" idx="2"/>
+          </p:cNvCxnSpPr>
+          <p:nvPr/>
+        </p:nvCxnSpPr>
+        <p:spPr bwMode="auto">
+          <a:xfrm>
+            <a:off x="3971767" y="4810792"/>
+            <a:ext cx="0" cy="274392"/>
+          </a:xfrm>
+          <a:prstGeom prst="straightConnector1">
+            <a:avLst/>
+          </a:prstGeom>
+          <a:solidFill>
+            <a:schemeClr val="accent1"/>
+          </a:solidFill>
+          <a:ln w="25400" cap="flat" cmpd="sng" algn="ctr">
+            <a:solidFill>
+              <a:schemeClr val="accent2">
+                <a:lumMod val="20000"/>
+                <a:lumOff val="80000"/>
+              </a:schemeClr>
+            </a:solidFill>
+            <a:prstDash val="solid"/>
+            <a:round/>
+            <a:headEnd type="none" w="med" len="med"/>
+            <a:tailEnd type="triangle" w="lg" len="med"/>
+          </a:ln>
+          <a:effectLst/>
+          <a:extLst>
+            <a:ext uri="{AF507438-7753-43E0-B8FC-AC1667EBCBE1}">
+              <a14:hiddenEffects xmlns:a14="http://schemas.microsoft.com/office/drawing/2010/main">
+                <a:effectLst>
+                  <a:outerShdw dist="35921" dir="2700000" algn="ctr" rotWithShape="0">
+                    <a:schemeClr val="bg2"/>
+                  </a:outerShdw>
+                </a:effectLst>
+              </a14:hiddenEffects>
+            </a:ext>
+          </a:extLst>
+        </p:spPr>
+      </p:cxnSp>
+      <p:sp>
+        <p:nvSpPr>
+          <p:cNvPr id="25" name="TextBox 24">
+            <a:extLst>
+              <a:ext uri="{FF2B5EF4-FFF2-40B4-BE49-F238E27FC236}">
+                <a16:creationId xmlns:a16="http://schemas.microsoft.com/office/drawing/2014/main" id="{D6FA640B-E9AE-4AA0-90EB-8759F449D617}"/>
+              </a:ext>
+            </a:extLst>
+          </p:cNvPr>
+          <p:cNvSpPr txBox="1"/>
+          <p:nvPr/>
+        </p:nvSpPr>
+        <p:spPr>
+          <a:xfrm>
+            <a:off x="5902861" y="2081132"/>
+            <a:ext cx="469680" cy="307777"/>
+          </a:xfrm>
+          <a:prstGeom prst="rect">
+            <a:avLst/>
+          </a:prstGeom>
+          <a:noFill/>
+        </p:spPr>
+        <p:txBody>
+          <a:bodyPr wrap="none" lIns="0" tIns="0" rIns="0" bIns="0" rtlCol="0">
+            <a:spAutoFit/>
+          </a:bodyPr>
+          <a:lstStyle/>
+          <a:p>
+            <a:pPr>
+              <a:lnSpc>
+                <a:spcPct val="100000"/>
+              </a:lnSpc>
+              <a:spcBef>
+                <a:spcPts val="1100"/>
+              </a:spcBef>
+            </a:pPr>
+            <a:r>
+              <a:rPr lang="en-GB" sz="2000" dirty="0">
+                <a:solidFill>
+                  <a:schemeClr val="accent2"/>
+                </a:solidFill>
+              </a:rPr>
+              <a:t>Id-A</a:t>
+            </a:r>
+          </a:p>
+        </p:txBody>
+      </p:sp>
+      <p:cxnSp>
+        <p:nvCxnSpPr>
+          <p:cNvPr id="26" name="Straight Arrow Connector 25">
+            <a:extLst>
+              <a:ext uri="{FF2B5EF4-FFF2-40B4-BE49-F238E27FC236}">
+                <a16:creationId xmlns:a16="http://schemas.microsoft.com/office/drawing/2014/main" id="{B586A626-A263-4AF6-B29F-FC4E57C7B579}"/>
+              </a:ext>
+            </a:extLst>
+          </p:cNvPr>
+          <p:cNvCxnSpPr/>
+          <p:nvPr/>
+        </p:nvCxnSpPr>
+        <p:spPr bwMode="auto">
+          <a:xfrm>
+            <a:off x="6115118" y="2443335"/>
+            <a:ext cx="0" cy="553617"/>
+          </a:xfrm>
+          <a:prstGeom prst="straightConnector1">
+            <a:avLst/>
+          </a:prstGeom>
+          <a:solidFill>
+            <a:schemeClr val="accent1"/>
+          </a:solidFill>
+          <a:ln w="25400" cap="flat" cmpd="sng" algn="ctr">
+            <a:solidFill>
+              <a:schemeClr val="accent2"/>
+            </a:solidFill>
+            <a:prstDash val="dash"/>
+            <a:round/>
+            <a:headEnd type="none" w="med" len="med"/>
+            <a:tailEnd type="triangle" w="lg" len="med"/>
+          </a:ln>
+          <a:effectLst/>
+          <a:extLst>
+            <a:ext uri="{AF507438-7753-43E0-B8FC-AC1667EBCBE1}">
+              <a14:hiddenEffects xmlns:a14="http://schemas.microsoft.com/office/drawing/2010/main">
+                <a:effectLst>
+                  <a:outerShdw dist="35921" dir="2700000" algn="ctr" rotWithShape="0">
+                    <a:schemeClr val="bg2"/>
+                  </a:outerShdw>
+                </a:effectLst>
+              </a14:hiddenEffects>
+            </a:ext>
+          </a:extLst>
+        </p:spPr>
+      </p:cxnSp>
+      <p:cxnSp>
+        <p:nvCxnSpPr>
+          <p:cNvPr id="31" name="Straight Arrow Connector 30">
+            <a:extLst>
+              <a:ext uri="{FF2B5EF4-FFF2-40B4-BE49-F238E27FC236}">
+                <a16:creationId xmlns:a16="http://schemas.microsoft.com/office/drawing/2014/main" id="{A61A1522-5953-49DB-A0C7-E8A9EB303EE2}"/>
+              </a:ext>
+            </a:extLst>
+          </p:cNvPr>
+          <p:cNvCxnSpPr/>
+          <p:nvPr/>
+        </p:nvCxnSpPr>
+        <p:spPr bwMode="auto">
+          <a:xfrm>
+            <a:off x="6107019" y="3242160"/>
+            <a:ext cx="0" cy="978928"/>
+          </a:xfrm>
+          <a:prstGeom prst="straightConnector1">
+            <a:avLst/>
+          </a:prstGeom>
+          <a:solidFill>
+            <a:schemeClr val="accent1"/>
+          </a:solidFill>
+          <a:ln w="25400" cap="flat" cmpd="sng" algn="ctr">
+            <a:solidFill>
+              <a:schemeClr val="accent2"/>
+            </a:solidFill>
+            <a:prstDash val="dash"/>
+            <a:round/>
+            <a:headEnd type="none" w="med" len="med"/>
+            <a:tailEnd type="triangle" w="lg" len="med"/>
+          </a:ln>
+          <a:effectLst/>
+          <a:extLst>
+            <a:ext uri="{AF507438-7753-43E0-B8FC-AC1667EBCBE1}">
+              <a14:hiddenEffects xmlns:a14="http://schemas.microsoft.com/office/drawing/2010/main">
+                <a:effectLst>
+                  <a:outerShdw dist="35921" dir="2700000" algn="ctr" rotWithShape="0">
+                    <a:schemeClr val="bg2"/>
+                  </a:outerShdw>
+                </a:effectLst>
+              </a14:hiddenEffects>
+            </a:ext>
+          </a:extLst>
+        </p:spPr>
+      </p:cxnSp>
+      <p:sp>
+        <p:nvSpPr>
+          <p:cNvPr id="32" name="TextBox 31">
+            <a:extLst>
+              <a:ext uri="{FF2B5EF4-FFF2-40B4-BE49-F238E27FC236}">
+                <a16:creationId xmlns:a16="http://schemas.microsoft.com/office/drawing/2014/main" id="{E70D63AC-BCE6-4B92-A9A5-53DDDE35EA98}"/>
+              </a:ext>
+            </a:extLst>
+          </p:cNvPr>
+          <p:cNvSpPr txBox="1"/>
+          <p:nvPr/>
+        </p:nvSpPr>
+        <p:spPr>
+          <a:xfrm>
+            <a:off x="6830866" y="2081132"/>
+            <a:ext cx="469680" cy="307777"/>
+          </a:xfrm>
+          <a:prstGeom prst="rect">
+            <a:avLst/>
+          </a:prstGeom>
+          <a:noFill/>
+        </p:spPr>
+        <p:txBody>
+          <a:bodyPr wrap="none" lIns="0" tIns="0" rIns="0" bIns="0" rtlCol="0">
+            <a:spAutoFit/>
+          </a:bodyPr>
+          <a:lstStyle/>
+          <a:p>
+            <a:pPr>
+              <a:lnSpc>
+                <a:spcPct val="100000"/>
+              </a:lnSpc>
+              <a:spcBef>
+                <a:spcPts val="1100"/>
+              </a:spcBef>
+            </a:pPr>
+            <a:r>
+              <a:rPr lang="en-GB" sz="2000" dirty="0">
+                <a:solidFill>
+                  <a:schemeClr val="accent2"/>
+                </a:solidFill>
+              </a:rPr>
+              <a:t>Id-A</a:t>
+            </a:r>
+          </a:p>
+        </p:txBody>
+      </p:sp>
+      <p:cxnSp>
+        <p:nvCxnSpPr>
+          <p:cNvPr id="33" name="Straight Arrow Connector 32">
+            <a:extLst>
+              <a:ext uri="{FF2B5EF4-FFF2-40B4-BE49-F238E27FC236}">
+                <a16:creationId xmlns:a16="http://schemas.microsoft.com/office/drawing/2014/main" id="{4250500B-9680-4CDE-A6BA-FAB6EA7A6B52}"/>
+              </a:ext>
+            </a:extLst>
+          </p:cNvPr>
+          <p:cNvCxnSpPr/>
+          <p:nvPr/>
+        </p:nvCxnSpPr>
+        <p:spPr bwMode="auto">
+          <a:xfrm>
+            <a:off x="7043123" y="2443335"/>
+            <a:ext cx="0" cy="553617"/>
+          </a:xfrm>
+          <a:prstGeom prst="straightConnector1">
+            <a:avLst/>
+          </a:prstGeom>
+          <a:solidFill>
+            <a:schemeClr val="accent1"/>
+          </a:solidFill>
+          <a:ln w="25400" cap="flat" cmpd="sng" algn="ctr">
+            <a:solidFill>
+              <a:schemeClr val="accent2"/>
+            </a:solidFill>
+            <a:prstDash val="dash"/>
+            <a:round/>
+            <a:headEnd type="none" w="med" len="med"/>
+            <a:tailEnd type="triangle" w="lg" len="med"/>
+          </a:ln>
+          <a:effectLst/>
+          <a:extLst>
+            <a:ext uri="{AF507438-7753-43E0-B8FC-AC1667EBCBE1}">
+              <a14:hiddenEffects xmlns:a14="http://schemas.microsoft.com/office/drawing/2010/main">
+                <a:effectLst>
+                  <a:outerShdw dist="35921" dir="2700000" algn="ctr" rotWithShape="0">
+                    <a:schemeClr val="bg2"/>
+                  </a:outerShdw>
+                </a:effectLst>
+              </a14:hiddenEffects>
+            </a:ext>
+          </a:extLst>
+        </p:spPr>
+      </p:cxnSp>
+      <p:sp>
+        <p:nvSpPr>
+          <p:cNvPr id="34" name="TextBox 33">
+            <a:extLst>
+              <a:ext uri="{FF2B5EF4-FFF2-40B4-BE49-F238E27FC236}">
+                <a16:creationId xmlns:a16="http://schemas.microsoft.com/office/drawing/2014/main" id="{9E0527A7-9205-4948-ACBE-92BE9FA75204}"/>
+              </a:ext>
+            </a:extLst>
+          </p:cNvPr>
+          <p:cNvSpPr txBox="1"/>
+          <p:nvPr/>
+        </p:nvSpPr>
+        <p:spPr>
+          <a:xfrm>
+            <a:off x="6822767" y="3305268"/>
+            <a:ext cx="469680" cy="307777"/>
+          </a:xfrm>
+          <a:prstGeom prst="rect">
+            <a:avLst/>
+          </a:prstGeom>
+          <a:noFill/>
+        </p:spPr>
+        <p:txBody>
+          <a:bodyPr wrap="none" lIns="0" tIns="0" rIns="0" bIns="0" rtlCol="0">
+            <a:spAutoFit/>
+          </a:bodyPr>
+          <a:lstStyle/>
+          <a:p>
+            <a:pPr>
+              <a:lnSpc>
+                <a:spcPct val="100000"/>
+              </a:lnSpc>
+              <a:spcBef>
+                <a:spcPts val="1100"/>
+              </a:spcBef>
+            </a:pPr>
+            <a:r>
+              <a:rPr lang="en-GB" sz="2000" dirty="0">
+                <a:solidFill>
+                  <a:schemeClr val="accent2"/>
+                </a:solidFill>
+              </a:rPr>
+              <a:t>Id-B</a:t>
+            </a:r>
+          </a:p>
+        </p:txBody>
+      </p:sp>
+      <p:cxnSp>
+        <p:nvCxnSpPr>
+          <p:cNvPr id="35" name="Straight Arrow Connector 34">
+            <a:extLst>
+              <a:ext uri="{FF2B5EF4-FFF2-40B4-BE49-F238E27FC236}">
+                <a16:creationId xmlns:a16="http://schemas.microsoft.com/office/drawing/2014/main" id="{22B098AF-B929-4755-8C10-6FA851878C23}"/>
+              </a:ext>
+            </a:extLst>
+          </p:cNvPr>
+          <p:cNvCxnSpPr/>
+          <p:nvPr/>
+        </p:nvCxnSpPr>
+        <p:spPr bwMode="auto">
+          <a:xfrm>
+            <a:off x="7035024" y="3667471"/>
+            <a:ext cx="0" cy="553617"/>
+          </a:xfrm>
+          <a:prstGeom prst="straightConnector1">
+            <a:avLst/>
+          </a:prstGeom>
+          <a:solidFill>
+            <a:schemeClr val="accent1"/>
+          </a:solidFill>
+          <a:ln w="25400" cap="flat" cmpd="sng" algn="ctr">
+            <a:solidFill>
+              <a:schemeClr val="accent2"/>
+            </a:solidFill>
+            <a:prstDash val="dash"/>
+            <a:round/>
+            <a:headEnd type="none" w="med" len="med"/>
+            <a:tailEnd type="triangle" w="lg" len="med"/>
+          </a:ln>
+          <a:effectLst/>
+          <a:extLst>
+            <a:ext uri="{AF507438-7753-43E0-B8FC-AC1667EBCBE1}">
+              <a14:hiddenEffects xmlns:a14="http://schemas.microsoft.com/office/drawing/2010/main">
+                <a:effectLst>
+                  <a:outerShdw dist="35921" dir="2700000" algn="ctr" rotWithShape="0">
+                    <a:schemeClr val="bg2"/>
+                  </a:outerShdw>
+                </a:effectLst>
+              </a14:hiddenEffects>
+            </a:ext>
+          </a:extLst>
+        </p:spPr>
+      </p:cxnSp>
+    </p:spTree>
+    <p:extLst>
+      <p:ext uri="{BB962C8B-B14F-4D97-AF65-F5344CB8AC3E}">
+        <p14:creationId xmlns:p14="http://schemas.microsoft.com/office/powerpoint/2010/main" val="84512271"/>
+      </p:ext>
+    </p:extLst>
+  </p:cSld>
+  <p:clrMapOvr>
+    <a:masterClrMapping/>
+  </p:clrMapOvr>
+</p:sld>
+</file>
+
 <file path=ppt/slides/slide2.xml><?xml version="1.0" encoding="utf-8"?>
 <p:sld xmlns:a="http://schemas.openxmlformats.org/drawingml/2006/main" xmlns:r="http://schemas.openxmlformats.org/officeDocument/2006/relationships" xmlns:p="http://schemas.openxmlformats.org/presentationml/2006/main">
   <p:cSld>
@@ -12057,68 +13022,10 @@
       </p:grpSpPr>
       <p:sp>
         <p:nvSpPr>
-          <p:cNvPr id="2" name="Title 1">
+          <p:cNvPr id="47" name="Rectangle: Rounded Corners 46">
             <a:extLst>
               <a:ext uri="{FF2B5EF4-FFF2-40B4-BE49-F238E27FC236}">
-                <a16:creationId xmlns:a16="http://schemas.microsoft.com/office/drawing/2014/main" id="{8A36D6D5-D851-4C9A-A7F8-61AA8BACF38A}"/>
-              </a:ext>
-            </a:extLst>
-          </p:cNvPr>
-          <p:cNvSpPr>
-            <a:spLocks noGrp="1"/>
-          </p:cNvSpPr>
-          <p:nvPr>
-            <p:ph type="title"/>
-          </p:nvPr>
-        </p:nvSpPr>
-        <p:spPr/>
-        <p:txBody>
-          <a:bodyPr/>
-          <a:lstStyle/>
-          <a:p>
-            <a:r>
-              <a:rPr lang="da-DK" dirty="0"/>
-              <a:t>Bruger og tjenesteudbyder sammenhæng</a:t>
-            </a:r>
-          </a:p>
-        </p:txBody>
-      </p:sp>
-      <p:sp>
-        <p:nvSpPr>
-          <p:cNvPr id="4" name="Slide Number Placeholder 3">
-            <a:extLst>
-              <a:ext uri="{FF2B5EF4-FFF2-40B4-BE49-F238E27FC236}">
-                <a16:creationId xmlns:a16="http://schemas.microsoft.com/office/drawing/2014/main" id="{4C307AFD-1F14-445A-9EFD-9720E7E15583}"/>
-              </a:ext>
-            </a:extLst>
-          </p:cNvPr>
-          <p:cNvSpPr>
-            <a:spLocks noGrp="1"/>
-          </p:cNvSpPr>
-          <p:nvPr>
-            <p:ph type="sldNum" sz="quarter" idx="12"/>
-          </p:nvPr>
-        </p:nvSpPr>
-        <p:spPr/>
-        <p:txBody>
-          <a:bodyPr/>
-          <a:lstStyle/>
-          <a:p>
-            <a:fld id="{80AE25ED-097C-4BDC-A7CE-FA97BD9CA3B5}" type="slidenum">
-              <a:rPr lang="da-DK" smtClean="0"/>
-              <a:pPr/>
-              <a:t>5</a:t>
-            </a:fld>
-            <a:endParaRPr lang="da-DK" dirty="0"/>
-          </a:p>
-        </p:txBody>
-      </p:sp>
-      <p:sp>
-        <p:nvSpPr>
-          <p:cNvPr id="5" name="Rounded Rectangle 3">
-            <a:extLst>
-              <a:ext uri="{FF2B5EF4-FFF2-40B4-BE49-F238E27FC236}">
-                <a16:creationId xmlns:a16="http://schemas.microsoft.com/office/drawing/2014/main" id="{AF219AB7-2A82-45D6-A7B0-F4CADA758742}"/>
+                <a16:creationId xmlns:a16="http://schemas.microsoft.com/office/drawing/2014/main" id="{600E8B1C-2E59-41F8-921B-E6DB3488642D}"/>
               </a:ext>
             </a:extLst>
           </p:cNvPr>
@@ -12127,16 +13034,19 @@
         </p:nvSpPr>
         <p:spPr>
           <a:xfrm>
-            <a:off x="4007768" y="1988840"/>
-            <a:ext cx="3096344" cy="2088232"/>
+            <a:off x="9354332" y="1196753"/>
+            <a:ext cx="2132818" cy="4102611"/>
           </a:xfrm>
           <a:prstGeom prst="roundRect">
-            <a:avLst/>
+            <a:avLst>
+              <a:gd name="adj" fmla="val 8821"/>
+            </a:avLst>
           </a:prstGeom>
-          <a:ln w="50800">
+          <a:ln w="19050">
             <a:solidFill>
               <a:srgbClr val="808080"/>
             </a:solidFill>
+            <a:prstDash val="dash"/>
           </a:ln>
         </p:spPr>
         <p:style>
@@ -12154,63 +13064,325 @@
           </a:fontRef>
         </p:style>
         <p:txBody>
-          <a:bodyPr lIns="108000" tIns="108000" rIns="108000" bIns="108000" rtlCol="0" anchor="ctr"/>
+          <a:bodyPr rtlCol="0" anchor="t" anchorCtr="0"/>
           <a:lstStyle/>
           <a:p>
-            <a:pPr algn="ctr">
-              <a:spcAft>
-                <a:spcPts val="600"/>
-              </a:spcAft>
-            </a:pPr>
-            <a:r>
-              <a:rPr lang="da-DK" sz="1600" b="1" dirty="0"/>
-              <a:t> </a:t>
-            </a:r>
-            <a:r>
-              <a:rPr lang="da-DK" sz="1600" b="1" dirty="0">
-                <a:solidFill>
-                  <a:srgbClr val="940027"/>
+            <a:r>
+              <a:rPr lang="da-DK" sz="1600" dirty="0">
+                <a:solidFill>
+                  <a:srgbClr val="1F497D"/>
                 </a:solidFill>
               </a:rPr>
-              <a:t>Attributsæt</a:t>
-            </a:r>
-          </a:p>
-          <a:p>
-            <a:pPr algn="ctr"/>
-            <a:r>
-              <a:rPr lang="da-DK" sz="1400" dirty="0"/>
-              <a:t>Kræver fælles sprog mellem bruger, organisation og tjenesteudbyder, fx i form af klassifikationer, som er et lukket udfaldsrum af værdier</a:t>
-            </a:r>
-          </a:p>
-        </p:txBody>
-      </p:sp>
-      <p:sp>
-        <p:nvSpPr>
-          <p:cNvPr id="6" name="Right Arrow Callout 4">
+              <a:t>forretningstjeneste</a:t>
+            </a:r>
+          </a:p>
+        </p:txBody>
+      </p:sp>
+      <p:sp>
+        <p:nvSpPr>
+          <p:cNvPr id="46" name="Rectangle: Rounded Corners 45">
             <a:extLst>
               <a:ext uri="{FF2B5EF4-FFF2-40B4-BE49-F238E27FC236}">
-                <a16:creationId xmlns:a16="http://schemas.microsoft.com/office/drawing/2014/main" id="{785C9FE9-149F-4FE1-82A8-3C70936D27E8}"/>
+                <a16:creationId xmlns:a16="http://schemas.microsoft.com/office/drawing/2014/main" id="{7E36B343-7A3F-43AD-9EF1-7743C406688A}"/>
               </a:ext>
             </a:extLst>
           </p:cNvPr>
           <p:cNvSpPr/>
           <p:nvPr/>
         </p:nvSpPr>
-        <p:spPr>
-          <a:xfrm>
-            <a:off x="695400" y="1988840"/>
-            <a:ext cx="3239648" cy="2160240"/>
-          </a:xfrm>
-          <a:prstGeom prst="rightArrowCallout">
+        <p:spPr bwMode="auto">
+          <a:xfrm>
+            <a:off x="7091485" y="1196753"/>
+            <a:ext cx="2262846" cy="4102610"/>
+          </a:xfrm>
+          <a:prstGeom prst="roundRect">
             <a:avLst>
-              <a:gd name="adj1" fmla="val 25000"/>
-              <a:gd name="adj2" fmla="val 25000"/>
-              <a:gd name="adj3" fmla="val 20671"/>
-              <a:gd name="adj4" fmla="val 81624"/>
+              <a:gd name="adj" fmla="val 7105"/>
             </a:avLst>
           </a:prstGeom>
           <a:noFill/>
-          <a:ln w="25400">
+          <a:ln w="19050" cap="flat" cmpd="sng" algn="ctr">
+            <a:solidFill>
+              <a:srgbClr val="808080"/>
+            </a:solidFill>
+            <a:prstDash val="dash"/>
+            <a:round/>
+            <a:headEnd type="none" w="med" len="med"/>
+            <a:tailEnd type="none" w="med" len="med"/>
+          </a:ln>
+          <a:effectLst/>
+        </p:spPr>
+        <p:txBody>
+          <a:bodyPr vert="horz" wrap="square" lIns="90000" tIns="46800" rIns="90000" bIns="46800" numCol="1" rtlCol="0" anchor="t" anchorCtr="0" compatLnSpc="1">
+            <a:prstTxWarp prst="textNoShape">
+              <a:avLst/>
+            </a:prstTxWarp>
+          </a:bodyPr>
+          <a:lstStyle/>
+          <a:p>
+            <a:pPr marL="0" marR="0" indent="0" defTabSz="914400" rtl="0" eaLnBrk="1" fontAlgn="base" latinLnBrk="0" hangingPunct="1">
+              <a:lnSpc>
+                <a:spcPct val="100000"/>
+              </a:lnSpc>
+              <a:spcBef>
+                <a:spcPts val="1100"/>
+              </a:spcBef>
+              <a:spcAft>
+                <a:spcPct val="0"/>
+              </a:spcAft>
+              <a:buClrTx/>
+              <a:buSzTx/>
+              <a:buFontTx/>
+              <a:buNone/>
+              <a:tabLst/>
+            </a:pPr>
+            <a:r>
+              <a:rPr kumimoji="0" lang="da-DK" sz="1600" b="0" i="0" u="none" strike="noStrike" cap="none" normalizeH="0" baseline="0" dirty="0">
+                <a:ln>
+                  <a:noFill/>
+                </a:ln>
+                <a:solidFill>
+                  <a:srgbClr val="940027"/>
+                </a:solidFill>
+                <a:effectLst/>
+                <a:latin typeface="Arial" charset="0"/>
+              </a:rPr>
+              <a:t>adgangskontrol</a:t>
+            </a:r>
+          </a:p>
+        </p:txBody>
+      </p:sp>
+      <p:sp>
+        <p:nvSpPr>
+          <p:cNvPr id="24" name="Rectangle: Rounded Corners 23">
+            <a:extLst>
+              <a:ext uri="{FF2B5EF4-FFF2-40B4-BE49-F238E27FC236}">
+                <a16:creationId xmlns:a16="http://schemas.microsoft.com/office/drawing/2014/main" id="{531D4AEA-6830-4C35-B229-A42039FF4740}"/>
+              </a:ext>
+            </a:extLst>
+          </p:cNvPr>
+          <p:cNvSpPr/>
+          <p:nvPr/>
+        </p:nvSpPr>
+        <p:spPr bwMode="auto">
+          <a:xfrm>
+            <a:off x="4205527" y="1196754"/>
+            <a:ext cx="2650649" cy="4102610"/>
+          </a:xfrm>
+          <a:prstGeom prst="roundRect">
+            <a:avLst>
+              <a:gd name="adj" fmla="val 7105"/>
+            </a:avLst>
+          </a:prstGeom>
+          <a:noFill/>
+          <a:ln w="19050" cap="flat" cmpd="sng" algn="ctr">
+            <a:solidFill>
+              <a:srgbClr val="808080"/>
+            </a:solidFill>
+            <a:prstDash val="lgDash"/>
+            <a:round/>
+            <a:headEnd type="none" w="med" len="med"/>
+            <a:tailEnd type="none" w="med" len="med"/>
+          </a:ln>
+          <a:effectLst/>
+        </p:spPr>
+        <p:txBody>
+          <a:bodyPr vert="horz" wrap="square" lIns="90000" tIns="46800" rIns="90000" bIns="46800" numCol="1" rtlCol="0" anchor="t" anchorCtr="0" compatLnSpc="1">
+            <a:prstTxWarp prst="textNoShape">
+              <a:avLst/>
+            </a:prstTxWarp>
+          </a:bodyPr>
+          <a:lstStyle/>
+          <a:p>
+            <a:pPr marL="0" marR="0" indent="0" defTabSz="914400" rtl="0" eaLnBrk="1" fontAlgn="base" latinLnBrk="0" hangingPunct="1">
+              <a:lnSpc>
+                <a:spcPct val="100000"/>
+              </a:lnSpc>
+              <a:spcBef>
+                <a:spcPts val="1100"/>
+              </a:spcBef>
+              <a:spcAft>
+                <a:spcPct val="0"/>
+              </a:spcAft>
+              <a:buClrTx/>
+              <a:buSzTx/>
+              <a:buFontTx/>
+              <a:buNone/>
+              <a:tabLst/>
+            </a:pPr>
+            <a:r>
+              <a:rPr kumimoji="0" lang="da-DK" sz="1600" b="0" i="0" u="none" strike="noStrike" cap="none" normalizeH="0" baseline="0" dirty="0">
+                <a:ln>
+                  <a:noFill/>
+                </a:ln>
+                <a:solidFill>
+                  <a:srgbClr val="940027"/>
+                </a:solidFill>
+                <a:effectLst/>
+                <a:latin typeface="Arial" charset="0"/>
+              </a:rPr>
+              <a:t>autentifikation</a:t>
+            </a:r>
+          </a:p>
+        </p:txBody>
+      </p:sp>
+      <p:sp>
+        <p:nvSpPr>
+          <p:cNvPr id="3" name="Rectangle: Rounded Corners 2">
+            <a:extLst>
+              <a:ext uri="{FF2B5EF4-FFF2-40B4-BE49-F238E27FC236}">
+                <a16:creationId xmlns:a16="http://schemas.microsoft.com/office/drawing/2014/main" id="{41750732-0674-4BAF-9CD9-9D70309A88FC}"/>
+              </a:ext>
+            </a:extLst>
+          </p:cNvPr>
+          <p:cNvSpPr/>
+          <p:nvPr/>
+        </p:nvSpPr>
+        <p:spPr bwMode="auto">
+          <a:xfrm>
+            <a:off x="263353" y="1196753"/>
+            <a:ext cx="3693859" cy="4102611"/>
+          </a:xfrm>
+          <a:prstGeom prst="roundRect">
+            <a:avLst>
+              <a:gd name="adj" fmla="val 5406"/>
+            </a:avLst>
+          </a:prstGeom>
+          <a:noFill/>
+          <a:ln w="19050" cap="flat" cmpd="sng" algn="ctr">
+            <a:solidFill>
+              <a:srgbClr val="808080"/>
+            </a:solidFill>
+            <a:prstDash val="lgDash"/>
+            <a:round/>
+            <a:headEnd type="none" w="med" len="med"/>
+            <a:tailEnd type="none" w="med" len="med"/>
+          </a:ln>
+          <a:effectLst/>
+        </p:spPr>
+        <p:txBody>
+          <a:bodyPr vert="horz" wrap="square" lIns="90000" tIns="46800" rIns="90000" bIns="46800" numCol="1" rtlCol="0" anchor="t" anchorCtr="0" compatLnSpc="1">
+            <a:prstTxWarp prst="textNoShape">
+              <a:avLst/>
+            </a:prstTxWarp>
+          </a:bodyPr>
+          <a:lstStyle/>
+          <a:p>
+            <a:pPr marL="0" marR="0" indent="0" defTabSz="914400" rtl="0" eaLnBrk="1" fontAlgn="base" latinLnBrk="0" hangingPunct="1">
+              <a:lnSpc>
+                <a:spcPct val="100000"/>
+              </a:lnSpc>
+              <a:spcBef>
+                <a:spcPts val="1100"/>
+              </a:spcBef>
+              <a:spcAft>
+                <a:spcPct val="0"/>
+              </a:spcAft>
+              <a:buClrTx/>
+              <a:buSzTx/>
+              <a:buFontTx/>
+              <a:buNone/>
+              <a:tabLst/>
+            </a:pPr>
+            <a:r>
+              <a:rPr kumimoji="0" lang="da-DK" sz="1600" b="0" i="0" u="none" strike="noStrike" cap="none" normalizeH="0" baseline="0" dirty="0">
+                <a:ln>
+                  <a:noFill/>
+                </a:ln>
+                <a:solidFill>
+                  <a:srgbClr val="940027"/>
+                </a:solidFill>
+                <a:effectLst/>
+                <a:latin typeface="Arial" charset="0"/>
+              </a:rPr>
+              <a:t>brugeradministration</a:t>
+            </a:r>
+          </a:p>
+        </p:txBody>
+      </p:sp>
+      <p:sp>
+        <p:nvSpPr>
+          <p:cNvPr id="2" name="Title 1">
+            <a:extLst>
+              <a:ext uri="{FF2B5EF4-FFF2-40B4-BE49-F238E27FC236}">
+                <a16:creationId xmlns:a16="http://schemas.microsoft.com/office/drawing/2014/main" id="{631638D0-F97A-4EA0-BF2A-01184DC29619}"/>
+              </a:ext>
+            </a:extLst>
+          </p:cNvPr>
+          <p:cNvSpPr>
+            <a:spLocks noGrp="1"/>
+          </p:cNvSpPr>
+          <p:nvPr>
+            <p:ph type="title"/>
+          </p:nvPr>
+        </p:nvSpPr>
+        <p:spPr/>
+        <p:txBody>
+          <a:bodyPr/>
+          <a:lstStyle/>
+          <a:p>
+            <a:r>
+              <a:rPr lang="da-DK" dirty="0"/>
+              <a:t>Begrebsoverblik</a:t>
+            </a:r>
+          </a:p>
+        </p:txBody>
+      </p:sp>
+      <p:sp>
+        <p:nvSpPr>
+          <p:cNvPr id="4" name="Slide Number Placeholder 3">
+            <a:extLst>
+              <a:ext uri="{FF2B5EF4-FFF2-40B4-BE49-F238E27FC236}">
+                <a16:creationId xmlns:a16="http://schemas.microsoft.com/office/drawing/2014/main" id="{D0BE890A-3083-427B-BBA0-25DF9BB2C022}"/>
+              </a:ext>
+            </a:extLst>
+          </p:cNvPr>
+          <p:cNvSpPr>
+            <a:spLocks noGrp="1"/>
+          </p:cNvSpPr>
+          <p:nvPr>
+            <p:ph type="sldNum" sz="quarter" idx="12"/>
+          </p:nvPr>
+        </p:nvSpPr>
+        <p:spPr/>
+        <p:txBody>
+          <a:bodyPr/>
+          <a:lstStyle/>
+          <a:p>
+            <a:fld id="{80AE25ED-097C-4BDC-A7CE-FA97BD9CA3B5}" type="slidenum">
+              <a:rPr lang="da-DK" smtClean="0"/>
+              <a:pPr/>
+              <a:t>5</a:t>
+            </a:fld>
+            <a:endParaRPr lang="da-DK" dirty="0"/>
+          </a:p>
+        </p:txBody>
+      </p:sp>
+      <p:cxnSp>
+        <p:nvCxnSpPr>
+          <p:cNvPr id="35" name="Straight Connector 34">
+            <a:extLst>
+              <a:ext uri="{FF2B5EF4-FFF2-40B4-BE49-F238E27FC236}">
+                <a16:creationId xmlns:a16="http://schemas.microsoft.com/office/drawing/2014/main" id="{3E6B0DFB-C993-4C15-81FA-12813133F281}"/>
+              </a:ext>
+            </a:extLst>
+          </p:cNvPr>
+          <p:cNvCxnSpPr>
+            <a:cxnSpLocks/>
+            <a:stCxn id="39" idx="3"/>
+            <a:endCxn id="54" idx="1"/>
+          </p:cNvCxnSpPr>
+          <p:nvPr/>
+        </p:nvCxnSpPr>
+        <p:spPr>
+          <a:xfrm>
+            <a:off x="7799977" y="2973027"/>
+            <a:ext cx="1711891" cy="10199"/>
+          </a:xfrm>
+          <a:prstGeom prst="line">
+            <a:avLst/>
+          </a:prstGeom>
+          <a:ln w="28575">
             <a:solidFill>
               <a:srgbClr val="808080"/>
             </a:solidFill>
@@ -12218,76 +13390,250 @@
           <a:effectLst/>
         </p:spPr>
         <p:style>
-          <a:lnRef idx="1">
+          <a:lnRef idx="2">
             <a:schemeClr val="accent1"/>
           </a:lnRef>
-          <a:fillRef idx="3">
+          <a:fillRef idx="0">
             <a:schemeClr val="accent1"/>
           </a:fillRef>
-          <a:effectRef idx="2">
+          <a:effectRef idx="1">
             <a:schemeClr val="accent1"/>
           </a:effectRef>
           <a:fontRef idx="minor">
-            <a:schemeClr val="lt1"/>
+            <a:schemeClr val="tx1"/>
           </a:fontRef>
         </p:style>
-        <p:txBody>
-          <a:bodyPr lIns="108000" tIns="108000" rIns="108000" bIns="108000" rtlCol="0" anchor="ctr"/>
+      </p:cxnSp>
+      <p:sp>
+        <p:nvSpPr>
+          <p:cNvPr id="36" name="Rectangle 35">
+            <a:extLst>
+              <a:ext uri="{FF2B5EF4-FFF2-40B4-BE49-F238E27FC236}">
+                <a16:creationId xmlns:a16="http://schemas.microsoft.com/office/drawing/2014/main" id="{1652BD75-C174-436E-8AEE-A9A1F2383A87}"/>
+              </a:ext>
+            </a:extLst>
+          </p:cNvPr>
+          <p:cNvSpPr/>
+          <p:nvPr/>
+        </p:nvSpPr>
+        <p:spPr>
+          <a:xfrm>
+            <a:off x="557826" y="3454404"/>
+            <a:ext cx="1354046" cy="672230"/>
+          </a:xfrm>
+          <a:prstGeom prst="rect">
+            <a:avLst/>
+          </a:prstGeom>
+          <a:ln>
+            <a:solidFill>
+              <a:srgbClr val="808080"/>
+            </a:solidFill>
+          </a:ln>
+        </p:spPr>
+        <p:style>
+          <a:lnRef idx="2">
+            <a:schemeClr val="accent5"/>
+          </a:lnRef>
+          <a:fillRef idx="1">
+            <a:schemeClr val="lt1"/>
+          </a:fillRef>
+          <a:effectRef idx="0">
+            <a:schemeClr val="accent5"/>
+          </a:effectRef>
+          <a:fontRef idx="minor">
+            <a:schemeClr val="dk1"/>
+          </a:fontRef>
+        </p:style>
+        <p:txBody>
+          <a:bodyPr rtlCol="0" anchor="ctr"/>
           <a:lstStyle/>
           <a:p>
-            <a:pPr>
-              <a:spcAft>
-                <a:spcPts val="600"/>
-              </a:spcAft>
-            </a:pPr>
-            <a:r>
-              <a:rPr lang="da-DK" sz="1600" b="1" dirty="0">
+            <a:pPr algn="ctr"/>
+            <a:r>
+              <a:rPr lang="da-DK" sz="1600" dirty="0">
+                <a:solidFill>
+                  <a:srgbClr val="1F497D"/>
+                </a:solidFill>
+              </a:rPr>
+              <a:t>entitet</a:t>
+            </a:r>
+          </a:p>
+        </p:txBody>
+      </p:sp>
+      <p:sp>
+        <p:nvSpPr>
+          <p:cNvPr id="37" name="Rectangle 36">
+            <a:extLst>
+              <a:ext uri="{FF2B5EF4-FFF2-40B4-BE49-F238E27FC236}">
+                <a16:creationId xmlns:a16="http://schemas.microsoft.com/office/drawing/2014/main" id="{9596330B-AEED-462F-AC50-BB36C41577E6}"/>
+              </a:ext>
+            </a:extLst>
+          </p:cNvPr>
+          <p:cNvSpPr/>
+          <p:nvPr/>
+        </p:nvSpPr>
+        <p:spPr>
+          <a:xfrm>
+            <a:off x="3206000" y="2636912"/>
+            <a:ext cx="1725457" cy="672230"/>
+          </a:xfrm>
+          <a:prstGeom prst="rect">
+            <a:avLst/>
+          </a:prstGeom>
+          <a:ln>
+            <a:solidFill>
+              <a:srgbClr val="808080"/>
+            </a:solidFill>
+          </a:ln>
+        </p:spPr>
+        <p:style>
+          <a:lnRef idx="2">
+            <a:schemeClr val="accent5"/>
+          </a:lnRef>
+          <a:fillRef idx="1">
+            <a:schemeClr val="lt1"/>
+          </a:fillRef>
+          <a:effectRef idx="0">
+            <a:schemeClr val="accent5"/>
+          </a:effectRef>
+          <a:fontRef idx="minor">
+            <a:schemeClr val="dk1"/>
+          </a:fontRef>
+        </p:style>
+        <p:txBody>
+          <a:bodyPr rtlCol="0" anchor="ctr"/>
+          <a:lstStyle/>
+          <a:p>
+            <a:pPr algn="ctr"/>
+            <a:r>
+              <a:rPr lang="da-DK" sz="1600" dirty="0">
                 <a:solidFill>
                   <a:srgbClr val="940027"/>
                 </a:solidFill>
               </a:rPr>
-              <a:t>Bruger</a:t>
-            </a:r>
-            <a:r>
-              <a:rPr lang="da-DK" sz="1600" b="1" dirty="0">
-                <a:solidFill>
-                  <a:schemeClr val="tx1"/>
+              <a:t>digital identitet</a:t>
+            </a:r>
+          </a:p>
+        </p:txBody>
+      </p:sp>
+      <p:sp>
+        <p:nvSpPr>
+          <p:cNvPr id="39" name="Rectangle 38">
+            <a:extLst>
+              <a:ext uri="{FF2B5EF4-FFF2-40B4-BE49-F238E27FC236}">
+                <a16:creationId xmlns:a16="http://schemas.microsoft.com/office/drawing/2014/main" id="{67A0F38B-FFCF-446F-B8F2-E5B6E6B6743A}"/>
+              </a:ext>
+            </a:extLst>
+          </p:cNvPr>
+          <p:cNvSpPr/>
+          <p:nvPr/>
+        </p:nvSpPr>
+        <p:spPr>
+          <a:xfrm>
+            <a:off x="6168008" y="2666836"/>
+            <a:ext cx="1631969" cy="612382"/>
+          </a:xfrm>
+          <a:prstGeom prst="rect">
+            <a:avLst/>
+          </a:prstGeom>
+          <a:ln>
+            <a:solidFill>
+              <a:srgbClr val="808080"/>
+            </a:solidFill>
+          </a:ln>
+        </p:spPr>
+        <p:style>
+          <a:lnRef idx="2">
+            <a:schemeClr val="accent5"/>
+          </a:lnRef>
+          <a:fillRef idx="1">
+            <a:schemeClr val="lt1"/>
+          </a:fillRef>
+          <a:effectRef idx="0">
+            <a:schemeClr val="accent5"/>
+          </a:effectRef>
+          <a:fontRef idx="minor">
+            <a:schemeClr val="dk1"/>
+          </a:fontRef>
+        </p:style>
+        <p:txBody>
+          <a:bodyPr rtlCol="0" anchor="ctr"/>
+          <a:lstStyle/>
+          <a:p>
+            <a:pPr algn="ctr"/>
+            <a:r>
+              <a:rPr lang="da-DK" sz="1600" dirty="0">
+                <a:solidFill>
+                  <a:srgbClr val="940027"/>
                 </a:solidFill>
               </a:rPr>
-              <a:t> eller dennes </a:t>
-            </a:r>
-            <a:r>
-              <a:rPr lang="da-DK" sz="1600" b="1" dirty="0">
-                <a:solidFill>
-                  <a:srgbClr val="940027"/>
-                </a:solidFill>
-              </a:rPr>
-              <a:t>brugerorganisation</a:t>
-            </a:r>
-          </a:p>
-          <a:p>
-            <a:pPr>
+              <a:t>adgangsbillet</a:t>
+            </a:r>
+          </a:p>
+        </p:txBody>
+      </p:sp>
+      <p:sp>
+        <p:nvSpPr>
+          <p:cNvPr id="40" name="TextBox 39">
+            <a:extLst>
+              <a:ext uri="{FF2B5EF4-FFF2-40B4-BE49-F238E27FC236}">
+                <a16:creationId xmlns:a16="http://schemas.microsoft.com/office/drawing/2014/main" id="{677081C9-0201-4E12-B632-97B800BE3BCD}"/>
+              </a:ext>
+            </a:extLst>
+          </p:cNvPr>
+          <p:cNvSpPr txBox="1"/>
+          <p:nvPr/>
+        </p:nvSpPr>
+        <p:spPr bwMode="auto">
+          <a:xfrm rot="19649661">
+            <a:off x="1929507" y="3128984"/>
+            <a:ext cx="1247976" cy="181525"/>
+          </a:xfrm>
+          <a:prstGeom prst="rect">
+            <a:avLst/>
+          </a:prstGeom>
+          <a:noFill/>
+          <a:ln w="9525">
+            <a:noFill/>
+            <a:miter lim="800000"/>
+            <a:headEnd/>
+            <a:tailEnd/>
+          </a:ln>
+          <a:effectLst/>
+        </p:spPr>
+        <p:txBody>
+          <a:bodyPr vert="horz" wrap="square" lIns="36000" tIns="0" rIns="0" bIns="0" numCol="1" rtlCol="0" anchor="t" anchorCtr="0" compatLnSpc="1">
+            <a:prstTxWarp prst="textNoShape">
+              <a:avLst/>
+            </a:prstTxWarp>
+            <a:spAutoFit/>
+          </a:bodyPr>
+          <a:lstStyle/>
+          <a:p>
+            <a:pPr marL="16933" indent="-33866" algn="ctr" defTabSz="609585" eaLnBrk="0" hangingPunct="0">
               <a:spcAft>
                 <a:spcPts val="0"/>
               </a:spcAft>
             </a:pPr>
             <a:r>
-              <a:rPr lang="da-DK" sz="1400" dirty="0">
-                <a:solidFill>
-                  <a:schemeClr val="tx1"/>
-                </a:solidFill>
+              <a:rPr lang="da-DK" sz="1200" i="1" dirty="0">
+                <a:solidFill>
+                  <a:srgbClr val="808080"/>
+                </a:solidFill>
+                <a:latin typeface="Verdana"/>
+                <a:cs typeface="ＭＳ Ｐゴシック" pitchFamily="-111" charset="-128"/>
               </a:rPr>
-              <a:t>Registrerer attributter for  identitetskarakteristika, roller i organisationen, sikkerhedsklassificering og andre attributsæt.</a:t>
-            </a:r>
-          </a:p>
-        </p:txBody>
-      </p:sp>
-      <p:sp>
-        <p:nvSpPr>
-          <p:cNvPr id="7" name="Left Arrow Callout 5">
+              <a:t>tildeles</a:t>
+            </a:r>
+          </a:p>
+        </p:txBody>
+      </p:sp>
+      <p:sp>
+        <p:nvSpPr>
+          <p:cNvPr id="41" name="Rectangle 40">
             <a:extLst>
               <a:ext uri="{FF2B5EF4-FFF2-40B4-BE49-F238E27FC236}">
-                <a16:creationId xmlns:a16="http://schemas.microsoft.com/office/drawing/2014/main" id="{481E047B-66DD-414A-83DE-7D8BB8C4F24E}"/>
+                <a16:creationId xmlns:a16="http://schemas.microsoft.com/office/drawing/2014/main" id="{0B07811D-A26D-464B-86F9-2C46A2EBD2F0}"/>
               </a:ext>
             </a:extLst>
           </p:cNvPr>
@@ -12296,19 +13642,73 @@
         </p:nvSpPr>
         <p:spPr>
           <a:xfrm>
-            <a:off x="7180599" y="1988840"/>
-            <a:ext cx="3379897" cy="2088232"/>
-          </a:xfrm>
-          <a:prstGeom prst="leftArrowCallout">
-            <a:avLst>
-              <a:gd name="adj1" fmla="val 25000"/>
-              <a:gd name="adj2" fmla="val 25000"/>
-              <a:gd name="adj3" fmla="val 19949"/>
-              <a:gd name="adj4" fmla="val 82788"/>
-            </a:avLst>
+            <a:off x="3220224" y="4355115"/>
+            <a:ext cx="1711234" cy="672230"/>
+          </a:xfrm>
+          <a:prstGeom prst="rect">
+            <a:avLst/>
           </a:prstGeom>
-          <a:noFill/>
-          <a:ln w="25400">
+          <a:ln>
+            <a:solidFill>
+              <a:srgbClr val="808080"/>
+            </a:solidFill>
+          </a:ln>
+        </p:spPr>
+        <p:style>
+          <a:lnRef idx="2">
+            <a:schemeClr val="accent5"/>
+          </a:lnRef>
+          <a:fillRef idx="1">
+            <a:schemeClr val="lt1"/>
+          </a:fillRef>
+          <a:effectRef idx="0">
+            <a:schemeClr val="accent5"/>
+          </a:effectRef>
+          <a:fontRef idx="minor">
+            <a:schemeClr val="dk1"/>
+          </a:fontRef>
+        </p:style>
+        <p:txBody>
+          <a:bodyPr rtlCol="0" anchor="ctr"/>
+          <a:lstStyle/>
+          <a:p>
+            <a:pPr algn="ctr"/>
+            <a:r>
+              <a:rPr lang="da-DK" sz="1600" dirty="0">
+                <a:solidFill>
+                  <a:srgbClr val="940027"/>
+                </a:solidFill>
+              </a:rPr>
+              <a:t>identifikations-middel</a:t>
+            </a:r>
+          </a:p>
+        </p:txBody>
+      </p:sp>
+      <p:cxnSp>
+        <p:nvCxnSpPr>
+          <p:cNvPr id="42" name="Straight Connector 41">
+            <a:extLst>
+              <a:ext uri="{FF2B5EF4-FFF2-40B4-BE49-F238E27FC236}">
+                <a16:creationId xmlns:a16="http://schemas.microsoft.com/office/drawing/2014/main" id="{C84D4094-CC5B-443F-8C7D-4A1709F1DF18}"/>
+              </a:ext>
+            </a:extLst>
+          </p:cNvPr>
+          <p:cNvCxnSpPr>
+            <a:cxnSpLocks/>
+            <a:stCxn id="36" idx="3"/>
+            <a:endCxn id="41" idx="1"/>
+          </p:cNvCxnSpPr>
+          <p:nvPr/>
+        </p:nvCxnSpPr>
+        <p:spPr>
+          <a:xfrm>
+            <a:off x="1911872" y="3790519"/>
+            <a:ext cx="1308352" cy="900711"/>
+          </a:xfrm>
+          <a:prstGeom prst="line">
+            <a:avLst/>
+          </a:prstGeom>
+          <a:ln w="28575">
             <a:solidFill>
               <a:srgbClr val="808080"/>
             </a:solidFill>
@@ -12316,53 +13716,434 @@
           <a:effectLst/>
         </p:spPr>
         <p:style>
-          <a:lnRef idx="1">
+          <a:lnRef idx="2">
             <a:schemeClr val="accent1"/>
           </a:lnRef>
-          <a:fillRef idx="3">
+          <a:fillRef idx="0">
             <a:schemeClr val="accent1"/>
           </a:fillRef>
-          <a:effectRef idx="2">
+          <a:effectRef idx="1">
             <a:schemeClr val="accent1"/>
           </a:effectRef>
           <a:fontRef idx="minor">
-            <a:schemeClr val="lt1"/>
+            <a:schemeClr val="tx1"/>
           </a:fontRef>
         </p:style>
-        <p:txBody>
-          <a:bodyPr lIns="108000" tIns="108000" rIns="108000" bIns="108000" rtlCol="0" anchor="ctr"/>
+      </p:cxnSp>
+      <p:sp>
+        <p:nvSpPr>
+          <p:cNvPr id="43" name="TextBox 42">
+            <a:extLst>
+              <a:ext uri="{FF2B5EF4-FFF2-40B4-BE49-F238E27FC236}">
+                <a16:creationId xmlns:a16="http://schemas.microsoft.com/office/drawing/2014/main" id="{04D67E76-654A-4565-83ED-DDD77BEB3767}"/>
+              </a:ext>
+            </a:extLst>
+          </p:cNvPr>
+          <p:cNvSpPr txBox="1"/>
+          <p:nvPr/>
+        </p:nvSpPr>
+        <p:spPr bwMode="auto">
+          <a:xfrm rot="2054214">
+            <a:off x="1884623" y="4264352"/>
+            <a:ext cx="1247976" cy="181525"/>
+          </a:xfrm>
+          <a:prstGeom prst="rect">
+            <a:avLst/>
+          </a:prstGeom>
+          <a:noFill/>
+          <a:ln w="9525">
+            <a:noFill/>
+            <a:miter lim="800000"/>
+            <a:headEnd/>
+            <a:tailEnd/>
+          </a:ln>
+          <a:effectLst/>
+        </p:spPr>
+        <p:txBody>
+          <a:bodyPr vert="horz" wrap="square" lIns="36000" tIns="0" rIns="0" bIns="0" numCol="1" rtlCol="0" anchor="t" anchorCtr="0" compatLnSpc="1">
+            <a:prstTxWarp prst="textNoShape">
+              <a:avLst/>
+            </a:prstTxWarp>
+            <a:spAutoFit/>
+          </a:bodyPr>
           <a:lstStyle/>
           <a:p>
-            <a:pPr>
+            <a:pPr marL="16933" indent="-33866" algn="ctr" defTabSz="609585" eaLnBrk="0" hangingPunct="0">
               <a:spcAft>
-                <a:spcPts val="600"/>
+                <a:spcPts val="0"/>
               </a:spcAft>
             </a:pPr>
             <a:r>
-              <a:rPr lang="da-DK" sz="1600" b="1" dirty="0">
-                <a:solidFill>
-                  <a:srgbClr val="1F497D"/>
-                </a:solidFill>
+              <a:rPr lang="da-DK" sz="1200" i="1" dirty="0">
+                <a:solidFill>
+                  <a:srgbClr val="808080"/>
+                </a:solidFill>
+                <a:latin typeface="Verdana"/>
+                <a:cs typeface="ＭＳ Ｐゴシック" pitchFamily="-111" charset="-128"/>
               </a:rPr>
-              <a:t>Tjenesteudbyder</a:t>
-            </a:r>
-            <a:r>
-              <a:rPr lang="da-DK" sz="1200" b="1" dirty="0">
-                <a:solidFill>
-                  <a:schemeClr val="tx1"/>
+              <a:t>anvender</a:t>
+            </a:r>
+          </a:p>
+        </p:txBody>
+      </p:sp>
+      <p:cxnSp>
+        <p:nvCxnSpPr>
+          <p:cNvPr id="44" name="Straight Connector 43">
+            <a:extLst>
+              <a:ext uri="{FF2B5EF4-FFF2-40B4-BE49-F238E27FC236}">
+                <a16:creationId xmlns:a16="http://schemas.microsoft.com/office/drawing/2014/main" id="{4DCDC64A-50AA-4799-BE74-71DF54A7F85A}"/>
+              </a:ext>
+            </a:extLst>
+          </p:cNvPr>
+          <p:cNvCxnSpPr>
+            <a:cxnSpLocks/>
+            <a:stCxn id="41" idx="0"/>
+            <a:endCxn id="37" idx="2"/>
+          </p:cNvCxnSpPr>
+          <p:nvPr/>
+        </p:nvCxnSpPr>
+        <p:spPr>
+          <a:xfrm flipH="1" flipV="1">
+            <a:off x="4068729" y="3309142"/>
+            <a:ext cx="7112" cy="1045973"/>
+          </a:xfrm>
+          <a:prstGeom prst="line">
+            <a:avLst/>
+          </a:prstGeom>
+          <a:ln w="28575">
+            <a:solidFill>
+              <a:srgbClr val="808080"/>
+            </a:solidFill>
+          </a:ln>
+          <a:effectLst/>
+        </p:spPr>
+        <p:style>
+          <a:lnRef idx="2">
+            <a:schemeClr val="accent1"/>
+          </a:lnRef>
+          <a:fillRef idx="0">
+            <a:schemeClr val="accent1"/>
+          </a:fillRef>
+          <a:effectRef idx="1">
+            <a:schemeClr val="accent1"/>
+          </a:effectRef>
+          <a:fontRef idx="minor">
+            <a:schemeClr val="tx1"/>
+          </a:fontRef>
+        </p:style>
+      </p:cxnSp>
+      <p:cxnSp>
+        <p:nvCxnSpPr>
+          <p:cNvPr id="45" name="Straight Connector 44">
+            <a:extLst>
+              <a:ext uri="{FF2B5EF4-FFF2-40B4-BE49-F238E27FC236}">
+                <a16:creationId xmlns:a16="http://schemas.microsoft.com/office/drawing/2014/main" id="{102346A6-DB0D-4706-A10C-7EE7610FD920}"/>
+              </a:ext>
+            </a:extLst>
+          </p:cNvPr>
+          <p:cNvCxnSpPr>
+            <a:cxnSpLocks/>
+            <a:stCxn id="36" idx="3"/>
+            <a:endCxn id="37" idx="1"/>
+          </p:cNvCxnSpPr>
+          <p:nvPr/>
+        </p:nvCxnSpPr>
+        <p:spPr>
+          <a:xfrm flipV="1">
+            <a:off x="1911872" y="2973027"/>
+            <a:ext cx="1294128" cy="817492"/>
+          </a:xfrm>
+          <a:prstGeom prst="line">
+            <a:avLst/>
+          </a:prstGeom>
+          <a:ln w="28575">
+            <a:solidFill>
+              <a:srgbClr val="808080"/>
+            </a:solidFill>
+          </a:ln>
+          <a:effectLst/>
+        </p:spPr>
+        <p:style>
+          <a:lnRef idx="2">
+            <a:schemeClr val="accent1"/>
+          </a:lnRef>
+          <a:fillRef idx="0">
+            <a:schemeClr val="accent1"/>
+          </a:fillRef>
+          <a:effectRef idx="1">
+            <a:schemeClr val="accent1"/>
+          </a:effectRef>
+          <a:fontRef idx="minor">
+            <a:schemeClr val="tx1"/>
+          </a:fontRef>
+        </p:style>
+      </p:cxnSp>
+      <p:cxnSp>
+        <p:nvCxnSpPr>
+          <p:cNvPr id="48" name="Straight Connector 47">
+            <a:extLst>
+              <a:ext uri="{FF2B5EF4-FFF2-40B4-BE49-F238E27FC236}">
+                <a16:creationId xmlns:a16="http://schemas.microsoft.com/office/drawing/2014/main" id="{0D52F9D4-7C12-41FF-92EC-A25187FEF68F}"/>
+              </a:ext>
+            </a:extLst>
+          </p:cNvPr>
+          <p:cNvCxnSpPr>
+            <a:cxnSpLocks/>
+            <a:stCxn id="37" idx="3"/>
+            <a:endCxn id="39" idx="1"/>
+          </p:cNvCxnSpPr>
+          <p:nvPr/>
+        </p:nvCxnSpPr>
+        <p:spPr>
+          <a:xfrm>
+            <a:off x="4931457" y="2973027"/>
+            <a:ext cx="1236551" cy="0"/>
+          </a:xfrm>
+          <a:prstGeom prst="line">
+            <a:avLst/>
+          </a:prstGeom>
+          <a:ln w="28575">
+            <a:solidFill>
+              <a:srgbClr val="808080"/>
+            </a:solidFill>
+          </a:ln>
+          <a:effectLst/>
+        </p:spPr>
+        <p:style>
+          <a:lnRef idx="2">
+            <a:schemeClr val="accent1"/>
+          </a:lnRef>
+          <a:fillRef idx="0">
+            <a:schemeClr val="accent1"/>
+          </a:fillRef>
+          <a:effectRef idx="1">
+            <a:schemeClr val="accent1"/>
+          </a:effectRef>
+          <a:fontRef idx="minor">
+            <a:schemeClr val="tx1"/>
+          </a:fontRef>
+        </p:style>
+      </p:cxnSp>
+      <p:sp>
+        <p:nvSpPr>
+          <p:cNvPr id="54" name="Rectangle 53">
+            <a:extLst>
+              <a:ext uri="{FF2B5EF4-FFF2-40B4-BE49-F238E27FC236}">
+                <a16:creationId xmlns:a16="http://schemas.microsoft.com/office/drawing/2014/main" id="{E730369B-BDA0-440E-BD11-B8683CC05304}"/>
+              </a:ext>
+            </a:extLst>
+          </p:cNvPr>
+          <p:cNvSpPr/>
+          <p:nvPr/>
+        </p:nvSpPr>
+        <p:spPr>
+          <a:xfrm>
+            <a:off x="9511868" y="2687233"/>
+            <a:ext cx="1817745" cy="591985"/>
+          </a:xfrm>
+          <a:prstGeom prst="rect">
+            <a:avLst/>
+          </a:prstGeom>
+          <a:ln>
+            <a:solidFill>
+              <a:srgbClr val="808080"/>
+            </a:solidFill>
+          </a:ln>
+        </p:spPr>
+        <p:style>
+          <a:lnRef idx="2">
+            <a:schemeClr val="accent5"/>
+          </a:lnRef>
+          <a:fillRef idx="1">
+            <a:schemeClr val="lt1"/>
+          </a:fillRef>
+          <a:effectRef idx="0">
+            <a:schemeClr val="accent5"/>
+          </a:effectRef>
+          <a:fontRef idx="minor">
+            <a:schemeClr val="dk1"/>
+          </a:fontRef>
+        </p:style>
+        <p:txBody>
+          <a:bodyPr rtlCol="0" anchor="ctr"/>
+          <a:lstStyle/>
+          <a:p>
+            <a:pPr algn="ctr"/>
+            <a:r>
+              <a:rPr lang="da-DK" sz="1600" dirty="0">
+                <a:solidFill>
+                  <a:srgbClr val="940027"/>
                 </a:solidFill>
               </a:rPr>
-              <a:t> </a:t>
-            </a:r>
-          </a:p>
-          <a:p>
-            <a:r>
-              <a:rPr lang="da-DK" sz="1400" dirty="0">
-                <a:solidFill>
-                  <a:schemeClr val="tx1"/>
-                </a:solidFill>
+              <a:t>adgangspolitik</a:t>
+            </a:r>
+          </a:p>
+        </p:txBody>
+      </p:sp>
+      <p:sp>
+        <p:nvSpPr>
+          <p:cNvPr id="56" name="TextBox 55">
+            <a:extLst>
+              <a:ext uri="{FF2B5EF4-FFF2-40B4-BE49-F238E27FC236}">
+                <a16:creationId xmlns:a16="http://schemas.microsoft.com/office/drawing/2014/main" id="{D9ECD52C-4BB8-45D7-8724-E294A89D0D44}"/>
+              </a:ext>
+            </a:extLst>
+          </p:cNvPr>
+          <p:cNvSpPr txBox="1"/>
+          <p:nvPr/>
+        </p:nvSpPr>
+        <p:spPr bwMode="auto">
+          <a:xfrm>
+            <a:off x="10147143" y="3362071"/>
+            <a:ext cx="1081922" cy="184666"/>
+          </a:xfrm>
+          <a:prstGeom prst="rect">
+            <a:avLst/>
+          </a:prstGeom>
+          <a:noFill/>
+          <a:ln w="9525">
+            <a:noFill/>
+            <a:miter lim="800000"/>
+            <a:headEnd/>
+            <a:tailEnd/>
+          </a:ln>
+          <a:effectLst/>
+        </p:spPr>
+        <p:txBody>
+          <a:bodyPr vert="horz" wrap="square" lIns="36000" tIns="0" rIns="0" bIns="0" numCol="1" rtlCol="0" anchor="t" anchorCtr="0" compatLnSpc="1">
+            <a:prstTxWarp prst="textNoShape">
+              <a:avLst/>
+            </a:prstTxWarp>
+            <a:spAutoFit/>
+          </a:bodyPr>
+          <a:lstStyle/>
+          <a:p>
+            <a:pPr marL="16933" indent="-33866" algn="ctr" defTabSz="609585" eaLnBrk="0" hangingPunct="0">
+              <a:spcAft>
+                <a:spcPts val="0"/>
+              </a:spcAft>
+            </a:pPr>
+            <a:r>
+              <a:rPr lang="da-DK" sz="1200" i="1" dirty="0">
+                <a:solidFill>
+                  <a:srgbClr val="808080"/>
+                </a:solidFill>
+                <a:latin typeface="Verdana"/>
+                <a:cs typeface="ＭＳ Ｐゴシック" pitchFamily="-111" charset="-128"/>
               </a:rPr>
-              <a:t>Beskriver adgangspolitikker i struktureret form, så der kan udledes krav til de attributsæt, en entitets skal møde op med for at få adgang</a:t>
+              <a:t>definerer</a:t>
+            </a:r>
+          </a:p>
+        </p:txBody>
+      </p:sp>
+      <p:sp>
+        <p:nvSpPr>
+          <p:cNvPr id="59" name="TextBox 58">
+            <a:extLst>
+              <a:ext uri="{FF2B5EF4-FFF2-40B4-BE49-F238E27FC236}">
+                <a16:creationId xmlns:a16="http://schemas.microsoft.com/office/drawing/2014/main" id="{6AE9A19D-C423-42F8-8CFB-C5D30509082E}"/>
+              </a:ext>
+            </a:extLst>
+          </p:cNvPr>
+          <p:cNvSpPr txBox="1"/>
+          <p:nvPr/>
+        </p:nvSpPr>
+        <p:spPr bwMode="auto">
+          <a:xfrm>
+            <a:off x="7475838" y="2730543"/>
+            <a:ext cx="1932283" cy="184708"/>
+          </a:xfrm>
+          <a:prstGeom prst="rect">
+            <a:avLst/>
+          </a:prstGeom>
+          <a:noFill/>
+          <a:ln w="9525">
+            <a:noFill/>
+            <a:miter lim="800000"/>
+            <a:headEnd/>
+            <a:tailEnd/>
+          </a:ln>
+          <a:effectLst/>
+        </p:spPr>
+        <p:txBody>
+          <a:bodyPr vert="horz" wrap="square" lIns="36000" tIns="0" rIns="0" bIns="0" numCol="1" rtlCol="0" anchor="t" anchorCtr="0" compatLnSpc="1">
+            <a:prstTxWarp prst="textNoShape">
+              <a:avLst/>
+            </a:prstTxWarp>
+            <a:spAutoFit/>
+          </a:bodyPr>
+          <a:lstStyle/>
+          <a:p>
+            <a:pPr marL="16933" indent="-33866" algn="ctr" defTabSz="609585" eaLnBrk="0" hangingPunct="0">
+              <a:spcAft>
+                <a:spcPts val="0"/>
+              </a:spcAft>
+            </a:pPr>
+            <a:r>
+              <a:rPr lang="da-DK" sz="1200" i="1" dirty="0">
+                <a:solidFill>
+                  <a:srgbClr val="808080"/>
+                </a:solidFill>
+                <a:latin typeface="Verdana"/>
+                <a:cs typeface="ＭＳ Ｐゴシック" pitchFamily="-111" charset="-128"/>
+              </a:rPr>
+              <a:t>matches med</a:t>
+            </a:r>
+          </a:p>
+        </p:txBody>
+      </p:sp>
+      <p:sp>
+        <p:nvSpPr>
+          <p:cNvPr id="60" name="TextBox 59">
+            <a:extLst>
+              <a:ext uri="{FF2B5EF4-FFF2-40B4-BE49-F238E27FC236}">
+                <a16:creationId xmlns:a16="http://schemas.microsoft.com/office/drawing/2014/main" id="{CD97087F-EFFD-4C94-87DA-C2654EC3D19E}"/>
+              </a:ext>
+            </a:extLst>
+          </p:cNvPr>
+          <p:cNvSpPr txBox="1"/>
+          <p:nvPr/>
+        </p:nvSpPr>
+        <p:spPr bwMode="auto">
+          <a:xfrm>
+            <a:off x="4843637" y="2779390"/>
+            <a:ext cx="1550735" cy="181525"/>
+          </a:xfrm>
+          <a:prstGeom prst="rect">
+            <a:avLst/>
+          </a:prstGeom>
+          <a:noFill/>
+          <a:ln w="9525">
+            <a:noFill/>
+            <a:miter lim="800000"/>
+            <a:headEnd/>
+            <a:tailEnd/>
+          </a:ln>
+          <a:effectLst/>
+        </p:spPr>
+        <p:txBody>
+          <a:bodyPr vert="horz" wrap="square" lIns="36000" tIns="0" rIns="0" bIns="0" numCol="1" rtlCol="0" anchor="t" anchorCtr="0" compatLnSpc="1">
+            <a:prstTxWarp prst="textNoShape">
+              <a:avLst/>
+            </a:prstTxWarp>
+            <a:spAutoFit/>
+          </a:bodyPr>
+          <a:lstStyle/>
+          <a:p>
+            <a:pPr marL="16933" indent="-33866" algn="ctr" defTabSz="609585" eaLnBrk="0" hangingPunct="0">
+              <a:spcAft>
+                <a:spcPts val="0"/>
+              </a:spcAft>
+            </a:pPr>
+            <a:r>
+              <a:rPr lang="da-DK" sz="1200" i="1" dirty="0">
+                <a:solidFill>
+                  <a:srgbClr val="808080"/>
+                </a:solidFill>
+                <a:latin typeface="Verdana"/>
+                <a:cs typeface="ＭＳ Ｐゴシック" pitchFamily="-111" charset="-128"/>
+              </a:rPr>
+              <a:t>attributter</a:t>
             </a:r>
           </a:p>
         </p:txBody>
@@ -12370,7 +14151,7 @@
     </p:spTree>
     <p:extLst>
       <p:ext uri="{BB962C8B-B14F-4D97-AF65-F5344CB8AC3E}">
-        <p14:creationId xmlns:p14="http://schemas.microsoft.com/office/powerpoint/2010/main" val="2723583936"/>
+        <p14:creationId xmlns:p14="http://schemas.microsoft.com/office/powerpoint/2010/main" val="3608755131"/>
       </p:ext>
     </p:extLst>
   </p:cSld>
@@ -12402,7 +14183,7 @@
           <p:cNvPr id="2" name="Title 1">
             <a:extLst>
               <a:ext uri="{FF2B5EF4-FFF2-40B4-BE49-F238E27FC236}">
-                <a16:creationId xmlns:a16="http://schemas.microsoft.com/office/drawing/2014/main" id="{B7319E3C-555B-4F7C-B142-0D84D1A13380}"/>
+                <a16:creationId xmlns:a16="http://schemas.microsoft.com/office/drawing/2014/main" id="{8A36D6D5-D851-4C9A-A7F8-61AA8BACF38A}"/>
               </a:ext>
             </a:extLst>
           </p:cNvPr>
@@ -12420,7 +14201,7 @@
           <a:p>
             <a:r>
               <a:rPr lang="da-DK" dirty="0"/>
-              <a:t>Kæde af tillid</a:t>
+              <a:t>Bruger og tjenesteudbyder sammenhæng</a:t>
             </a:r>
           </a:p>
         </p:txBody>
@@ -12430,7 +14211,7 @@
           <p:cNvPr id="4" name="Slide Number Placeholder 3">
             <a:extLst>
               <a:ext uri="{FF2B5EF4-FFF2-40B4-BE49-F238E27FC236}">
-                <a16:creationId xmlns:a16="http://schemas.microsoft.com/office/drawing/2014/main" id="{1A20732F-7A89-4C93-8CD1-24B37D3E834C}"/>
+                <a16:creationId xmlns:a16="http://schemas.microsoft.com/office/drawing/2014/main" id="{4C307AFD-1F14-445A-9EFD-9720E7E15583}"/>
               </a:ext>
             </a:extLst>
           </p:cNvPr>
@@ -12450,6 +14231,348 @@
               <a:rPr lang="da-DK" smtClean="0"/>
               <a:pPr/>
               <a:t>6</a:t>
+            </a:fld>
+            <a:endParaRPr lang="da-DK" dirty="0"/>
+          </a:p>
+        </p:txBody>
+      </p:sp>
+      <p:sp>
+        <p:nvSpPr>
+          <p:cNvPr id="5" name="Rounded Rectangle 3">
+            <a:extLst>
+              <a:ext uri="{FF2B5EF4-FFF2-40B4-BE49-F238E27FC236}">
+                <a16:creationId xmlns:a16="http://schemas.microsoft.com/office/drawing/2014/main" id="{AF219AB7-2A82-45D6-A7B0-F4CADA758742}"/>
+              </a:ext>
+            </a:extLst>
+          </p:cNvPr>
+          <p:cNvSpPr/>
+          <p:nvPr/>
+        </p:nvSpPr>
+        <p:spPr>
+          <a:xfrm>
+            <a:off x="4007768" y="1988840"/>
+            <a:ext cx="3096344" cy="2088232"/>
+          </a:xfrm>
+          <a:prstGeom prst="roundRect">
+            <a:avLst/>
+          </a:prstGeom>
+          <a:ln w="50800">
+            <a:solidFill>
+              <a:srgbClr val="808080"/>
+            </a:solidFill>
+          </a:ln>
+        </p:spPr>
+        <p:style>
+          <a:lnRef idx="2">
+            <a:schemeClr val="accent5"/>
+          </a:lnRef>
+          <a:fillRef idx="1">
+            <a:schemeClr val="lt1"/>
+          </a:fillRef>
+          <a:effectRef idx="0">
+            <a:schemeClr val="accent5"/>
+          </a:effectRef>
+          <a:fontRef idx="minor">
+            <a:schemeClr val="dk1"/>
+          </a:fontRef>
+        </p:style>
+        <p:txBody>
+          <a:bodyPr lIns="108000" tIns="108000" rIns="108000" bIns="108000" rtlCol="0" anchor="ctr"/>
+          <a:lstStyle/>
+          <a:p>
+            <a:pPr algn="ctr">
+              <a:spcAft>
+                <a:spcPts val="600"/>
+              </a:spcAft>
+            </a:pPr>
+            <a:r>
+              <a:rPr lang="da-DK" sz="1600" b="1" dirty="0"/>
+              <a:t> </a:t>
+            </a:r>
+            <a:r>
+              <a:rPr lang="da-DK" sz="1600" b="1" dirty="0">
+                <a:solidFill>
+                  <a:srgbClr val="940027"/>
+                </a:solidFill>
+              </a:rPr>
+              <a:t>Attributsæt</a:t>
+            </a:r>
+          </a:p>
+          <a:p>
+            <a:pPr algn="ctr"/>
+            <a:r>
+              <a:rPr lang="da-DK" sz="1400" dirty="0"/>
+              <a:t>Kræver fælles sprog mellem bruger, organisation og tjenesteudbyder, fx i form af klassifikationer, som er et lukket udfaldsrum af værdier</a:t>
+            </a:r>
+          </a:p>
+        </p:txBody>
+      </p:sp>
+      <p:sp>
+        <p:nvSpPr>
+          <p:cNvPr id="6" name="Right Arrow Callout 4">
+            <a:extLst>
+              <a:ext uri="{FF2B5EF4-FFF2-40B4-BE49-F238E27FC236}">
+                <a16:creationId xmlns:a16="http://schemas.microsoft.com/office/drawing/2014/main" id="{785C9FE9-149F-4FE1-82A8-3C70936D27E8}"/>
+              </a:ext>
+            </a:extLst>
+          </p:cNvPr>
+          <p:cNvSpPr/>
+          <p:nvPr/>
+        </p:nvSpPr>
+        <p:spPr>
+          <a:xfrm>
+            <a:off x="695400" y="1988840"/>
+            <a:ext cx="3239648" cy="2160240"/>
+          </a:xfrm>
+          <a:prstGeom prst="rightArrowCallout">
+            <a:avLst>
+              <a:gd name="adj1" fmla="val 25000"/>
+              <a:gd name="adj2" fmla="val 25000"/>
+              <a:gd name="adj3" fmla="val 20671"/>
+              <a:gd name="adj4" fmla="val 81624"/>
+            </a:avLst>
+          </a:prstGeom>
+          <a:noFill/>
+          <a:ln w="25400">
+            <a:solidFill>
+              <a:srgbClr val="808080"/>
+            </a:solidFill>
+          </a:ln>
+          <a:effectLst/>
+        </p:spPr>
+        <p:style>
+          <a:lnRef idx="1">
+            <a:schemeClr val="accent1"/>
+          </a:lnRef>
+          <a:fillRef idx="3">
+            <a:schemeClr val="accent1"/>
+          </a:fillRef>
+          <a:effectRef idx="2">
+            <a:schemeClr val="accent1"/>
+          </a:effectRef>
+          <a:fontRef idx="minor">
+            <a:schemeClr val="lt1"/>
+          </a:fontRef>
+        </p:style>
+        <p:txBody>
+          <a:bodyPr lIns="108000" tIns="108000" rIns="108000" bIns="108000" rtlCol="0" anchor="ctr"/>
+          <a:lstStyle/>
+          <a:p>
+            <a:pPr>
+              <a:spcAft>
+                <a:spcPts val="600"/>
+              </a:spcAft>
+            </a:pPr>
+            <a:r>
+              <a:rPr lang="da-DK" sz="1600" b="1" dirty="0">
+                <a:solidFill>
+                  <a:srgbClr val="940027"/>
+                </a:solidFill>
+              </a:rPr>
+              <a:t>Bruger</a:t>
+            </a:r>
+            <a:r>
+              <a:rPr lang="da-DK" sz="1600" b="1" dirty="0">
+                <a:solidFill>
+                  <a:schemeClr val="tx1"/>
+                </a:solidFill>
+              </a:rPr>
+              <a:t> eller dennes </a:t>
+            </a:r>
+            <a:r>
+              <a:rPr lang="da-DK" sz="1600" b="1" dirty="0">
+                <a:solidFill>
+                  <a:srgbClr val="940027"/>
+                </a:solidFill>
+              </a:rPr>
+              <a:t>brugerorganisation</a:t>
+            </a:r>
+          </a:p>
+          <a:p>
+            <a:pPr>
+              <a:spcAft>
+                <a:spcPts val="0"/>
+              </a:spcAft>
+            </a:pPr>
+            <a:r>
+              <a:rPr lang="da-DK" sz="1400" dirty="0">
+                <a:solidFill>
+                  <a:schemeClr val="tx1"/>
+                </a:solidFill>
+              </a:rPr>
+              <a:t>Registrerer attributter for  identitetskarakteristika, roller i organisationen, sikkerhedsklassificering og andre attributsæt.</a:t>
+            </a:r>
+          </a:p>
+        </p:txBody>
+      </p:sp>
+      <p:sp>
+        <p:nvSpPr>
+          <p:cNvPr id="7" name="Left Arrow Callout 5">
+            <a:extLst>
+              <a:ext uri="{FF2B5EF4-FFF2-40B4-BE49-F238E27FC236}">
+                <a16:creationId xmlns:a16="http://schemas.microsoft.com/office/drawing/2014/main" id="{481E047B-66DD-414A-83DE-7D8BB8C4F24E}"/>
+              </a:ext>
+            </a:extLst>
+          </p:cNvPr>
+          <p:cNvSpPr/>
+          <p:nvPr/>
+        </p:nvSpPr>
+        <p:spPr>
+          <a:xfrm>
+            <a:off x="7180599" y="1988840"/>
+            <a:ext cx="3379897" cy="2088232"/>
+          </a:xfrm>
+          <a:prstGeom prst="leftArrowCallout">
+            <a:avLst>
+              <a:gd name="adj1" fmla="val 25000"/>
+              <a:gd name="adj2" fmla="val 25000"/>
+              <a:gd name="adj3" fmla="val 19949"/>
+              <a:gd name="adj4" fmla="val 82788"/>
+            </a:avLst>
+          </a:prstGeom>
+          <a:noFill/>
+          <a:ln w="25400">
+            <a:solidFill>
+              <a:srgbClr val="808080"/>
+            </a:solidFill>
+          </a:ln>
+          <a:effectLst/>
+        </p:spPr>
+        <p:style>
+          <a:lnRef idx="1">
+            <a:schemeClr val="accent1"/>
+          </a:lnRef>
+          <a:fillRef idx="3">
+            <a:schemeClr val="accent1"/>
+          </a:fillRef>
+          <a:effectRef idx="2">
+            <a:schemeClr val="accent1"/>
+          </a:effectRef>
+          <a:fontRef idx="minor">
+            <a:schemeClr val="lt1"/>
+          </a:fontRef>
+        </p:style>
+        <p:txBody>
+          <a:bodyPr lIns="108000" tIns="108000" rIns="108000" bIns="108000" rtlCol="0" anchor="ctr"/>
+          <a:lstStyle/>
+          <a:p>
+            <a:pPr>
+              <a:spcAft>
+                <a:spcPts val="600"/>
+              </a:spcAft>
+            </a:pPr>
+            <a:r>
+              <a:rPr lang="da-DK" sz="1600" b="1" dirty="0">
+                <a:solidFill>
+                  <a:srgbClr val="1F497D"/>
+                </a:solidFill>
+              </a:rPr>
+              <a:t>Tjenesteudbyder</a:t>
+            </a:r>
+            <a:r>
+              <a:rPr lang="da-DK" sz="1200" b="1" dirty="0">
+                <a:solidFill>
+                  <a:schemeClr val="tx1"/>
+                </a:solidFill>
+              </a:rPr>
+              <a:t> </a:t>
+            </a:r>
+          </a:p>
+          <a:p>
+            <a:r>
+              <a:rPr lang="da-DK" sz="1400" dirty="0">
+                <a:solidFill>
+                  <a:schemeClr val="tx1"/>
+                </a:solidFill>
+              </a:rPr>
+              <a:t>Beskriver adgangspolitikker i struktureret form, så der kan udledes krav til de attributsæt, en entitets skal møde op med for at få adgang</a:t>
+            </a:r>
+          </a:p>
+        </p:txBody>
+      </p:sp>
+    </p:spTree>
+    <p:extLst>
+      <p:ext uri="{BB962C8B-B14F-4D97-AF65-F5344CB8AC3E}">
+        <p14:creationId xmlns:p14="http://schemas.microsoft.com/office/powerpoint/2010/main" val="2723583936"/>
+      </p:ext>
+    </p:extLst>
+  </p:cSld>
+  <p:clrMapOvr>
+    <a:masterClrMapping/>
+  </p:clrMapOvr>
+</p:sld>
+</file>
+
+<file path=ppt/slides/slide7.xml><?xml version="1.0" encoding="utf-8"?>
+<p:sld xmlns:a="http://schemas.openxmlformats.org/drawingml/2006/main" xmlns:r="http://schemas.openxmlformats.org/officeDocument/2006/relationships" xmlns:p="http://schemas.openxmlformats.org/presentationml/2006/main">
+  <p:cSld>
+    <p:spTree>
+      <p:nvGrpSpPr>
+        <p:cNvPr id="1" name=""/>
+        <p:cNvGrpSpPr/>
+        <p:nvPr/>
+      </p:nvGrpSpPr>
+      <p:grpSpPr>
+        <a:xfrm>
+          <a:off x="0" y="0"/>
+          <a:ext cx="0" cy="0"/>
+          <a:chOff x="0" y="0"/>
+          <a:chExt cx="0" cy="0"/>
+        </a:xfrm>
+      </p:grpSpPr>
+      <p:sp>
+        <p:nvSpPr>
+          <p:cNvPr id="2" name="Title 1">
+            <a:extLst>
+              <a:ext uri="{FF2B5EF4-FFF2-40B4-BE49-F238E27FC236}">
+                <a16:creationId xmlns:a16="http://schemas.microsoft.com/office/drawing/2014/main" id="{B7319E3C-555B-4F7C-B142-0D84D1A13380}"/>
+              </a:ext>
+            </a:extLst>
+          </p:cNvPr>
+          <p:cNvSpPr>
+            <a:spLocks noGrp="1"/>
+          </p:cNvSpPr>
+          <p:nvPr>
+            <p:ph type="title"/>
+          </p:nvPr>
+        </p:nvSpPr>
+        <p:spPr/>
+        <p:txBody>
+          <a:bodyPr/>
+          <a:lstStyle/>
+          <a:p>
+            <a:r>
+              <a:rPr lang="da-DK" dirty="0"/>
+              <a:t>Kæde af tillid</a:t>
+            </a:r>
+          </a:p>
+        </p:txBody>
+      </p:sp>
+      <p:sp>
+        <p:nvSpPr>
+          <p:cNvPr id="4" name="Slide Number Placeholder 3">
+            <a:extLst>
+              <a:ext uri="{FF2B5EF4-FFF2-40B4-BE49-F238E27FC236}">
+                <a16:creationId xmlns:a16="http://schemas.microsoft.com/office/drawing/2014/main" id="{1A20732F-7A89-4C93-8CD1-24B37D3E834C}"/>
+              </a:ext>
+            </a:extLst>
+          </p:cNvPr>
+          <p:cNvSpPr>
+            <a:spLocks noGrp="1"/>
+          </p:cNvSpPr>
+          <p:nvPr>
+            <p:ph type="sldNum" sz="quarter" idx="12"/>
+          </p:nvPr>
+        </p:nvSpPr>
+        <p:spPr/>
+        <p:txBody>
+          <a:bodyPr/>
+          <a:lstStyle/>
+          <a:p>
+            <a:fld id="{80AE25ED-097C-4BDC-A7CE-FA97BD9CA3B5}" type="slidenum">
+              <a:rPr lang="da-DK" smtClean="0"/>
+              <a:pPr/>
+              <a:t>7</a:t>
             </a:fld>
             <a:endParaRPr lang="da-DK" dirty="0"/>
           </a:p>
@@ -14680,575 +16803,6 @@
 </p:sld>
 </file>
 
-<file path=ppt/slides/slide7.xml><?xml version="1.0" encoding="utf-8"?>
-<p:sld xmlns:a="http://schemas.openxmlformats.org/drawingml/2006/main" xmlns:r="http://schemas.openxmlformats.org/officeDocument/2006/relationships" xmlns:p="http://schemas.openxmlformats.org/presentationml/2006/main">
-  <p:cSld>
-    <p:spTree>
-      <p:nvGrpSpPr>
-        <p:cNvPr id="1" name=""/>
-        <p:cNvGrpSpPr/>
-        <p:nvPr/>
-      </p:nvGrpSpPr>
-      <p:grpSpPr>
-        <a:xfrm>
-          <a:off x="0" y="0"/>
-          <a:ext cx="0" cy="0"/>
-          <a:chOff x="0" y="0"/>
-          <a:chExt cx="0" cy="0"/>
-        </a:xfrm>
-      </p:grpSpPr>
-      <p:sp>
-        <p:nvSpPr>
-          <p:cNvPr id="2" name="Title 1">
-            <a:extLst>
-              <a:ext uri="{FF2B5EF4-FFF2-40B4-BE49-F238E27FC236}">
-                <a16:creationId xmlns:a16="http://schemas.microsoft.com/office/drawing/2014/main" id="{4187DA93-9A7E-4516-8F9C-BDF90149A578}"/>
-              </a:ext>
-            </a:extLst>
-          </p:cNvPr>
-          <p:cNvSpPr>
-            <a:spLocks noGrp="1"/>
-          </p:cNvSpPr>
-          <p:nvPr>
-            <p:ph type="title"/>
-          </p:nvPr>
-        </p:nvSpPr>
-        <p:spPr/>
-        <p:txBody>
-          <a:bodyPr/>
-          <a:lstStyle/>
-          <a:p>
-            <a:r>
-              <a:rPr lang="da-DK" dirty="0"/>
-              <a:t>Kommunikation mellem føderationer</a:t>
-            </a:r>
-          </a:p>
-        </p:txBody>
-      </p:sp>
-      <p:sp>
-        <p:nvSpPr>
-          <p:cNvPr id="4" name="Slide Number Placeholder 3">
-            <a:extLst>
-              <a:ext uri="{FF2B5EF4-FFF2-40B4-BE49-F238E27FC236}">
-                <a16:creationId xmlns:a16="http://schemas.microsoft.com/office/drawing/2014/main" id="{FFA5AB07-E28F-4137-A26A-63C1406ED05D}"/>
-              </a:ext>
-            </a:extLst>
-          </p:cNvPr>
-          <p:cNvSpPr>
-            <a:spLocks noGrp="1"/>
-          </p:cNvSpPr>
-          <p:nvPr>
-            <p:ph type="sldNum" sz="quarter" idx="12"/>
-          </p:nvPr>
-        </p:nvSpPr>
-        <p:spPr/>
-        <p:txBody>
-          <a:bodyPr/>
-          <a:lstStyle/>
-          <a:p>
-            <a:fld id="{80AE25ED-097C-4BDC-A7CE-FA97BD9CA3B5}" type="slidenum">
-              <a:rPr lang="da-DK" smtClean="0"/>
-              <a:pPr/>
-              <a:t>7</a:t>
-            </a:fld>
-            <a:endParaRPr lang="da-DK" dirty="0"/>
-          </a:p>
-        </p:txBody>
-      </p:sp>
-      <p:sp>
-        <p:nvSpPr>
-          <p:cNvPr id="5" name="Rectangle: Rounded Corners 4">
-            <a:extLst>
-              <a:ext uri="{FF2B5EF4-FFF2-40B4-BE49-F238E27FC236}">
-                <a16:creationId xmlns:a16="http://schemas.microsoft.com/office/drawing/2014/main" id="{ACC9E7C4-EEA7-4B8C-A5B3-4EFDE8A8AA0B}"/>
-              </a:ext>
-            </a:extLst>
-          </p:cNvPr>
-          <p:cNvSpPr/>
-          <p:nvPr/>
-        </p:nvSpPr>
-        <p:spPr>
-          <a:xfrm>
-            <a:off x="2063283" y="2348880"/>
-            <a:ext cx="2303956" cy="2736304"/>
-          </a:xfrm>
-          <a:prstGeom prst="roundRect">
-            <a:avLst>
-              <a:gd name="adj" fmla="val 9516"/>
-            </a:avLst>
-          </a:prstGeom>
-          <a:noFill/>
-          <a:ln w="12700">
-            <a:solidFill>
-              <a:srgbClr val="808080"/>
-            </a:solidFill>
-            <a:prstDash val="dash"/>
-          </a:ln>
-          <a:effectLst/>
-        </p:spPr>
-        <p:style>
-          <a:lnRef idx="1">
-            <a:schemeClr val="accent1"/>
-          </a:lnRef>
-          <a:fillRef idx="3">
-            <a:schemeClr val="accent1"/>
-          </a:fillRef>
-          <a:effectRef idx="2">
-            <a:schemeClr val="accent1"/>
-          </a:effectRef>
-          <a:fontRef idx="minor">
-            <a:schemeClr val="lt1"/>
-          </a:fontRef>
-        </p:style>
-        <p:txBody>
-          <a:bodyPr lIns="121917" tIns="60958" rIns="121917" bIns="60958" rtlCol="0" anchor="t" anchorCtr="0"/>
-          <a:lstStyle/>
-          <a:p>
-            <a:pPr algn="ctr"/>
-            <a:r>
-              <a:rPr lang="da-DK" sz="1600" dirty="0">
-                <a:solidFill>
-                  <a:srgbClr val="940027"/>
-                </a:solidFill>
-              </a:rPr>
-              <a:t>Føderation A</a:t>
-            </a:r>
-          </a:p>
-        </p:txBody>
-      </p:sp>
-      <p:sp>
-        <p:nvSpPr>
-          <p:cNvPr id="6" name="Rectangle: Rounded Corners 5">
-            <a:extLst>
-              <a:ext uri="{FF2B5EF4-FFF2-40B4-BE49-F238E27FC236}">
-                <a16:creationId xmlns:a16="http://schemas.microsoft.com/office/drawing/2014/main" id="{33097F5C-9B69-4F9F-A84A-2DAD5F01DE1D}"/>
-              </a:ext>
-            </a:extLst>
-          </p:cNvPr>
-          <p:cNvSpPr/>
-          <p:nvPr/>
-        </p:nvSpPr>
-        <p:spPr>
-          <a:xfrm>
-            <a:off x="6384332" y="2348880"/>
-            <a:ext cx="2303956" cy="2736304"/>
-          </a:xfrm>
-          <a:prstGeom prst="roundRect">
-            <a:avLst>
-              <a:gd name="adj" fmla="val 11304"/>
-            </a:avLst>
-          </a:prstGeom>
-          <a:noFill/>
-          <a:ln w="12700">
-            <a:solidFill>
-              <a:srgbClr val="808080"/>
-            </a:solidFill>
-            <a:prstDash val="dash"/>
-          </a:ln>
-          <a:effectLst/>
-        </p:spPr>
-        <p:style>
-          <a:lnRef idx="1">
-            <a:schemeClr val="accent1"/>
-          </a:lnRef>
-          <a:fillRef idx="3">
-            <a:schemeClr val="accent1"/>
-          </a:fillRef>
-          <a:effectRef idx="2">
-            <a:schemeClr val="accent1"/>
-          </a:effectRef>
-          <a:fontRef idx="minor">
-            <a:schemeClr val="lt1"/>
-          </a:fontRef>
-        </p:style>
-        <p:txBody>
-          <a:bodyPr lIns="121917" tIns="60958" rIns="121917" bIns="60958" rtlCol="0" anchor="t" anchorCtr="0"/>
-          <a:lstStyle/>
-          <a:p>
-            <a:pPr algn="ctr"/>
-            <a:r>
-              <a:rPr lang="da-DK" sz="1600" dirty="0">
-                <a:solidFill>
-                  <a:srgbClr val="940027"/>
-                </a:solidFill>
-              </a:rPr>
-              <a:t>Føderation B</a:t>
-            </a:r>
-          </a:p>
-        </p:txBody>
-      </p:sp>
-      <p:pic>
-        <p:nvPicPr>
-          <p:cNvPr id="7" name="Picture 2">
-            <a:extLst>
-              <a:ext uri="{FF2B5EF4-FFF2-40B4-BE49-F238E27FC236}">
-                <a16:creationId xmlns:a16="http://schemas.microsoft.com/office/drawing/2014/main" id="{0C29C31C-B32F-42B4-BF05-730D41FB078B}"/>
-              </a:ext>
-            </a:extLst>
-          </p:cNvPr>
-          <p:cNvPicPr>
-            <a:picLocks noChangeAspect="1" noChangeArrowheads="1"/>
-          </p:cNvPicPr>
-          <p:nvPr/>
-        </p:nvPicPr>
-        <p:blipFill>
-          <a:blip r:embed="rId2">
-            <a:duotone>
-              <a:schemeClr val="bg2">
-                <a:shade val="45000"/>
-                <a:satMod val="135000"/>
-              </a:schemeClr>
-              <a:prstClr val="white"/>
-            </a:duotone>
-            <a:extLst>
-              <a:ext uri="{28A0092B-C50C-407E-A947-70E740481C1C}">
-                <a14:useLocalDpi xmlns:a14="http://schemas.microsoft.com/office/drawing/2010/main" val="0"/>
-              </a:ext>
-            </a:extLst>
-          </a:blip>
-          <a:srcRect/>
-          <a:stretch>
-            <a:fillRect/>
-          </a:stretch>
-        </p:blipFill>
-        <p:spPr bwMode="auto">
-          <a:xfrm>
-            <a:off x="2707327" y="3035539"/>
-            <a:ext cx="1015868" cy="876503"/>
-          </a:xfrm>
-          <a:prstGeom prst="rect">
-            <a:avLst/>
-          </a:prstGeom>
-          <a:noFill/>
-          <a:ln>
-            <a:noFill/>
-          </a:ln>
-          <a:extLst>
-            <a:ext uri="{909E8E84-426E-40DD-AFC4-6F175D3DCCD1}">
-              <a14:hiddenFill xmlns:a14="http://schemas.microsoft.com/office/drawing/2010/main">
-                <a:solidFill>
-                  <a:schemeClr val="accent1"/>
-                </a:solidFill>
-              </a14:hiddenFill>
-            </a:ext>
-            <a:ext uri="{91240B29-F687-4F45-9708-019B960494DF}">
-              <a14:hiddenLine xmlns:a14="http://schemas.microsoft.com/office/drawing/2010/main" w="9525">
-                <a:solidFill>
-                  <a:schemeClr val="tx1"/>
-                </a:solidFill>
-                <a:miter lim="800000"/>
-                <a:headEnd/>
-                <a:tailEnd/>
-              </a14:hiddenLine>
-            </a:ext>
-          </a:extLst>
-        </p:spPr>
-      </p:pic>
-      <p:pic>
-        <p:nvPicPr>
-          <p:cNvPr id="8" name="Picture 3">
-            <a:extLst>
-              <a:ext uri="{FF2B5EF4-FFF2-40B4-BE49-F238E27FC236}">
-                <a16:creationId xmlns:a16="http://schemas.microsoft.com/office/drawing/2014/main" id="{669AC5B0-1CD3-40F8-9059-ABAFFB40D84A}"/>
-              </a:ext>
-            </a:extLst>
-          </p:cNvPr>
-          <p:cNvPicPr>
-            <a:picLocks noChangeAspect="1" noChangeArrowheads="1"/>
-          </p:cNvPicPr>
-          <p:nvPr/>
-        </p:nvPicPr>
-        <p:blipFill>
-          <a:blip r:embed="rId2">
-            <a:duotone>
-              <a:schemeClr val="bg2">
-                <a:shade val="45000"/>
-                <a:satMod val="135000"/>
-              </a:schemeClr>
-              <a:prstClr val="white"/>
-            </a:duotone>
-            <a:extLst>
-              <a:ext uri="{28A0092B-C50C-407E-A947-70E740481C1C}">
-                <a14:useLocalDpi xmlns:a14="http://schemas.microsoft.com/office/drawing/2010/main" val="0"/>
-              </a:ext>
-            </a:extLst>
-          </a:blip>
-          <a:srcRect/>
-          <a:stretch>
-            <a:fillRect/>
-          </a:stretch>
-        </p:blipFill>
-        <p:spPr bwMode="auto">
-          <a:xfrm>
-            <a:off x="6988264" y="3129489"/>
-            <a:ext cx="1015868" cy="876503"/>
-          </a:xfrm>
-          <a:prstGeom prst="rect">
-            <a:avLst/>
-          </a:prstGeom>
-          <a:noFill/>
-          <a:ln>
-            <a:noFill/>
-          </a:ln>
-          <a:extLst>
-            <a:ext uri="{909E8E84-426E-40DD-AFC4-6F175D3DCCD1}">
-              <a14:hiddenFill xmlns:a14="http://schemas.microsoft.com/office/drawing/2010/main">
-                <a:solidFill>
-                  <a:schemeClr val="accent1"/>
-                </a:solidFill>
-              </a14:hiddenFill>
-            </a:ext>
-            <a:ext uri="{91240B29-F687-4F45-9708-019B960494DF}">
-              <a14:hiddenLine xmlns:a14="http://schemas.microsoft.com/office/drawing/2010/main" w="9525">
-                <a:solidFill>
-                  <a:schemeClr val="tx1"/>
-                </a:solidFill>
-                <a:miter lim="800000"/>
-                <a:headEnd/>
-                <a:tailEnd/>
-              </a14:hiddenLine>
-            </a:ext>
-          </a:extLst>
-        </p:spPr>
-      </p:pic>
-      <p:sp>
-        <p:nvSpPr>
-          <p:cNvPr id="9" name="TextBox 8">
-            <a:extLst>
-              <a:ext uri="{FF2B5EF4-FFF2-40B4-BE49-F238E27FC236}">
-                <a16:creationId xmlns:a16="http://schemas.microsoft.com/office/drawing/2014/main" id="{1A23BF06-D9CE-46B5-8436-337AB1AF7D1D}"/>
-              </a:ext>
-            </a:extLst>
-          </p:cNvPr>
-          <p:cNvSpPr txBox="1"/>
-          <p:nvPr/>
-        </p:nvSpPr>
-        <p:spPr bwMode="auto">
-          <a:xfrm>
-            <a:off x="2332575" y="4005991"/>
-            <a:ext cx="1919963" cy="196657"/>
-          </a:xfrm>
-          <a:prstGeom prst="rect">
-            <a:avLst/>
-          </a:prstGeom>
-          <a:noFill/>
-          <a:ln w="9525">
-            <a:noFill/>
-            <a:miter lim="800000"/>
-            <a:headEnd/>
-            <a:tailEnd/>
-          </a:ln>
-          <a:effectLst/>
-        </p:spPr>
-        <p:txBody>
-          <a:bodyPr vert="horz" wrap="square" lIns="47999" tIns="0" rIns="0" bIns="0" numCol="1" rtlCol="0" anchor="t" anchorCtr="0" compatLnSpc="1">
-            <a:prstTxWarp prst="textNoShape">
-              <a:avLst/>
-            </a:prstTxWarp>
-            <a:spAutoFit/>
-          </a:bodyPr>
-          <a:lstStyle/>
-          <a:p>
-            <a:pPr marL="16933" indent="-33866" defTabSz="609585" eaLnBrk="0" hangingPunct="0">
-              <a:spcAft>
-                <a:spcPts val="2000"/>
-              </a:spcAft>
-            </a:pPr>
-            <a:r>
-              <a:rPr lang="da-DK" sz="1300" dirty="0">
-                <a:solidFill>
-                  <a:srgbClr val="808080"/>
-                </a:solidFill>
-                <a:latin typeface="Verdana"/>
-                <a:cs typeface="ＭＳ Ｐゴシック" pitchFamily="-111" charset="-128"/>
-              </a:rPr>
-              <a:t>Interne standarder</a:t>
-            </a:r>
-          </a:p>
-        </p:txBody>
-      </p:sp>
-      <p:sp>
-        <p:nvSpPr>
-          <p:cNvPr id="10" name="TextBox 9">
-            <a:extLst>
-              <a:ext uri="{FF2B5EF4-FFF2-40B4-BE49-F238E27FC236}">
-                <a16:creationId xmlns:a16="http://schemas.microsoft.com/office/drawing/2014/main" id="{CA83767E-97D0-4C9D-BD15-9C0C1007C9C3}"/>
-              </a:ext>
-            </a:extLst>
-          </p:cNvPr>
-          <p:cNvSpPr txBox="1"/>
-          <p:nvPr/>
-        </p:nvSpPr>
-        <p:spPr bwMode="auto">
-          <a:xfrm>
-            <a:off x="6768325" y="4005991"/>
-            <a:ext cx="1919963" cy="196657"/>
-          </a:xfrm>
-          <a:prstGeom prst="rect">
-            <a:avLst/>
-          </a:prstGeom>
-          <a:noFill/>
-          <a:ln w="9525">
-            <a:noFill/>
-            <a:miter lim="800000"/>
-            <a:headEnd/>
-            <a:tailEnd/>
-          </a:ln>
-          <a:effectLst/>
-        </p:spPr>
-        <p:txBody>
-          <a:bodyPr vert="horz" wrap="square" lIns="47999" tIns="0" rIns="0" bIns="0" numCol="1" rtlCol="0" anchor="t" anchorCtr="0" compatLnSpc="1">
-            <a:prstTxWarp prst="textNoShape">
-              <a:avLst/>
-            </a:prstTxWarp>
-            <a:spAutoFit/>
-          </a:bodyPr>
-          <a:lstStyle/>
-          <a:p>
-            <a:pPr marL="16933" indent="-33866" defTabSz="609585" eaLnBrk="0" hangingPunct="0">
-              <a:spcAft>
-                <a:spcPts val="2000"/>
-              </a:spcAft>
-            </a:pPr>
-            <a:r>
-              <a:rPr lang="da-DK" sz="1300" dirty="0">
-                <a:solidFill>
-                  <a:srgbClr val="808080"/>
-                </a:solidFill>
-                <a:latin typeface="Verdana"/>
-                <a:cs typeface="ＭＳ Ｐゴシック" pitchFamily="-111" charset="-128"/>
-              </a:rPr>
-              <a:t>Interne standarder</a:t>
-            </a:r>
-          </a:p>
-        </p:txBody>
-      </p:sp>
-      <p:sp>
-        <p:nvSpPr>
-          <p:cNvPr id="11" name="Left-Right Arrow 5">
-            <a:extLst>
-              <a:ext uri="{FF2B5EF4-FFF2-40B4-BE49-F238E27FC236}">
-                <a16:creationId xmlns:a16="http://schemas.microsoft.com/office/drawing/2014/main" id="{3655467A-3574-43AF-A50A-D8EF5520CA41}"/>
-              </a:ext>
-            </a:extLst>
-          </p:cNvPr>
-          <p:cNvSpPr/>
-          <p:nvPr/>
-        </p:nvSpPr>
-        <p:spPr>
-          <a:xfrm>
-            <a:off x="4800006" y="3237728"/>
-            <a:ext cx="1151978" cy="768263"/>
-          </a:xfrm>
-          <a:prstGeom prst="leftRightArrow">
-            <a:avLst/>
-          </a:prstGeom>
-          <a:noFill/>
-          <a:ln w="12700">
-            <a:solidFill>
-              <a:srgbClr val="808080"/>
-            </a:solidFill>
-          </a:ln>
-          <a:effectLst/>
-        </p:spPr>
-        <p:style>
-          <a:lnRef idx="1">
-            <a:schemeClr val="accent1"/>
-          </a:lnRef>
-          <a:fillRef idx="3">
-            <a:schemeClr val="accent1"/>
-          </a:fillRef>
-          <a:effectRef idx="2">
-            <a:schemeClr val="accent1"/>
-          </a:effectRef>
-          <a:fontRef idx="minor">
-            <a:schemeClr val="lt1"/>
-          </a:fontRef>
-        </p:style>
-        <p:txBody>
-          <a:bodyPr lIns="121917" tIns="60958" rIns="121917" bIns="60958" rtlCol="0" anchor="ctr"/>
-          <a:lstStyle/>
-          <a:p>
-            <a:pPr algn="ctr"/>
-            <a:endParaRPr lang="da-DK" dirty="0">
-              <a:ln w="38100">
-                <a:solidFill>
-                  <a:schemeClr val="tx1"/>
-                </a:solidFill>
-              </a:ln>
-            </a:endParaRPr>
-          </a:p>
-        </p:txBody>
-      </p:sp>
-      <p:sp>
-        <p:nvSpPr>
-          <p:cNvPr id="12" name="TextBox 11">
-            <a:extLst>
-              <a:ext uri="{FF2B5EF4-FFF2-40B4-BE49-F238E27FC236}">
-                <a16:creationId xmlns:a16="http://schemas.microsoft.com/office/drawing/2014/main" id="{52FE6539-C446-432F-8731-B05E6C3646FE}"/>
-              </a:ext>
-            </a:extLst>
-          </p:cNvPr>
-          <p:cNvSpPr txBox="1"/>
-          <p:nvPr/>
-        </p:nvSpPr>
-        <p:spPr bwMode="auto">
-          <a:xfrm>
-            <a:off x="4378194" y="4135047"/>
-            <a:ext cx="1919963" cy="628826"/>
-          </a:xfrm>
-          <a:prstGeom prst="rect">
-            <a:avLst/>
-          </a:prstGeom>
-          <a:noFill/>
-          <a:ln w="9525">
-            <a:noFill/>
-            <a:miter lim="800000"/>
-            <a:headEnd/>
-            <a:tailEnd/>
-          </a:ln>
-          <a:effectLst/>
-        </p:spPr>
-        <p:txBody>
-          <a:bodyPr vert="horz" wrap="square" lIns="47999" tIns="0" rIns="0" bIns="0" numCol="1" rtlCol="0" anchor="t" anchorCtr="0" compatLnSpc="1">
-            <a:prstTxWarp prst="textNoShape">
-              <a:avLst/>
-            </a:prstTxWarp>
-            <a:spAutoFit/>
-          </a:bodyPr>
-          <a:lstStyle/>
-          <a:p>
-            <a:pPr marL="16933" indent="-33866" algn="ctr" defTabSz="609585" eaLnBrk="0" hangingPunct="0">
-              <a:spcAft>
-                <a:spcPts val="2000"/>
-              </a:spcAft>
-            </a:pPr>
-            <a:r>
-              <a:rPr lang="da-DK" sz="1300" dirty="0">
-                <a:solidFill>
-                  <a:srgbClr val="808080"/>
-                </a:solidFill>
-                <a:latin typeface="Verdana"/>
-                <a:cs typeface="ＭＳ Ｐゴシック" pitchFamily="-111" charset="-128"/>
-              </a:rPr>
-              <a:t>Standarder for kommunikation mellem føderationer</a:t>
-            </a:r>
-          </a:p>
-        </p:txBody>
-      </p:sp>
-    </p:spTree>
-    <p:extLst>
-      <p:ext uri="{BB962C8B-B14F-4D97-AF65-F5344CB8AC3E}">
-        <p14:creationId xmlns:p14="http://schemas.microsoft.com/office/powerpoint/2010/main" val="4081548833"/>
-      </p:ext>
-    </p:extLst>
-  </p:cSld>
-  <p:clrMapOvr>
-    <a:masterClrMapping/>
-  </p:clrMapOvr>
-</p:sld>
-</file>
-
 <file path=ppt/slides/slide8.xml><?xml version="1.0" encoding="utf-8"?>
 <p:sld xmlns:a="http://schemas.openxmlformats.org/drawingml/2006/main" xmlns:r="http://schemas.openxmlformats.org/officeDocument/2006/relationships" xmlns:p="http://schemas.openxmlformats.org/presentationml/2006/main">
   <p:cSld>
@@ -15271,7 +16825,7 @@
           <p:cNvPr id="2" name="Title 1">
             <a:extLst>
               <a:ext uri="{FF2B5EF4-FFF2-40B4-BE49-F238E27FC236}">
-                <a16:creationId xmlns:a16="http://schemas.microsoft.com/office/drawing/2014/main" id="{56B6C2B6-EE19-4F2B-9A37-321D57A3E755}"/>
+                <a16:creationId xmlns:a16="http://schemas.microsoft.com/office/drawing/2014/main" id="{4187DA93-9A7E-4516-8F9C-BDF90149A578}"/>
               </a:ext>
             </a:extLst>
           </p:cNvPr>
@@ -15289,7 +16843,7 @@
           <a:p>
             <a:r>
               <a:rPr lang="da-DK" dirty="0"/>
-              <a:t>Relationer imellem brugere</a:t>
+              <a:t>Kommunikation mellem føderationer</a:t>
             </a:r>
           </a:p>
         </p:txBody>
@@ -15299,7 +16853,7 @@
           <p:cNvPr id="4" name="Slide Number Placeholder 3">
             <a:extLst>
               <a:ext uri="{FF2B5EF4-FFF2-40B4-BE49-F238E27FC236}">
-                <a16:creationId xmlns:a16="http://schemas.microsoft.com/office/drawing/2014/main" id="{58551074-0919-4C3A-AB55-5AA8649D6C06}"/>
+                <a16:creationId xmlns:a16="http://schemas.microsoft.com/office/drawing/2014/main" id="{FFA5AB07-E28F-4137-A26A-63C1406ED05D}"/>
               </a:ext>
             </a:extLst>
           </p:cNvPr>
@@ -15319,6 +16873,575 @@
               <a:rPr lang="da-DK" smtClean="0"/>
               <a:pPr/>
               <a:t>8</a:t>
+            </a:fld>
+            <a:endParaRPr lang="da-DK" dirty="0"/>
+          </a:p>
+        </p:txBody>
+      </p:sp>
+      <p:sp>
+        <p:nvSpPr>
+          <p:cNvPr id="5" name="Rectangle: Rounded Corners 4">
+            <a:extLst>
+              <a:ext uri="{FF2B5EF4-FFF2-40B4-BE49-F238E27FC236}">
+                <a16:creationId xmlns:a16="http://schemas.microsoft.com/office/drawing/2014/main" id="{ACC9E7C4-EEA7-4B8C-A5B3-4EFDE8A8AA0B}"/>
+              </a:ext>
+            </a:extLst>
+          </p:cNvPr>
+          <p:cNvSpPr/>
+          <p:nvPr/>
+        </p:nvSpPr>
+        <p:spPr>
+          <a:xfrm>
+            <a:off x="2063283" y="2348880"/>
+            <a:ext cx="2303956" cy="2736304"/>
+          </a:xfrm>
+          <a:prstGeom prst="roundRect">
+            <a:avLst>
+              <a:gd name="adj" fmla="val 9516"/>
+            </a:avLst>
+          </a:prstGeom>
+          <a:noFill/>
+          <a:ln w="12700">
+            <a:solidFill>
+              <a:srgbClr val="808080"/>
+            </a:solidFill>
+            <a:prstDash val="dash"/>
+          </a:ln>
+          <a:effectLst/>
+        </p:spPr>
+        <p:style>
+          <a:lnRef idx="1">
+            <a:schemeClr val="accent1"/>
+          </a:lnRef>
+          <a:fillRef idx="3">
+            <a:schemeClr val="accent1"/>
+          </a:fillRef>
+          <a:effectRef idx="2">
+            <a:schemeClr val="accent1"/>
+          </a:effectRef>
+          <a:fontRef idx="minor">
+            <a:schemeClr val="lt1"/>
+          </a:fontRef>
+        </p:style>
+        <p:txBody>
+          <a:bodyPr lIns="121917" tIns="60958" rIns="121917" bIns="60958" rtlCol="0" anchor="t" anchorCtr="0"/>
+          <a:lstStyle/>
+          <a:p>
+            <a:pPr algn="ctr"/>
+            <a:r>
+              <a:rPr lang="da-DK" sz="1600" dirty="0">
+                <a:solidFill>
+                  <a:srgbClr val="940027"/>
+                </a:solidFill>
+              </a:rPr>
+              <a:t>Føderation A</a:t>
+            </a:r>
+          </a:p>
+        </p:txBody>
+      </p:sp>
+      <p:sp>
+        <p:nvSpPr>
+          <p:cNvPr id="6" name="Rectangle: Rounded Corners 5">
+            <a:extLst>
+              <a:ext uri="{FF2B5EF4-FFF2-40B4-BE49-F238E27FC236}">
+                <a16:creationId xmlns:a16="http://schemas.microsoft.com/office/drawing/2014/main" id="{33097F5C-9B69-4F9F-A84A-2DAD5F01DE1D}"/>
+              </a:ext>
+            </a:extLst>
+          </p:cNvPr>
+          <p:cNvSpPr/>
+          <p:nvPr/>
+        </p:nvSpPr>
+        <p:spPr>
+          <a:xfrm>
+            <a:off x="6384332" y="2348880"/>
+            <a:ext cx="2303956" cy="2736304"/>
+          </a:xfrm>
+          <a:prstGeom prst="roundRect">
+            <a:avLst>
+              <a:gd name="adj" fmla="val 11304"/>
+            </a:avLst>
+          </a:prstGeom>
+          <a:noFill/>
+          <a:ln w="12700">
+            <a:solidFill>
+              <a:srgbClr val="808080"/>
+            </a:solidFill>
+            <a:prstDash val="dash"/>
+          </a:ln>
+          <a:effectLst/>
+        </p:spPr>
+        <p:style>
+          <a:lnRef idx="1">
+            <a:schemeClr val="accent1"/>
+          </a:lnRef>
+          <a:fillRef idx="3">
+            <a:schemeClr val="accent1"/>
+          </a:fillRef>
+          <a:effectRef idx="2">
+            <a:schemeClr val="accent1"/>
+          </a:effectRef>
+          <a:fontRef idx="minor">
+            <a:schemeClr val="lt1"/>
+          </a:fontRef>
+        </p:style>
+        <p:txBody>
+          <a:bodyPr lIns="121917" tIns="60958" rIns="121917" bIns="60958" rtlCol="0" anchor="t" anchorCtr="0"/>
+          <a:lstStyle/>
+          <a:p>
+            <a:pPr algn="ctr"/>
+            <a:r>
+              <a:rPr lang="da-DK" sz="1600" dirty="0">
+                <a:solidFill>
+                  <a:srgbClr val="940027"/>
+                </a:solidFill>
+              </a:rPr>
+              <a:t>Føderation B</a:t>
+            </a:r>
+          </a:p>
+        </p:txBody>
+      </p:sp>
+      <p:pic>
+        <p:nvPicPr>
+          <p:cNvPr id="7" name="Picture 2">
+            <a:extLst>
+              <a:ext uri="{FF2B5EF4-FFF2-40B4-BE49-F238E27FC236}">
+                <a16:creationId xmlns:a16="http://schemas.microsoft.com/office/drawing/2014/main" id="{0C29C31C-B32F-42B4-BF05-730D41FB078B}"/>
+              </a:ext>
+            </a:extLst>
+          </p:cNvPr>
+          <p:cNvPicPr>
+            <a:picLocks noChangeAspect="1" noChangeArrowheads="1"/>
+          </p:cNvPicPr>
+          <p:nvPr/>
+        </p:nvPicPr>
+        <p:blipFill>
+          <a:blip r:embed="rId2">
+            <a:duotone>
+              <a:schemeClr val="bg2">
+                <a:shade val="45000"/>
+                <a:satMod val="135000"/>
+              </a:schemeClr>
+              <a:prstClr val="white"/>
+            </a:duotone>
+            <a:extLst>
+              <a:ext uri="{28A0092B-C50C-407E-A947-70E740481C1C}">
+                <a14:useLocalDpi xmlns:a14="http://schemas.microsoft.com/office/drawing/2010/main" val="0"/>
+              </a:ext>
+            </a:extLst>
+          </a:blip>
+          <a:srcRect/>
+          <a:stretch>
+            <a:fillRect/>
+          </a:stretch>
+        </p:blipFill>
+        <p:spPr bwMode="auto">
+          <a:xfrm>
+            <a:off x="2707327" y="3035539"/>
+            <a:ext cx="1015868" cy="876503"/>
+          </a:xfrm>
+          <a:prstGeom prst="rect">
+            <a:avLst/>
+          </a:prstGeom>
+          <a:noFill/>
+          <a:ln>
+            <a:noFill/>
+          </a:ln>
+          <a:extLst>
+            <a:ext uri="{909E8E84-426E-40DD-AFC4-6F175D3DCCD1}">
+              <a14:hiddenFill xmlns:a14="http://schemas.microsoft.com/office/drawing/2010/main">
+                <a:solidFill>
+                  <a:schemeClr val="accent1"/>
+                </a:solidFill>
+              </a14:hiddenFill>
+            </a:ext>
+            <a:ext uri="{91240B29-F687-4F45-9708-019B960494DF}">
+              <a14:hiddenLine xmlns:a14="http://schemas.microsoft.com/office/drawing/2010/main" w="9525">
+                <a:solidFill>
+                  <a:schemeClr val="tx1"/>
+                </a:solidFill>
+                <a:miter lim="800000"/>
+                <a:headEnd/>
+                <a:tailEnd/>
+              </a14:hiddenLine>
+            </a:ext>
+          </a:extLst>
+        </p:spPr>
+      </p:pic>
+      <p:pic>
+        <p:nvPicPr>
+          <p:cNvPr id="8" name="Picture 3">
+            <a:extLst>
+              <a:ext uri="{FF2B5EF4-FFF2-40B4-BE49-F238E27FC236}">
+                <a16:creationId xmlns:a16="http://schemas.microsoft.com/office/drawing/2014/main" id="{669AC5B0-1CD3-40F8-9059-ABAFFB40D84A}"/>
+              </a:ext>
+            </a:extLst>
+          </p:cNvPr>
+          <p:cNvPicPr>
+            <a:picLocks noChangeAspect="1" noChangeArrowheads="1"/>
+          </p:cNvPicPr>
+          <p:nvPr/>
+        </p:nvPicPr>
+        <p:blipFill>
+          <a:blip r:embed="rId2">
+            <a:duotone>
+              <a:schemeClr val="bg2">
+                <a:shade val="45000"/>
+                <a:satMod val="135000"/>
+              </a:schemeClr>
+              <a:prstClr val="white"/>
+            </a:duotone>
+            <a:extLst>
+              <a:ext uri="{28A0092B-C50C-407E-A947-70E740481C1C}">
+                <a14:useLocalDpi xmlns:a14="http://schemas.microsoft.com/office/drawing/2010/main" val="0"/>
+              </a:ext>
+            </a:extLst>
+          </a:blip>
+          <a:srcRect/>
+          <a:stretch>
+            <a:fillRect/>
+          </a:stretch>
+        </p:blipFill>
+        <p:spPr bwMode="auto">
+          <a:xfrm>
+            <a:off x="6988264" y="3129489"/>
+            <a:ext cx="1015868" cy="876503"/>
+          </a:xfrm>
+          <a:prstGeom prst="rect">
+            <a:avLst/>
+          </a:prstGeom>
+          <a:noFill/>
+          <a:ln>
+            <a:noFill/>
+          </a:ln>
+          <a:extLst>
+            <a:ext uri="{909E8E84-426E-40DD-AFC4-6F175D3DCCD1}">
+              <a14:hiddenFill xmlns:a14="http://schemas.microsoft.com/office/drawing/2010/main">
+                <a:solidFill>
+                  <a:schemeClr val="accent1"/>
+                </a:solidFill>
+              </a14:hiddenFill>
+            </a:ext>
+            <a:ext uri="{91240B29-F687-4F45-9708-019B960494DF}">
+              <a14:hiddenLine xmlns:a14="http://schemas.microsoft.com/office/drawing/2010/main" w="9525">
+                <a:solidFill>
+                  <a:schemeClr val="tx1"/>
+                </a:solidFill>
+                <a:miter lim="800000"/>
+                <a:headEnd/>
+                <a:tailEnd/>
+              </a14:hiddenLine>
+            </a:ext>
+          </a:extLst>
+        </p:spPr>
+      </p:pic>
+      <p:sp>
+        <p:nvSpPr>
+          <p:cNvPr id="9" name="TextBox 8">
+            <a:extLst>
+              <a:ext uri="{FF2B5EF4-FFF2-40B4-BE49-F238E27FC236}">
+                <a16:creationId xmlns:a16="http://schemas.microsoft.com/office/drawing/2014/main" id="{1A23BF06-D9CE-46B5-8436-337AB1AF7D1D}"/>
+              </a:ext>
+            </a:extLst>
+          </p:cNvPr>
+          <p:cNvSpPr txBox="1"/>
+          <p:nvPr/>
+        </p:nvSpPr>
+        <p:spPr bwMode="auto">
+          <a:xfrm>
+            <a:off x="2332575" y="4005991"/>
+            <a:ext cx="1919963" cy="196657"/>
+          </a:xfrm>
+          <a:prstGeom prst="rect">
+            <a:avLst/>
+          </a:prstGeom>
+          <a:noFill/>
+          <a:ln w="9525">
+            <a:noFill/>
+            <a:miter lim="800000"/>
+            <a:headEnd/>
+            <a:tailEnd/>
+          </a:ln>
+          <a:effectLst/>
+        </p:spPr>
+        <p:txBody>
+          <a:bodyPr vert="horz" wrap="square" lIns="47999" tIns="0" rIns="0" bIns="0" numCol="1" rtlCol="0" anchor="t" anchorCtr="0" compatLnSpc="1">
+            <a:prstTxWarp prst="textNoShape">
+              <a:avLst/>
+            </a:prstTxWarp>
+            <a:spAutoFit/>
+          </a:bodyPr>
+          <a:lstStyle/>
+          <a:p>
+            <a:pPr marL="16933" indent="-33866" defTabSz="609585" eaLnBrk="0" hangingPunct="0">
+              <a:spcAft>
+                <a:spcPts val="2000"/>
+              </a:spcAft>
+            </a:pPr>
+            <a:r>
+              <a:rPr lang="da-DK" sz="1300" dirty="0">
+                <a:solidFill>
+                  <a:srgbClr val="808080"/>
+                </a:solidFill>
+                <a:latin typeface="Verdana"/>
+                <a:cs typeface="ＭＳ Ｐゴシック" pitchFamily="-111" charset="-128"/>
+              </a:rPr>
+              <a:t>Interne standarder</a:t>
+            </a:r>
+          </a:p>
+        </p:txBody>
+      </p:sp>
+      <p:sp>
+        <p:nvSpPr>
+          <p:cNvPr id="10" name="TextBox 9">
+            <a:extLst>
+              <a:ext uri="{FF2B5EF4-FFF2-40B4-BE49-F238E27FC236}">
+                <a16:creationId xmlns:a16="http://schemas.microsoft.com/office/drawing/2014/main" id="{CA83767E-97D0-4C9D-BD15-9C0C1007C9C3}"/>
+              </a:ext>
+            </a:extLst>
+          </p:cNvPr>
+          <p:cNvSpPr txBox="1"/>
+          <p:nvPr/>
+        </p:nvSpPr>
+        <p:spPr bwMode="auto">
+          <a:xfrm>
+            <a:off x="6768325" y="4005991"/>
+            <a:ext cx="1919963" cy="196657"/>
+          </a:xfrm>
+          <a:prstGeom prst="rect">
+            <a:avLst/>
+          </a:prstGeom>
+          <a:noFill/>
+          <a:ln w="9525">
+            <a:noFill/>
+            <a:miter lim="800000"/>
+            <a:headEnd/>
+            <a:tailEnd/>
+          </a:ln>
+          <a:effectLst/>
+        </p:spPr>
+        <p:txBody>
+          <a:bodyPr vert="horz" wrap="square" lIns="47999" tIns="0" rIns="0" bIns="0" numCol="1" rtlCol="0" anchor="t" anchorCtr="0" compatLnSpc="1">
+            <a:prstTxWarp prst="textNoShape">
+              <a:avLst/>
+            </a:prstTxWarp>
+            <a:spAutoFit/>
+          </a:bodyPr>
+          <a:lstStyle/>
+          <a:p>
+            <a:pPr marL="16933" indent="-33866" defTabSz="609585" eaLnBrk="0" hangingPunct="0">
+              <a:spcAft>
+                <a:spcPts val="2000"/>
+              </a:spcAft>
+            </a:pPr>
+            <a:r>
+              <a:rPr lang="da-DK" sz="1300" dirty="0">
+                <a:solidFill>
+                  <a:srgbClr val="808080"/>
+                </a:solidFill>
+                <a:latin typeface="Verdana"/>
+                <a:cs typeface="ＭＳ Ｐゴシック" pitchFamily="-111" charset="-128"/>
+              </a:rPr>
+              <a:t>Interne standarder</a:t>
+            </a:r>
+          </a:p>
+        </p:txBody>
+      </p:sp>
+      <p:sp>
+        <p:nvSpPr>
+          <p:cNvPr id="11" name="Left-Right Arrow 5">
+            <a:extLst>
+              <a:ext uri="{FF2B5EF4-FFF2-40B4-BE49-F238E27FC236}">
+                <a16:creationId xmlns:a16="http://schemas.microsoft.com/office/drawing/2014/main" id="{3655467A-3574-43AF-A50A-D8EF5520CA41}"/>
+              </a:ext>
+            </a:extLst>
+          </p:cNvPr>
+          <p:cNvSpPr/>
+          <p:nvPr/>
+        </p:nvSpPr>
+        <p:spPr>
+          <a:xfrm>
+            <a:off x="4800006" y="3237728"/>
+            <a:ext cx="1151978" cy="768263"/>
+          </a:xfrm>
+          <a:prstGeom prst="leftRightArrow">
+            <a:avLst/>
+          </a:prstGeom>
+          <a:noFill/>
+          <a:ln w="12700">
+            <a:solidFill>
+              <a:srgbClr val="808080"/>
+            </a:solidFill>
+          </a:ln>
+          <a:effectLst/>
+        </p:spPr>
+        <p:style>
+          <a:lnRef idx="1">
+            <a:schemeClr val="accent1"/>
+          </a:lnRef>
+          <a:fillRef idx="3">
+            <a:schemeClr val="accent1"/>
+          </a:fillRef>
+          <a:effectRef idx="2">
+            <a:schemeClr val="accent1"/>
+          </a:effectRef>
+          <a:fontRef idx="minor">
+            <a:schemeClr val="lt1"/>
+          </a:fontRef>
+        </p:style>
+        <p:txBody>
+          <a:bodyPr lIns="121917" tIns="60958" rIns="121917" bIns="60958" rtlCol="0" anchor="ctr"/>
+          <a:lstStyle/>
+          <a:p>
+            <a:pPr algn="ctr"/>
+            <a:endParaRPr lang="da-DK" dirty="0">
+              <a:ln w="38100">
+                <a:solidFill>
+                  <a:schemeClr val="tx1"/>
+                </a:solidFill>
+              </a:ln>
+            </a:endParaRPr>
+          </a:p>
+        </p:txBody>
+      </p:sp>
+      <p:sp>
+        <p:nvSpPr>
+          <p:cNvPr id="12" name="TextBox 11">
+            <a:extLst>
+              <a:ext uri="{FF2B5EF4-FFF2-40B4-BE49-F238E27FC236}">
+                <a16:creationId xmlns:a16="http://schemas.microsoft.com/office/drawing/2014/main" id="{52FE6539-C446-432F-8731-B05E6C3646FE}"/>
+              </a:ext>
+            </a:extLst>
+          </p:cNvPr>
+          <p:cNvSpPr txBox="1"/>
+          <p:nvPr/>
+        </p:nvSpPr>
+        <p:spPr bwMode="auto">
+          <a:xfrm>
+            <a:off x="4378194" y="4135047"/>
+            <a:ext cx="1919963" cy="628826"/>
+          </a:xfrm>
+          <a:prstGeom prst="rect">
+            <a:avLst/>
+          </a:prstGeom>
+          <a:noFill/>
+          <a:ln w="9525">
+            <a:noFill/>
+            <a:miter lim="800000"/>
+            <a:headEnd/>
+            <a:tailEnd/>
+          </a:ln>
+          <a:effectLst/>
+        </p:spPr>
+        <p:txBody>
+          <a:bodyPr vert="horz" wrap="square" lIns="47999" tIns="0" rIns="0" bIns="0" numCol="1" rtlCol="0" anchor="t" anchorCtr="0" compatLnSpc="1">
+            <a:prstTxWarp prst="textNoShape">
+              <a:avLst/>
+            </a:prstTxWarp>
+            <a:spAutoFit/>
+          </a:bodyPr>
+          <a:lstStyle/>
+          <a:p>
+            <a:pPr marL="16933" indent="-33866" algn="ctr" defTabSz="609585" eaLnBrk="0" hangingPunct="0">
+              <a:spcAft>
+                <a:spcPts val="2000"/>
+              </a:spcAft>
+            </a:pPr>
+            <a:r>
+              <a:rPr lang="da-DK" sz="1300" dirty="0">
+                <a:solidFill>
+                  <a:srgbClr val="808080"/>
+                </a:solidFill>
+                <a:latin typeface="Verdana"/>
+                <a:cs typeface="ＭＳ Ｐゴシック" pitchFamily="-111" charset="-128"/>
+              </a:rPr>
+              <a:t>Standarder for kommunikation mellem føderationer</a:t>
+            </a:r>
+          </a:p>
+        </p:txBody>
+      </p:sp>
+    </p:spTree>
+    <p:extLst>
+      <p:ext uri="{BB962C8B-B14F-4D97-AF65-F5344CB8AC3E}">
+        <p14:creationId xmlns:p14="http://schemas.microsoft.com/office/powerpoint/2010/main" val="4081548833"/>
+      </p:ext>
+    </p:extLst>
+  </p:cSld>
+  <p:clrMapOvr>
+    <a:masterClrMapping/>
+  </p:clrMapOvr>
+</p:sld>
+</file>
+
+<file path=ppt/slides/slide9.xml><?xml version="1.0" encoding="utf-8"?>
+<p:sld xmlns:a="http://schemas.openxmlformats.org/drawingml/2006/main" xmlns:r="http://schemas.openxmlformats.org/officeDocument/2006/relationships" xmlns:p="http://schemas.openxmlformats.org/presentationml/2006/main">
+  <p:cSld>
+    <p:spTree>
+      <p:nvGrpSpPr>
+        <p:cNvPr id="1" name=""/>
+        <p:cNvGrpSpPr/>
+        <p:nvPr/>
+      </p:nvGrpSpPr>
+      <p:grpSpPr>
+        <a:xfrm>
+          <a:off x="0" y="0"/>
+          <a:ext cx="0" cy="0"/>
+          <a:chOff x="0" y="0"/>
+          <a:chExt cx="0" cy="0"/>
+        </a:xfrm>
+      </p:grpSpPr>
+      <p:sp>
+        <p:nvSpPr>
+          <p:cNvPr id="2" name="Title 1">
+            <a:extLst>
+              <a:ext uri="{FF2B5EF4-FFF2-40B4-BE49-F238E27FC236}">
+                <a16:creationId xmlns:a16="http://schemas.microsoft.com/office/drawing/2014/main" id="{56B6C2B6-EE19-4F2B-9A37-321D57A3E755}"/>
+              </a:ext>
+            </a:extLst>
+          </p:cNvPr>
+          <p:cNvSpPr>
+            <a:spLocks noGrp="1"/>
+          </p:cNvSpPr>
+          <p:nvPr>
+            <p:ph type="title"/>
+          </p:nvPr>
+        </p:nvSpPr>
+        <p:spPr/>
+        <p:txBody>
+          <a:bodyPr/>
+          <a:lstStyle/>
+          <a:p>
+            <a:r>
+              <a:rPr lang="da-DK" dirty="0"/>
+              <a:t>Relationer imellem brugere</a:t>
+            </a:r>
+          </a:p>
+        </p:txBody>
+      </p:sp>
+      <p:sp>
+        <p:nvSpPr>
+          <p:cNvPr id="4" name="Slide Number Placeholder 3">
+            <a:extLst>
+              <a:ext uri="{FF2B5EF4-FFF2-40B4-BE49-F238E27FC236}">
+                <a16:creationId xmlns:a16="http://schemas.microsoft.com/office/drawing/2014/main" id="{58551074-0919-4C3A-AB55-5AA8649D6C06}"/>
+              </a:ext>
+            </a:extLst>
+          </p:cNvPr>
+          <p:cNvSpPr>
+            <a:spLocks noGrp="1"/>
+          </p:cNvSpPr>
+          <p:nvPr>
+            <p:ph type="sldNum" sz="quarter" idx="12"/>
+          </p:nvPr>
+        </p:nvSpPr>
+        <p:spPr/>
+        <p:txBody>
+          <a:bodyPr/>
+          <a:lstStyle/>
+          <a:p>
+            <a:fld id="{80AE25ED-097C-4BDC-A7CE-FA97BD9CA3B5}" type="slidenum">
+              <a:rPr lang="da-DK" smtClean="0"/>
+              <a:pPr/>
+              <a:t>9</a:t>
             </a:fld>
             <a:endParaRPr lang="da-DK" dirty="0"/>
           </a:p>
@@ -16411,970 +18534,6 @@
     <p:extLst>
       <p:ext uri="{BB962C8B-B14F-4D97-AF65-F5344CB8AC3E}">
         <p14:creationId xmlns:p14="http://schemas.microsoft.com/office/powerpoint/2010/main" val="3326203232"/>
-      </p:ext>
-    </p:extLst>
-  </p:cSld>
-  <p:clrMapOvr>
-    <a:masterClrMapping/>
-  </p:clrMapOvr>
-</p:sld>
-</file>
-
-<file path=ppt/slides/slide9.xml><?xml version="1.0" encoding="utf-8"?>
-<p:sld xmlns:a="http://schemas.openxmlformats.org/drawingml/2006/main" xmlns:r="http://schemas.openxmlformats.org/officeDocument/2006/relationships" xmlns:p="http://schemas.openxmlformats.org/presentationml/2006/main">
-  <p:cSld>
-    <p:spTree>
-      <p:nvGrpSpPr>
-        <p:cNvPr id="1" name=""/>
-        <p:cNvGrpSpPr/>
-        <p:nvPr/>
-      </p:nvGrpSpPr>
-      <p:grpSpPr>
-        <a:xfrm>
-          <a:off x="0" y="0"/>
-          <a:ext cx="0" cy="0"/>
-          <a:chOff x="0" y="0"/>
-          <a:chExt cx="0" cy="0"/>
-        </a:xfrm>
-      </p:grpSpPr>
-      <p:sp>
-        <p:nvSpPr>
-          <p:cNvPr id="2" name="Title 1">
-            <a:extLst>
-              <a:ext uri="{FF2B5EF4-FFF2-40B4-BE49-F238E27FC236}">
-                <a16:creationId xmlns:a16="http://schemas.microsoft.com/office/drawing/2014/main" id="{E8C2DD57-F068-4A07-BE77-DB8D684B0151}"/>
-              </a:ext>
-            </a:extLst>
-          </p:cNvPr>
-          <p:cNvSpPr>
-            <a:spLocks noGrp="1"/>
-          </p:cNvSpPr>
-          <p:nvPr>
-            <p:ph type="title"/>
-          </p:nvPr>
-        </p:nvSpPr>
-        <p:spPr/>
-        <p:txBody>
-          <a:bodyPr/>
-          <a:lstStyle/>
-          <a:p>
-            <a:r>
-              <a:rPr lang="da-DK" dirty="0"/>
-              <a:t>Brug af tjenester – lagdeling – Identitetsbaseret kald</a:t>
-            </a:r>
-          </a:p>
-        </p:txBody>
-      </p:sp>
-      <p:sp>
-        <p:nvSpPr>
-          <p:cNvPr id="4" name="Slide Number Placeholder 3">
-            <a:extLst>
-              <a:ext uri="{FF2B5EF4-FFF2-40B4-BE49-F238E27FC236}">
-                <a16:creationId xmlns:a16="http://schemas.microsoft.com/office/drawing/2014/main" id="{D5E0A99A-F871-400F-963A-E4D4A890B575}"/>
-              </a:ext>
-            </a:extLst>
-          </p:cNvPr>
-          <p:cNvSpPr>
-            <a:spLocks noGrp="1"/>
-          </p:cNvSpPr>
-          <p:nvPr>
-            <p:ph type="sldNum" sz="quarter" idx="12"/>
-          </p:nvPr>
-        </p:nvSpPr>
-        <p:spPr/>
-        <p:txBody>
-          <a:bodyPr/>
-          <a:lstStyle/>
-          <a:p>
-            <a:fld id="{80AE25ED-097C-4BDC-A7CE-FA97BD9CA3B5}" type="slidenum">
-              <a:rPr lang="da-DK" smtClean="0"/>
-              <a:pPr/>
-              <a:t>9</a:t>
-            </a:fld>
-            <a:endParaRPr lang="da-DK" dirty="0"/>
-          </a:p>
-        </p:txBody>
-      </p:sp>
-      <p:sp>
-        <p:nvSpPr>
-          <p:cNvPr id="5" name="Rectangle 4">
-            <a:extLst>
-              <a:ext uri="{FF2B5EF4-FFF2-40B4-BE49-F238E27FC236}">
-                <a16:creationId xmlns:a16="http://schemas.microsoft.com/office/drawing/2014/main" id="{80F23CFE-4731-4BD8-9F2C-4A24DF23AC26}"/>
-              </a:ext>
-            </a:extLst>
-          </p:cNvPr>
-          <p:cNvSpPr/>
-          <p:nvPr/>
-        </p:nvSpPr>
-        <p:spPr bwMode="auto">
-          <a:xfrm>
-            <a:off x="2927654" y="1916832"/>
-            <a:ext cx="2088226" cy="432047"/>
-          </a:xfrm>
-          <a:prstGeom prst="rect">
-            <a:avLst/>
-          </a:prstGeom>
-          <a:solidFill>
-            <a:schemeClr val="bg1"/>
-          </a:solidFill>
-          <a:ln w="6350" cap="flat" cmpd="sng" algn="ctr">
-            <a:solidFill>
-              <a:schemeClr val="accent2"/>
-            </a:solidFill>
-            <a:prstDash val="solid"/>
-            <a:round/>
-            <a:headEnd type="none" w="med" len="med"/>
-            <a:tailEnd type="none" w="med" len="med"/>
-          </a:ln>
-          <a:effectLst/>
-        </p:spPr>
-        <p:txBody>
-          <a:bodyPr vert="horz" wrap="none" lIns="90000" tIns="46800" rIns="90000" bIns="46800" numCol="1" rtlCol="0" anchor="ctr" anchorCtr="0" compatLnSpc="1">
-            <a:prstTxWarp prst="textNoShape">
-              <a:avLst/>
-            </a:prstTxWarp>
-          </a:bodyPr>
-          <a:lstStyle/>
-          <a:p>
-            <a:pPr marL="0" marR="0" indent="0" algn="ctr" defTabSz="914400" rtl="0" eaLnBrk="1" fontAlgn="base" latinLnBrk="0" hangingPunct="1">
-              <a:lnSpc>
-                <a:spcPct val="100000"/>
-              </a:lnSpc>
-              <a:spcBef>
-                <a:spcPts val="1100"/>
-              </a:spcBef>
-              <a:spcAft>
-                <a:spcPct val="0"/>
-              </a:spcAft>
-              <a:buClrTx/>
-              <a:buSzTx/>
-              <a:buFontTx/>
-              <a:buNone/>
-              <a:tabLst/>
-            </a:pPr>
-            <a:r>
-              <a:rPr kumimoji="0" lang="da-DK" sz="2000" b="0" i="0" u="none" strike="noStrike" cap="none" normalizeH="0" baseline="0" dirty="0">
-                <a:ln>
-                  <a:noFill/>
-                </a:ln>
-                <a:solidFill>
-                  <a:schemeClr val="accent2"/>
-                </a:solidFill>
-                <a:effectLst/>
-                <a:latin typeface="Arial" charset="0"/>
-              </a:rPr>
-              <a:t>Bruger A</a:t>
-            </a:r>
-          </a:p>
-        </p:txBody>
-      </p:sp>
-      <p:sp>
-        <p:nvSpPr>
-          <p:cNvPr id="6" name="Rectangle 5">
-            <a:extLst>
-              <a:ext uri="{FF2B5EF4-FFF2-40B4-BE49-F238E27FC236}">
-                <a16:creationId xmlns:a16="http://schemas.microsoft.com/office/drawing/2014/main" id="{C0F2F510-D8B5-4DE6-89D3-0536FB18E341}"/>
-              </a:ext>
-            </a:extLst>
-          </p:cNvPr>
-          <p:cNvSpPr/>
-          <p:nvPr/>
-        </p:nvSpPr>
-        <p:spPr bwMode="auto">
-          <a:xfrm>
-            <a:off x="2927654" y="2767288"/>
-            <a:ext cx="2088226" cy="805728"/>
-          </a:xfrm>
-          <a:prstGeom prst="rect">
-            <a:avLst/>
-          </a:prstGeom>
-          <a:solidFill>
-            <a:schemeClr val="bg1"/>
-          </a:solidFill>
-          <a:ln w="6350" cap="flat" cmpd="sng" algn="ctr">
-            <a:solidFill>
-              <a:schemeClr val="accent2"/>
-            </a:solidFill>
-            <a:prstDash val="solid"/>
-            <a:round/>
-            <a:headEnd type="none" w="med" len="med"/>
-            <a:tailEnd type="none" w="med" len="med"/>
-          </a:ln>
-          <a:effectLst/>
-        </p:spPr>
-        <p:txBody>
-          <a:bodyPr vert="horz" wrap="none" lIns="90000" tIns="46800" rIns="90000" bIns="46800" numCol="1" rtlCol="0" anchor="ctr" anchorCtr="0" compatLnSpc="1">
-            <a:prstTxWarp prst="textNoShape">
-              <a:avLst/>
-            </a:prstTxWarp>
-          </a:bodyPr>
-          <a:lstStyle/>
-          <a:p>
-            <a:pPr marL="0" marR="0" indent="0" algn="ctr" defTabSz="914400" rtl="0" eaLnBrk="1" fontAlgn="base" latinLnBrk="0" hangingPunct="1">
-              <a:lnSpc>
-                <a:spcPct val="100000"/>
-              </a:lnSpc>
-              <a:spcBef>
-                <a:spcPts val="1100"/>
-              </a:spcBef>
-              <a:spcAft>
-                <a:spcPct val="0"/>
-              </a:spcAft>
-              <a:buClrTx/>
-              <a:buSzTx/>
-              <a:buFontTx/>
-              <a:buNone/>
-              <a:tabLst/>
-            </a:pPr>
-            <a:r>
-              <a:rPr kumimoji="0" lang="da-DK" sz="2000" b="0" i="0" u="none" strike="noStrike" cap="none" normalizeH="0" baseline="0" dirty="0">
-                <a:ln>
-                  <a:noFill/>
-                </a:ln>
-                <a:solidFill>
-                  <a:schemeClr val="accent2"/>
-                </a:solidFill>
-                <a:effectLst/>
-                <a:latin typeface="Arial" charset="0"/>
-              </a:rPr>
-              <a:t>Tjeneste B</a:t>
-            </a:r>
-          </a:p>
-          <a:p>
-            <a:pPr marL="0" marR="0" indent="0" algn="ctr" defTabSz="914400" rtl="0" eaLnBrk="1" fontAlgn="base" latinLnBrk="0" hangingPunct="1">
-              <a:lnSpc>
-                <a:spcPct val="100000"/>
-              </a:lnSpc>
-              <a:spcBef>
-                <a:spcPts val="1100"/>
-              </a:spcBef>
-              <a:spcAft>
-                <a:spcPct val="0"/>
-              </a:spcAft>
-              <a:buClrTx/>
-              <a:buSzTx/>
-              <a:buFontTx/>
-              <a:buNone/>
-              <a:tabLst/>
-            </a:pPr>
-            <a:r>
-              <a:rPr lang="da-DK" sz="2000" dirty="0">
-                <a:solidFill>
-                  <a:schemeClr val="accent2"/>
-                </a:solidFill>
-              </a:rPr>
-              <a:t>Tjeneste B bruger</a:t>
-            </a:r>
-            <a:endParaRPr kumimoji="0" lang="da-DK" sz="2000" b="0" i="0" u="none" strike="noStrike" cap="none" normalizeH="0" baseline="0" dirty="0">
-              <a:ln>
-                <a:noFill/>
-              </a:ln>
-              <a:solidFill>
-                <a:schemeClr val="accent2"/>
-              </a:solidFill>
-              <a:effectLst/>
-              <a:latin typeface="Arial" charset="0"/>
-            </a:endParaRPr>
-          </a:p>
-        </p:txBody>
-      </p:sp>
-      <p:cxnSp>
-        <p:nvCxnSpPr>
-          <p:cNvPr id="12" name="Straight Connector 11">
-            <a:extLst>
-              <a:ext uri="{FF2B5EF4-FFF2-40B4-BE49-F238E27FC236}">
-                <a16:creationId xmlns:a16="http://schemas.microsoft.com/office/drawing/2014/main" id="{9ED7741A-D18B-4371-A916-154DBC5D6BB4}"/>
-              </a:ext>
-            </a:extLst>
-          </p:cNvPr>
-          <p:cNvCxnSpPr>
-            <a:cxnSpLocks/>
-            <a:stCxn id="6" idx="1"/>
-            <a:endCxn id="6" idx="3"/>
-          </p:cNvCxnSpPr>
-          <p:nvPr/>
-        </p:nvCxnSpPr>
-        <p:spPr bwMode="auto">
-          <a:xfrm>
-            <a:off x="2927654" y="3170152"/>
-            <a:ext cx="2088226" cy="0"/>
-          </a:xfrm>
-          <a:prstGeom prst="line">
-            <a:avLst/>
-          </a:prstGeom>
-          <a:solidFill>
-            <a:schemeClr val="accent1"/>
-          </a:solidFill>
-          <a:ln w="6350" cap="flat" cmpd="sng" algn="ctr">
-            <a:solidFill>
-              <a:schemeClr val="accent2"/>
-            </a:solidFill>
-            <a:prstDash val="dash"/>
-            <a:round/>
-            <a:headEnd type="none" w="med" len="med"/>
-            <a:tailEnd type="none" w="med" len="med"/>
-          </a:ln>
-          <a:effectLst/>
-          <a:extLst>
-            <a:ext uri="{AF507438-7753-43E0-B8FC-AC1667EBCBE1}">
-              <a14:hiddenEffects xmlns:a14="http://schemas.microsoft.com/office/drawing/2010/main">
-                <a:effectLst>
-                  <a:outerShdw dist="35921" dir="2700000" algn="ctr" rotWithShape="0">
-                    <a:schemeClr val="bg2"/>
-                  </a:outerShdw>
-                </a:effectLst>
-              </a14:hiddenEffects>
-            </a:ext>
-          </a:extLst>
-        </p:spPr>
-      </p:cxnSp>
-      <p:sp>
-        <p:nvSpPr>
-          <p:cNvPr id="13" name="Rectangle 12">
-            <a:extLst>
-              <a:ext uri="{FF2B5EF4-FFF2-40B4-BE49-F238E27FC236}">
-                <a16:creationId xmlns:a16="http://schemas.microsoft.com/office/drawing/2014/main" id="{E39C6551-9D34-415D-BE85-D8B8B3BBA666}"/>
-              </a:ext>
-            </a:extLst>
-          </p:cNvPr>
-          <p:cNvSpPr/>
-          <p:nvPr/>
-        </p:nvSpPr>
-        <p:spPr bwMode="auto">
-          <a:xfrm>
-            <a:off x="2927654" y="4005064"/>
-            <a:ext cx="2088226" cy="805728"/>
-          </a:xfrm>
-          <a:prstGeom prst="rect">
-            <a:avLst/>
-          </a:prstGeom>
-          <a:solidFill>
-            <a:schemeClr val="bg1"/>
-          </a:solidFill>
-          <a:ln w="6350" cap="flat" cmpd="sng" algn="ctr">
-            <a:solidFill>
-              <a:schemeClr val="accent2"/>
-            </a:solidFill>
-            <a:prstDash val="solid"/>
-            <a:round/>
-            <a:headEnd type="none" w="med" len="med"/>
-            <a:tailEnd type="none" w="med" len="med"/>
-          </a:ln>
-          <a:effectLst/>
-        </p:spPr>
-        <p:txBody>
-          <a:bodyPr vert="horz" wrap="none" lIns="90000" tIns="46800" rIns="90000" bIns="46800" numCol="1" rtlCol="0" anchor="ctr" anchorCtr="0" compatLnSpc="1">
-            <a:prstTxWarp prst="textNoShape">
-              <a:avLst/>
-            </a:prstTxWarp>
-          </a:bodyPr>
-          <a:lstStyle/>
-          <a:p>
-            <a:pPr marL="0" marR="0" indent="0" algn="ctr" defTabSz="914400" rtl="0" eaLnBrk="1" fontAlgn="base" latinLnBrk="0" hangingPunct="1">
-              <a:lnSpc>
-                <a:spcPct val="100000"/>
-              </a:lnSpc>
-              <a:spcBef>
-                <a:spcPts val="1100"/>
-              </a:spcBef>
-              <a:spcAft>
-                <a:spcPct val="0"/>
-              </a:spcAft>
-              <a:buClrTx/>
-              <a:buSzTx/>
-              <a:buFontTx/>
-              <a:buNone/>
-              <a:tabLst/>
-            </a:pPr>
-            <a:r>
-              <a:rPr kumimoji="0" lang="da-DK" sz="2000" b="0" i="0" u="none" strike="noStrike" cap="none" normalizeH="0" baseline="0" dirty="0">
-                <a:ln>
-                  <a:noFill/>
-                </a:ln>
-                <a:solidFill>
-                  <a:schemeClr val="accent2"/>
-                </a:solidFill>
-                <a:effectLst/>
-                <a:latin typeface="Arial" charset="0"/>
-              </a:rPr>
-              <a:t>Tjeneste C</a:t>
-            </a:r>
-          </a:p>
-          <a:p>
-            <a:pPr marL="0" marR="0" indent="0" algn="ctr" defTabSz="914400" rtl="0" eaLnBrk="1" fontAlgn="base" latinLnBrk="0" hangingPunct="1">
-              <a:lnSpc>
-                <a:spcPct val="100000"/>
-              </a:lnSpc>
-              <a:spcBef>
-                <a:spcPts val="1100"/>
-              </a:spcBef>
-              <a:spcAft>
-                <a:spcPct val="0"/>
-              </a:spcAft>
-              <a:buClrTx/>
-              <a:buSzTx/>
-              <a:buFontTx/>
-              <a:buNone/>
-              <a:tabLst/>
-            </a:pPr>
-            <a:r>
-              <a:rPr lang="da-DK" sz="2000" dirty="0">
-                <a:solidFill>
-                  <a:schemeClr val="accent2">
-                    <a:lumMod val="20000"/>
-                    <a:lumOff val="80000"/>
-                  </a:schemeClr>
-                </a:solidFill>
-              </a:rPr>
-              <a:t>Tjeneste C bruger </a:t>
-            </a:r>
-            <a:endParaRPr kumimoji="0" lang="da-DK" sz="2000" b="0" i="0" u="none" strike="noStrike" cap="none" normalizeH="0" baseline="0" dirty="0">
-              <a:ln>
-                <a:noFill/>
-              </a:ln>
-              <a:solidFill>
-                <a:schemeClr val="accent2">
-                  <a:lumMod val="20000"/>
-                  <a:lumOff val="80000"/>
-                </a:schemeClr>
-              </a:solidFill>
-              <a:effectLst/>
-            </a:endParaRPr>
-          </a:p>
-        </p:txBody>
-      </p:sp>
-      <p:cxnSp>
-        <p:nvCxnSpPr>
-          <p:cNvPr id="14" name="Straight Connector 13">
-            <a:extLst>
-              <a:ext uri="{FF2B5EF4-FFF2-40B4-BE49-F238E27FC236}">
-                <a16:creationId xmlns:a16="http://schemas.microsoft.com/office/drawing/2014/main" id="{D6644FC3-5A0D-4A2D-BB30-A6FC39356F3F}"/>
-              </a:ext>
-            </a:extLst>
-          </p:cNvPr>
-          <p:cNvCxnSpPr>
-            <a:cxnSpLocks/>
-            <a:stCxn id="13" idx="1"/>
-            <a:endCxn id="13" idx="3"/>
-          </p:cNvCxnSpPr>
-          <p:nvPr/>
-        </p:nvCxnSpPr>
-        <p:spPr bwMode="auto">
-          <a:xfrm>
-            <a:off x="2927654" y="4407928"/>
-            <a:ext cx="2088226" cy="0"/>
-          </a:xfrm>
-          <a:prstGeom prst="line">
-            <a:avLst/>
-          </a:prstGeom>
-          <a:solidFill>
-            <a:schemeClr val="accent1"/>
-          </a:solidFill>
-          <a:ln w="6350" cap="flat" cmpd="sng" algn="ctr">
-            <a:solidFill>
-              <a:schemeClr val="accent2"/>
-            </a:solidFill>
-            <a:prstDash val="dash"/>
-            <a:round/>
-            <a:headEnd type="none" w="med" len="med"/>
-            <a:tailEnd type="none" w="med" len="med"/>
-          </a:ln>
-          <a:effectLst/>
-          <a:extLst>
-            <a:ext uri="{AF507438-7753-43E0-B8FC-AC1667EBCBE1}">
-              <a14:hiddenEffects xmlns:a14="http://schemas.microsoft.com/office/drawing/2010/main">
-                <a:effectLst>
-                  <a:outerShdw dist="35921" dir="2700000" algn="ctr" rotWithShape="0">
-                    <a:schemeClr val="bg2"/>
-                  </a:outerShdw>
-                </a:effectLst>
-              </a14:hiddenEffects>
-            </a:ext>
-          </a:extLst>
-        </p:spPr>
-      </p:cxnSp>
-      <p:cxnSp>
-        <p:nvCxnSpPr>
-          <p:cNvPr id="16" name="Straight Arrow Connector 15">
-            <a:extLst>
-              <a:ext uri="{FF2B5EF4-FFF2-40B4-BE49-F238E27FC236}">
-                <a16:creationId xmlns:a16="http://schemas.microsoft.com/office/drawing/2014/main" id="{53FB724D-ACE7-4FBE-A125-2A0B72DC5C0A}"/>
-              </a:ext>
-            </a:extLst>
-          </p:cNvPr>
-          <p:cNvCxnSpPr>
-            <a:cxnSpLocks/>
-            <a:stCxn id="5" idx="2"/>
-            <a:endCxn id="6" idx="0"/>
-          </p:cNvCxnSpPr>
-          <p:nvPr/>
-        </p:nvCxnSpPr>
-        <p:spPr bwMode="auto">
-          <a:xfrm>
-            <a:off x="3971767" y="2348879"/>
-            <a:ext cx="0" cy="418409"/>
-          </a:xfrm>
-          <a:prstGeom prst="straightConnector1">
-            <a:avLst/>
-          </a:prstGeom>
-          <a:solidFill>
-            <a:schemeClr val="accent1"/>
-          </a:solidFill>
-          <a:ln w="25400" cap="flat" cmpd="sng" algn="ctr">
-            <a:solidFill>
-              <a:schemeClr val="accent2"/>
-            </a:solidFill>
-            <a:prstDash val="solid"/>
-            <a:round/>
-            <a:headEnd type="none" w="med" len="med"/>
-            <a:tailEnd type="triangle" w="lg" len="med"/>
-          </a:ln>
-          <a:effectLst/>
-          <a:extLst>
-            <a:ext uri="{AF507438-7753-43E0-B8FC-AC1667EBCBE1}">
-              <a14:hiddenEffects xmlns:a14="http://schemas.microsoft.com/office/drawing/2010/main">
-                <a:effectLst>
-                  <a:outerShdw dist="35921" dir="2700000" algn="ctr" rotWithShape="0">
-                    <a:schemeClr val="bg2"/>
-                  </a:outerShdw>
-                </a:effectLst>
-              </a14:hiddenEffects>
-            </a:ext>
-          </a:extLst>
-        </p:spPr>
-      </p:cxnSp>
-      <p:cxnSp>
-        <p:nvCxnSpPr>
-          <p:cNvPr id="19" name="Straight Arrow Connector 18">
-            <a:extLst>
-              <a:ext uri="{FF2B5EF4-FFF2-40B4-BE49-F238E27FC236}">
-                <a16:creationId xmlns:a16="http://schemas.microsoft.com/office/drawing/2014/main" id="{60D33D2F-ECCA-4BBD-9D9F-59A6873FA12E}"/>
-              </a:ext>
-            </a:extLst>
-          </p:cNvPr>
-          <p:cNvCxnSpPr>
-            <a:cxnSpLocks/>
-            <a:stCxn id="6" idx="2"/>
-            <a:endCxn id="13" idx="0"/>
-          </p:cNvCxnSpPr>
-          <p:nvPr/>
-        </p:nvCxnSpPr>
-        <p:spPr bwMode="auto">
-          <a:xfrm>
-            <a:off x="3971767" y="3573016"/>
-            <a:ext cx="0" cy="432048"/>
-          </a:xfrm>
-          <a:prstGeom prst="straightConnector1">
-            <a:avLst/>
-          </a:prstGeom>
-          <a:solidFill>
-            <a:schemeClr val="accent1"/>
-          </a:solidFill>
-          <a:ln w="25400" cap="flat" cmpd="sng" algn="ctr">
-            <a:solidFill>
-              <a:schemeClr val="accent2"/>
-            </a:solidFill>
-            <a:prstDash val="solid"/>
-            <a:round/>
-            <a:headEnd type="none" w="med" len="med"/>
-            <a:tailEnd type="triangle" w="lg" len="med"/>
-          </a:ln>
-          <a:effectLst/>
-          <a:extLst>
-            <a:ext uri="{AF507438-7753-43E0-B8FC-AC1667EBCBE1}">
-              <a14:hiddenEffects xmlns:a14="http://schemas.microsoft.com/office/drawing/2010/main">
-                <a:effectLst>
-                  <a:outerShdw dist="35921" dir="2700000" algn="ctr" rotWithShape="0">
-                    <a:schemeClr val="bg2"/>
-                  </a:outerShdw>
-                </a:effectLst>
-              </a14:hiddenEffects>
-            </a:ext>
-          </a:extLst>
-        </p:spPr>
-      </p:cxnSp>
-      <p:cxnSp>
-        <p:nvCxnSpPr>
-          <p:cNvPr id="22" name="Straight Arrow Connector 21">
-            <a:extLst>
-              <a:ext uri="{FF2B5EF4-FFF2-40B4-BE49-F238E27FC236}">
-                <a16:creationId xmlns:a16="http://schemas.microsoft.com/office/drawing/2014/main" id="{F68B9EE7-1B53-4F23-A853-ED05AF334C44}"/>
-              </a:ext>
-            </a:extLst>
-          </p:cNvPr>
-          <p:cNvCxnSpPr>
-            <a:cxnSpLocks/>
-            <a:stCxn id="13" idx="2"/>
-          </p:cNvCxnSpPr>
-          <p:nvPr/>
-        </p:nvCxnSpPr>
-        <p:spPr bwMode="auto">
-          <a:xfrm>
-            <a:off x="3971767" y="4810792"/>
-            <a:ext cx="0" cy="274392"/>
-          </a:xfrm>
-          <a:prstGeom prst="straightConnector1">
-            <a:avLst/>
-          </a:prstGeom>
-          <a:solidFill>
-            <a:schemeClr val="accent1"/>
-          </a:solidFill>
-          <a:ln w="25400" cap="flat" cmpd="sng" algn="ctr">
-            <a:solidFill>
-              <a:schemeClr val="accent2">
-                <a:lumMod val="20000"/>
-                <a:lumOff val="80000"/>
-              </a:schemeClr>
-            </a:solidFill>
-            <a:prstDash val="solid"/>
-            <a:round/>
-            <a:headEnd type="none" w="med" len="med"/>
-            <a:tailEnd type="triangle" w="lg" len="med"/>
-          </a:ln>
-          <a:effectLst/>
-          <a:extLst>
-            <a:ext uri="{AF507438-7753-43E0-B8FC-AC1667EBCBE1}">
-              <a14:hiddenEffects xmlns:a14="http://schemas.microsoft.com/office/drawing/2010/main">
-                <a:effectLst>
-                  <a:outerShdw dist="35921" dir="2700000" algn="ctr" rotWithShape="0">
-                    <a:schemeClr val="bg2"/>
-                  </a:outerShdw>
-                </a:effectLst>
-              </a14:hiddenEffects>
-            </a:ext>
-          </a:extLst>
-        </p:spPr>
-      </p:cxnSp>
-      <p:sp>
-        <p:nvSpPr>
-          <p:cNvPr id="25" name="TextBox 24">
-            <a:extLst>
-              <a:ext uri="{FF2B5EF4-FFF2-40B4-BE49-F238E27FC236}">
-                <a16:creationId xmlns:a16="http://schemas.microsoft.com/office/drawing/2014/main" id="{D6FA640B-E9AE-4AA0-90EB-8759F449D617}"/>
-              </a:ext>
-            </a:extLst>
-          </p:cNvPr>
-          <p:cNvSpPr txBox="1"/>
-          <p:nvPr/>
-        </p:nvSpPr>
-        <p:spPr>
-          <a:xfrm>
-            <a:off x="5902861" y="2081132"/>
-            <a:ext cx="469680" cy="307777"/>
-          </a:xfrm>
-          <a:prstGeom prst="rect">
-            <a:avLst/>
-          </a:prstGeom>
-          <a:noFill/>
-        </p:spPr>
-        <p:txBody>
-          <a:bodyPr wrap="none" lIns="0" tIns="0" rIns="0" bIns="0" rtlCol="0">
-            <a:spAutoFit/>
-          </a:bodyPr>
-          <a:lstStyle/>
-          <a:p>
-            <a:pPr>
-              <a:lnSpc>
-                <a:spcPct val="100000"/>
-              </a:lnSpc>
-              <a:spcBef>
-                <a:spcPts val="1100"/>
-              </a:spcBef>
-            </a:pPr>
-            <a:r>
-              <a:rPr lang="en-GB" sz="2000" dirty="0">
-                <a:solidFill>
-                  <a:schemeClr val="accent2"/>
-                </a:solidFill>
-              </a:rPr>
-              <a:t>Id-A</a:t>
-            </a:r>
-          </a:p>
-        </p:txBody>
-      </p:sp>
-      <p:cxnSp>
-        <p:nvCxnSpPr>
-          <p:cNvPr id="26" name="Straight Arrow Connector 25">
-            <a:extLst>
-              <a:ext uri="{FF2B5EF4-FFF2-40B4-BE49-F238E27FC236}">
-                <a16:creationId xmlns:a16="http://schemas.microsoft.com/office/drawing/2014/main" id="{B586A626-A263-4AF6-B29F-FC4E57C7B579}"/>
-              </a:ext>
-            </a:extLst>
-          </p:cNvPr>
-          <p:cNvCxnSpPr/>
-          <p:nvPr/>
-        </p:nvCxnSpPr>
-        <p:spPr bwMode="auto">
-          <a:xfrm>
-            <a:off x="6115118" y="2443335"/>
-            <a:ext cx="0" cy="553617"/>
-          </a:xfrm>
-          <a:prstGeom prst="straightConnector1">
-            <a:avLst/>
-          </a:prstGeom>
-          <a:solidFill>
-            <a:schemeClr val="accent1"/>
-          </a:solidFill>
-          <a:ln w="25400" cap="flat" cmpd="sng" algn="ctr">
-            <a:solidFill>
-              <a:schemeClr val="accent2"/>
-            </a:solidFill>
-            <a:prstDash val="dash"/>
-            <a:round/>
-            <a:headEnd type="none" w="med" len="med"/>
-            <a:tailEnd type="triangle" w="lg" len="med"/>
-          </a:ln>
-          <a:effectLst/>
-          <a:extLst>
-            <a:ext uri="{AF507438-7753-43E0-B8FC-AC1667EBCBE1}">
-              <a14:hiddenEffects xmlns:a14="http://schemas.microsoft.com/office/drawing/2010/main">
-                <a:effectLst>
-                  <a:outerShdw dist="35921" dir="2700000" algn="ctr" rotWithShape="0">
-                    <a:schemeClr val="bg2"/>
-                  </a:outerShdw>
-                </a:effectLst>
-              </a14:hiddenEffects>
-            </a:ext>
-          </a:extLst>
-        </p:spPr>
-      </p:cxnSp>
-      <p:cxnSp>
-        <p:nvCxnSpPr>
-          <p:cNvPr id="31" name="Straight Arrow Connector 30">
-            <a:extLst>
-              <a:ext uri="{FF2B5EF4-FFF2-40B4-BE49-F238E27FC236}">
-                <a16:creationId xmlns:a16="http://schemas.microsoft.com/office/drawing/2014/main" id="{A61A1522-5953-49DB-A0C7-E8A9EB303EE2}"/>
-              </a:ext>
-            </a:extLst>
-          </p:cNvPr>
-          <p:cNvCxnSpPr/>
-          <p:nvPr/>
-        </p:nvCxnSpPr>
-        <p:spPr bwMode="auto">
-          <a:xfrm>
-            <a:off x="6107019" y="3242160"/>
-            <a:ext cx="0" cy="978928"/>
-          </a:xfrm>
-          <a:prstGeom prst="straightConnector1">
-            <a:avLst/>
-          </a:prstGeom>
-          <a:solidFill>
-            <a:schemeClr val="accent1"/>
-          </a:solidFill>
-          <a:ln w="25400" cap="flat" cmpd="sng" algn="ctr">
-            <a:solidFill>
-              <a:schemeClr val="accent2"/>
-            </a:solidFill>
-            <a:prstDash val="dash"/>
-            <a:round/>
-            <a:headEnd type="none" w="med" len="med"/>
-            <a:tailEnd type="triangle" w="lg" len="med"/>
-          </a:ln>
-          <a:effectLst/>
-          <a:extLst>
-            <a:ext uri="{AF507438-7753-43E0-B8FC-AC1667EBCBE1}">
-              <a14:hiddenEffects xmlns:a14="http://schemas.microsoft.com/office/drawing/2010/main">
-                <a:effectLst>
-                  <a:outerShdw dist="35921" dir="2700000" algn="ctr" rotWithShape="0">
-                    <a:schemeClr val="bg2"/>
-                  </a:outerShdw>
-                </a:effectLst>
-              </a14:hiddenEffects>
-            </a:ext>
-          </a:extLst>
-        </p:spPr>
-      </p:cxnSp>
-      <p:sp>
-        <p:nvSpPr>
-          <p:cNvPr id="32" name="TextBox 31">
-            <a:extLst>
-              <a:ext uri="{FF2B5EF4-FFF2-40B4-BE49-F238E27FC236}">
-                <a16:creationId xmlns:a16="http://schemas.microsoft.com/office/drawing/2014/main" id="{E70D63AC-BCE6-4B92-A9A5-53DDDE35EA98}"/>
-              </a:ext>
-            </a:extLst>
-          </p:cNvPr>
-          <p:cNvSpPr txBox="1"/>
-          <p:nvPr/>
-        </p:nvSpPr>
-        <p:spPr>
-          <a:xfrm>
-            <a:off x="6830866" y="2081132"/>
-            <a:ext cx="469680" cy="307777"/>
-          </a:xfrm>
-          <a:prstGeom prst="rect">
-            <a:avLst/>
-          </a:prstGeom>
-          <a:noFill/>
-        </p:spPr>
-        <p:txBody>
-          <a:bodyPr wrap="none" lIns="0" tIns="0" rIns="0" bIns="0" rtlCol="0">
-            <a:spAutoFit/>
-          </a:bodyPr>
-          <a:lstStyle/>
-          <a:p>
-            <a:pPr>
-              <a:lnSpc>
-                <a:spcPct val="100000"/>
-              </a:lnSpc>
-              <a:spcBef>
-                <a:spcPts val="1100"/>
-              </a:spcBef>
-            </a:pPr>
-            <a:r>
-              <a:rPr lang="en-GB" sz="2000" dirty="0">
-                <a:solidFill>
-                  <a:schemeClr val="accent2"/>
-                </a:solidFill>
-              </a:rPr>
-              <a:t>Id-A</a:t>
-            </a:r>
-          </a:p>
-        </p:txBody>
-      </p:sp>
-      <p:cxnSp>
-        <p:nvCxnSpPr>
-          <p:cNvPr id="33" name="Straight Arrow Connector 32">
-            <a:extLst>
-              <a:ext uri="{FF2B5EF4-FFF2-40B4-BE49-F238E27FC236}">
-                <a16:creationId xmlns:a16="http://schemas.microsoft.com/office/drawing/2014/main" id="{4250500B-9680-4CDE-A6BA-FAB6EA7A6B52}"/>
-              </a:ext>
-            </a:extLst>
-          </p:cNvPr>
-          <p:cNvCxnSpPr/>
-          <p:nvPr/>
-        </p:nvCxnSpPr>
-        <p:spPr bwMode="auto">
-          <a:xfrm>
-            <a:off x="7043123" y="2443335"/>
-            <a:ext cx="0" cy="553617"/>
-          </a:xfrm>
-          <a:prstGeom prst="straightConnector1">
-            <a:avLst/>
-          </a:prstGeom>
-          <a:solidFill>
-            <a:schemeClr val="accent1"/>
-          </a:solidFill>
-          <a:ln w="25400" cap="flat" cmpd="sng" algn="ctr">
-            <a:solidFill>
-              <a:schemeClr val="accent2"/>
-            </a:solidFill>
-            <a:prstDash val="dash"/>
-            <a:round/>
-            <a:headEnd type="none" w="med" len="med"/>
-            <a:tailEnd type="triangle" w="lg" len="med"/>
-          </a:ln>
-          <a:effectLst/>
-          <a:extLst>
-            <a:ext uri="{AF507438-7753-43E0-B8FC-AC1667EBCBE1}">
-              <a14:hiddenEffects xmlns:a14="http://schemas.microsoft.com/office/drawing/2010/main">
-                <a:effectLst>
-                  <a:outerShdw dist="35921" dir="2700000" algn="ctr" rotWithShape="0">
-                    <a:schemeClr val="bg2"/>
-                  </a:outerShdw>
-                </a:effectLst>
-              </a14:hiddenEffects>
-            </a:ext>
-          </a:extLst>
-        </p:spPr>
-      </p:cxnSp>
-      <p:sp>
-        <p:nvSpPr>
-          <p:cNvPr id="34" name="TextBox 33">
-            <a:extLst>
-              <a:ext uri="{FF2B5EF4-FFF2-40B4-BE49-F238E27FC236}">
-                <a16:creationId xmlns:a16="http://schemas.microsoft.com/office/drawing/2014/main" id="{9E0527A7-9205-4948-ACBE-92BE9FA75204}"/>
-              </a:ext>
-            </a:extLst>
-          </p:cNvPr>
-          <p:cNvSpPr txBox="1"/>
-          <p:nvPr/>
-        </p:nvSpPr>
-        <p:spPr>
-          <a:xfrm>
-            <a:off x="6822767" y="3305268"/>
-            <a:ext cx="469680" cy="307777"/>
-          </a:xfrm>
-          <a:prstGeom prst="rect">
-            <a:avLst/>
-          </a:prstGeom>
-          <a:noFill/>
-        </p:spPr>
-        <p:txBody>
-          <a:bodyPr wrap="none" lIns="0" tIns="0" rIns="0" bIns="0" rtlCol="0">
-            <a:spAutoFit/>
-          </a:bodyPr>
-          <a:lstStyle/>
-          <a:p>
-            <a:pPr>
-              <a:lnSpc>
-                <a:spcPct val="100000"/>
-              </a:lnSpc>
-              <a:spcBef>
-                <a:spcPts val="1100"/>
-              </a:spcBef>
-            </a:pPr>
-            <a:r>
-              <a:rPr lang="en-GB" sz="2000" dirty="0">
-                <a:solidFill>
-                  <a:schemeClr val="accent2"/>
-                </a:solidFill>
-              </a:rPr>
-              <a:t>Id-B</a:t>
-            </a:r>
-          </a:p>
-        </p:txBody>
-      </p:sp>
-      <p:cxnSp>
-        <p:nvCxnSpPr>
-          <p:cNvPr id="35" name="Straight Arrow Connector 34">
-            <a:extLst>
-              <a:ext uri="{FF2B5EF4-FFF2-40B4-BE49-F238E27FC236}">
-                <a16:creationId xmlns:a16="http://schemas.microsoft.com/office/drawing/2014/main" id="{22B098AF-B929-4755-8C10-6FA851878C23}"/>
-              </a:ext>
-            </a:extLst>
-          </p:cNvPr>
-          <p:cNvCxnSpPr/>
-          <p:nvPr/>
-        </p:nvCxnSpPr>
-        <p:spPr bwMode="auto">
-          <a:xfrm>
-            <a:off x="7035024" y="3667471"/>
-            <a:ext cx="0" cy="553617"/>
-          </a:xfrm>
-          <a:prstGeom prst="straightConnector1">
-            <a:avLst/>
-          </a:prstGeom>
-          <a:solidFill>
-            <a:schemeClr val="accent1"/>
-          </a:solidFill>
-          <a:ln w="25400" cap="flat" cmpd="sng" algn="ctr">
-            <a:solidFill>
-              <a:schemeClr val="accent2"/>
-            </a:solidFill>
-            <a:prstDash val="dash"/>
-            <a:round/>
-            <a:headEnd type="none" w="med" len="med"/>
-            <a:tailEnd type="triangle" w="lg" len="med"/>
-          </a:ln>
-          <a:effectLst/>
-          <a:extLst>
-            <a:ext uri="{AF507438-7753-43E0-B8FC-AC1667EBCBE1}">
-              <a14:hiddenEffects xmlns:a14="http://schemas.microsoft.com/office/drawing/2010/main">
-                <a:effectLst>
-                  <a:outerShdw dist="35921" dir="2700000" algn="ctr" rotWithShape="0">
-                    <a:schemeClr val="bg2"/>
-                  </a:outerShdw>
-                </a:effectLst>
-              </a14:hiddenEffects>
-            </a:ext>
-          </a:extLst>
-        </p:spPr>
-      </p:cxnSp>
-    </p:spTree>
-    <p:extLst>
-      <p:ext uri="{BB962C8B-B14F-4D97-AF65-F5344CB8AC3E}">
-        <p14:creationId xmlns:p14="http://schemas.microsoft.com/office/powerpoint/2010/main" val="84512271"/>
       </p:ext>
     </p:extLst>
   </p:cSld>

</xml_diff>